<commit_message>
added slides 2 and 3
</commit_message>
<xml_diff>
--- a/GiGte.pptx
+++ b/GiGte.pptx
@@ -11,8 +11,9 @@
     <p:sldId id="259" r:id="rId5"/>
     <p:sldId id="260" r:id="rId6"/>
     <p:sldId id="261" r:id="rId7"/>
+    <p:sldId id="262" r:id="rId8"/>
   </p:sldIdLst>
-  <p:sldSz cx="9144000" cy="6858000" type="screen4x3"/>
+  <p:sldSz cx="9144000" cy="5143500" type="screen16x9"/>
   <p:notesSz cx="6858000" cy="9144000"/>
   <p:defaultTextStyle>
     <a:defPPr>
@@ -112,7 +113,7 @@
   <p:extLst>
     <p:ext uri="{EFAFB233-063F-42B5-8137-9DF3F51BA10A}">
       <p15:sldGuideLst xmlns:p15="http://schemas.microsoft.com/office/powerpoint/2012/main">
-        <p15:guide id="1" orient="horz" pos="2160">
+        <p15:guide id="1" orient="horz" pos="1620">
           <p15:clr>
             <a:srgbClr val="A4A3A4"/>
           </p15:clr>
@@ -157,8 +158,8 @@
         </p:nvSpPr>
         <p:spPr>
           <a:xfrm>
-            <a:off x="685800" y="2130425"/>
-            <a:ext cx="7772400" cy="1470025"/>
+            <a:off x="685800" y="1597819"/>
+            <a:ext cx="7772400" cy="1102519"/>
           </a:xfrm>
         </p:spPr>
         <p:txBody>
@@ -166,10 +167,9 @@
           <a:lstStyle/>
           <a:p>
             <a:r>
-              <a:rPr lang="en-US" smtClean="0"/>
+              <a:rPr lang="en-US"/>
               <a:t>Click to edit Master title style</a:t>
             </a:r>
-            <a:endParaRPr lang="en-US"/>
           </a:p>
         </p:txBody>
       </p:sp>
@@ -185,8 +185,8 @@
         </p:nvSpPr>
         <p:spPr>
           <a:xfrm>
-            <a:off x="1371600" y="3886200"/>
-            <a:ext cx="6400800" cy="1752600"/>
+            <a:off x="1371600" y="2914650"/>
+            <a:ext cx="6400800" cy="1314450"/>
           </a:xfrm>
         </p:spPr>
         <p:txBody>
@@ -285,31 +285,30 @@
           </a:lstStyle>
           <a:p>
             <a:r>
+              <a:rPr lang="en-US"/>
+              <a:t>Click to edit Master subtitle style</a:t>
+            </a:r>
+          </a:p>
+        </p:txBody>
+      </p:sp>
+      <p:sp>
+        <p:nvSpPr>
+          <p:cNvPr id="4" name="Date Placeholder 3"/>
+          <p:cNvSpPr>
+            <a:spLocks noGrp="1"/>
+          </p:cNvSpPr>
+          <p:nvPr>
+            <p:ph type="dt" sz="half" idx="10"/>
+          </p:nvPr>
+        </p:nvSpPr>
+        <p:spPr/>
+        <p:txBody>
+          <a:bodyPr/>
+          <a:lstStyle/>
+          <a:p>
+            <a:fld id="{CC5155F2-B992-344D-B599-BA130F7AC538}" type="datetimeFigureOut">
               <a:rPr lang="en-US" smtClean="0"/>
-              <a:t>Click to edit Master subtitle style</a:t>
-            </a:r>
-            <a:endParaRPr lang="en-US"/>
-          </a:p>
-        </p:txBody>
-      </p:sp>
-      <p:sp>
-        <p:nvSpPr>
-          <p:cNvPr id="4" name="Date Placeholder 3"/>
-          <p:cNvSpPr>
-            <a:spLocks noGrp="1"/>
-          </p:cNvSpPr>
-          <p:nvPr>
-            <p:ph type="dt" sz="half" idx="10"/>
-          </p:nvPr>
-        </p:nvSpPr>
-        <p:spPr/>
-        <p:txBody>
-          <a:bodyPr/>
-          <a:lstStyle/>
-          <a:p>
-            <a:fld id="{241EB5C9-1307-BA42-ABA2-0BC069CD8E7F}" type="datetimeFigureOut">
-              <a:rPr lang="en-US" smtClean="0"/>
-              <a:t>4/5/2019</a:t>
+              <a:t>2020-03-03</a:t>
             </a:fld>
             <a:endParaRPr lang="en-US"/>
           </a:p>
@@ -349,7 +348,7 @@
           <a:bodyPr/>
           <a:lstStyle/>
           <a:p>
-            <a:fld id="{C5EF2332-01BF-834F-8236-50238282D533}" type="slidenum">
+            <a:fld id="{90947476-F6E0-2F4C-97C9-975E697FF5F2}" type="slidenum">
               <a:rPr lang="en-US" smtClean="0"/>
               <a:t>‹#›</a:t>
             </a:fld>
@@ -360,7 +359,7 @@
     </p:spTree>
     <p:extLst>
       <p:ext uri="{BB962C8B-B14F-4D97-AF65-F5344CB8AC3E}">
-        <p14:creationId xmlns:p14="http://schemas.microsoft.com/office/powerpoint/2010/main" val="1444357513"/>
+        <p14:creationId xmlns:p14="http://schemas.microsoft.com/office/powerpoint/2010/main" val="3568320769"/>
       </p:ext>
     </p:extLst>
   </p:cSld>
@@ -403,83 +402,81 @@
           <a:lstStyle/>
           <a:p>
             <a:r>
+              <a:rPr lang="en-US"/>
+              <a:t>Click to edit Master title style</a:t>
+            </a:r>
+          </a:p>
+        </p:txBody>
+      </p:sp>
+      <p:sp>
+        <p:nvSpPr>
+          <p:cNvPr id="3" name="Vertical Text Placeholder 2"/>
+          <p:cNvSpPr>
+            <a:spLocks noGrp="1"/>
+          </p:cNvSpPr>
+          <p:nvPr>
+            <p:ph type="body" orient="vert" idx="1"/>
+          </p:nvPr>
+        </p:nvSpPr>
+        <p:spPr/>
+        <p:txBody>
+          <a:bodyPr vert="eaVert"/>
+          <a:lstStyle/>
+          <a:p>
+            <a:pPr lvl="0"/>
+            <a:r>
+              <a:rPr lang="en-US"/>
+              <a:t>Click to edit Master text styles</a:t>
+            </a:r>
+          </a:p>
+          <a:p>
+            <a:pPr lvl="1"/>
+            <a:r>
+              <a:rPr lang="en-US"/>
+              <a:t>Second level</a:t>
+            </a:r>
+          </a:p>
+          <a:p>
+            <a:pPr lvl="2"/>
+            <a:r>
+              <a:rPr lang="en-US"/>
+              <a:t>Third level</a:t>
+            </a:r>
+          </a:p>
+          <a:p>
+            <a:pPr lvl="3"/>
+            <a:r>
+              <a:rPr lang="en-US"/>
+              <a:t>Fourth level</a:t>
+            </a:r>
+          </a:p>
+          <a:p>
+            <a:pPr lvl="4"/>
+            <a:r>
+              <a:rPr lang="en-US"/>
+              <a:t>Fifth level</a:t>
+            </a:r>
+          </a:p>
+        </p:txBody>
+      </p:sp>
+      <p:sp>
+        <p:nvSpPr>
+          <p:cNvPr id="4" name="Date Placeholder 3"/>
+          <p:cNvSpPr>
+            <a:spLocks noGrp="1"/>
+          </p:cNvSpPr>
+          <p:nvPr>
+            <p:ph type="dt" sz="half" idx="10"/>
+          </p:nvPr>
+        </p:nvSpPr>
+        <p:spPr/>
+        <p:txBody>
+          <a:bodyPr/>
+          <a:lstStyle/>
+          <a:p>
+            <a:fld id="{CC5155F2-B992-344D-B599-BA130F7AC538}" type="datetimeFigureOut">
               <a:rPr lang="en-US" smtClean="0"/>
-              <a:t>Click to edit Master title style</a:t>
-            </a:r>
-            <a:endParaRPr lang="en-US"/>
-          </a:p>
-        </p:txBody>
-      </p:sp>
-      <p:sp>
-        <p:nvSpPr>
-          <p:cNvPr id="3" name="Vertical Text Placeholder 2"/>
-          <p:cNvSpPr>
-            <a:spLocks noGrp="1"/>
-          </p:cNvSpPr>
-          <p:nvPr>
-            <p:ph type="body" orient="vert" idx="1"/>
-          </p:nvPr>
-        </p:nvSpPr>
-        <p:spPr/>
-        <p:txBody>
-          <a:bodyPr vert="eaVert"/>
-          <a:lstStyle/>
-          <a:p>
-            <a:pPr lvl="0"/>
-            <a:r>
-              <a:rPr lang="en-US" smtClean="0"/>
-              <a:t>Click to edit Master text styles</a:t>
-            </a:r>
-          </a:p>
-          <a:p>
-            <a:pPr lvl="1"/>
-            <a:r>
-              <a:rPr lang="en-US" smtClean="0"/>
-              <a:t>Second level</a:t>
-            </a:r>
-          </a:p>
-          <a:p>
-            <a:pPr lvl="2"/>
-            <a:r>
-              <a:rPr lang="en-US" smtClean="0"/>
-              <a:t>Third level</a:t>
-            </a:r>
-          </a:p>
-          <a:p>
-            <a:pPr lvl="3"/>
-            <a:r>
-              <a:rPr lang="en-US" smtClean="0"/>
-              <a:t>Fourth level</a:t>
-            </a:r>
-          </a:p>
-          <a:p>
-            <a:pPr lvl="4"/>
-            <a:r>
-              <a:rPr lang="en-US" smtClean="0"/>
-              <a:t>Fifth level</a:t>
-            </a:r>
-            <a:endParaRPr lang="en-US"/>
-          </a:p>
-        </p:txBody>
-      </p:sp>
-      <p:sp>
-        <p:nvSpPr>
-          <p:cNvPr id="4" name="Date Placeholder 3"/>
-          <p:cNvSpPr>
-            <a:spLocks noGrp="1"/>
-          </p:cNvSpPr>
-          <p:nvPr>
-            <p:ph type="dt" sz="half" idx="10"/>
-          </p:nvPr>
-        </p:nvSpPr>
-        <p:spPr/>
-        <p:txBody>
-          <a:bodyPr/>
-          <a:lstStyle/>
-          <a:p>
-            <a:fld id="{241EB5C9-1307-BA42-ABA2-0BC069CD8E7F}" type="datetimeFigureOut">
-              <a:rPr lang="en-US" smtClean="0"/>
-              <a:t>4/5/2019</a:t>
+              <a:t>2020-03-03</a:t>
             </a:fld>
             <a:endParaRPr lang="en-US"/>
           </a:p>
@@ -519,7 +516,7 @@
           <a:bodyPr/>
           <a:lstStyle/>
           <a:p>
-            <a:fld id="{C5EF2332-01BF-834F-8236-50238282D533}" type="slidenum">
+            <a:fld id="{90947476-F6E0-2F4C-97C9-975E697FF5F2}" type="slidenum">
               <a:rPr lang="en-US" smtClean="0"/>
               <a:t>‹#›</a:t>
             </a:fld>
@@ -530,7 +527,7 @@
     </p:spTree>
     <p:extLst>
       <p:ext uri="{BB962C8B-B14F-4D97-AF65-F5344CB8AC3E}">
-        <p14:creationId xmlns:p14="http://schemas.microsoft.com/office/powerpoint/2010/main" val="313914798"/>
+        <p14:creationId xmlns:p14="http://schemas.microsoft.com/office/powerpoint/2010/main" val="3938855619"/>
       </p:ext>
     </p:extLst>
   </p:cSld>
@@ -569,8 +566,8 @@
         </p:nvSpPr>
         <p:spPr>
           <a:xfrm>
-            <a:off x="6629400" y="274638"/>
-            <a:ext cx="2057400" cy="5851525"/>
+            <a:off x="6629400" y="205979"/>
+            <a:ext cx="2057400" cy="4388644"/>
           </a:xfrm>
         </p:spPr>
         <p:txBody>
@@ -578,10 +575,9 @@
           <a:lstStyle/>
           <a:p>
             <a:r>
-              <a:rPr lang="en-US" smtClean="0"/>
+              <a:rPr lang="en-US"/>
               <a:t>Click to edit Master title style</a:t>
             </a:r>
-            <a:endParaRPr lang="en-US"/>
           </a:p>
         </p:txBody>
       </p:sp>
@@ -597,8 +593,8 @@
         </p:nvSpPr>
         <p:spPr>
           <a:xfrm>
-            <a:off x="457200" y="274638"/>
-            <a:ext cx="6019800" cy="5851525"/>
+            <a:off x="457200" y="205979"/>
+            <a:ext cx="6019800" cy="4388644"/>
           </a:xfrm>
         </p:spPr>
         <p:txBody>
@@ -607,59 +603,58 @@
           <a:p>
             <a:pPr lvl="0"/>
             <a:r>
+              <a:rPr lang="en-US"/>
+              <a:t>Click to edit Master text styles</a:t>
+            </a:r>
+          </a:p>
+          <a:p>
+            <a:pPr lvl="1"/>
+            <a:r>
+              <a:rPr lang="en-US"/>
+              <a:t>Second level</a:t>
+            </a:r>
+          </a:p>
+          <a:p>
+            <a:pPr lvl="2"/>
+            <a:r>
+              <a:rPr lang="en-US"/>
+              <a:t>Third level</a:t>
+            </a:r>
+          </a:p>
+          <a:p>
+            <a:pPr lvl="3"/>
+            <a:r>
+              <a:rPr lang="en-US"/>
+              <a:t>Fourth level</a:t>
+            </a:r>
+          </a:p>
+          <a:p>
+            <a:pPr lvl="4"/>
+            <a:r>
+              <a:rPr lang="en-US"/>
+              <a:t>Fifth level</a:t>
+            </a:r>
+          </a:p>
+        </p:txBody>
+      </p:sp>
+      <p:sp>
+        <p:nvSpPr>
+          <p:cNvPr id="4" name="Date Placeholder 3"/>
+          <p:cNvSpPr>
+            <a:spLocks noGrp="1"/>
+          </p:cNvSpPr>
+          <p:nvPr>
+            <p:ph type="dt" sz="half" idx="10"/>
+          </p:nvPr>
+        </p:nvSpPr>
+        <p:spPr/>
+        <p:txBody>
+          <a:bodyPr/>
+          <a:lstStyle/>
+          <a:p>
+            <a:fld id="{CC5155F2-B992-344D-B599-BA130F7AC538}" type="datetimeFigureOut">
               <a:rPr lang="en-US" smtClean="0"/>
-              <a:t>Click to edit Master text styles</a:t>
-            </a:r>
-          </a:p>
-          <a:p>
-            <a:pPr lvl="1"/>
-            <a:r>
-              <a:rPr lang="en-US" smtClean="0"/>
-              <a:t>Second level</a:t>
-            </a:r>
-          </a:p>
-          <a:p>
-            <a:pPr lvl="2"/>
-            <a:r>
-              <a:rPr lang="en-US" smtClean="0"/>
-              <a:t>Third level</a:t>
-            </a:r>
-          </a:p>
-          <a:p>
-            <a:pPr lvl="3"/>
-            <a:r>
-              <a:rPr lang="en-US" smtClean="0"/>
-              <a:t>Fourth level</a:t>
-            </a:r>
-          </a:p>
-          <a:p>
-            <a:pPr lvl="4"/>
-            <a:r>
-              <a:rPr lang="en-US" smtClean="0"/>
-              <a:t>Fifth level</a:t>
-            </a:r>
-            <a:endParaRPr lang="en-US"/>
-          </a:p>
-        </p:txBody>
-      </p:sp>
-      <p:sp>
-        <p:nvSpPr>
-          <p:cNvPr id="4" name="Date Placeholder 3"/>
-          <p:cNvSpPr>
-            <a:spLocks noGrp="1"/>
-          </p:cNvSpPr>
-          <p:nvPr>
-            <p:ph type="dt" sz="half" idx="10"/>
-          </p:nvPr>
-        </p:nvSpPr>
-        <p:spPr/>
-        <p:txBody>
-          <a:bodyPr/>
-          <a:lstStyle/>
-          <a:p>
-            <a:fld id="{241EB5C9-1307-BA42-ABA2-0BC069CD8E7F}" type="datetimeFigureOut">
-              <a:rPr lang="en-US" smtClean="0"/>
-              <a:t>4/5/2019</a:t>
+              <a:t>2020-03-03</a:t>
             </a:fld>
             <a:endParaRPr lang="en-US"/>
           </a:p>
@@ -699,7 +694,7 @@
           <a:bodyPr/>
           <a:lstStyle/>
           <a:p>
-            <a:fld id="{C5EF2332-01BF-834F-8236-50238282D533}" type="slidenum">
+            <a:fld id="{90947476-F6E0-2F4C-97C9-975E697FF5F2}" type="slidenum">
               <a:rPr lang="en-US" smtClean="0"/>
               <a:t>‹#›</a:t>
             </a:fld>
@@ -710,7 +705,7 @@
     </p:spTree>
     <p:extLst>
       <p:ext uri="{BB962C8B-B14F-4D97-AF65-F5344CB8AC3E}">
-        <p14:creationId xmlns:p14="http://schemas.microsoft.com/office/powerpoint/2010/main" val="2581529045"/>
+        <p14:creationId xmlns:p14="http://schemas.microsoft.com/office/powerpoint/2010/main" val="923476237"/>
       </p:ext>
     </p:extLst>
   </p:cSld>
@@ -747,16 +742,26 @@
             <p:ph type="title"/>
           </p:nvPr>
         </p:nvSpPr>
-        <p:spPr/>
-        <p:txBody>
-          <a:bodyPr/>
-          <a:lstStyle/>
-          <a:p>
-            <a:r>
-              <a:rPr lang="en-US" smtClean="0"/>
+        <p:spPr>
+          <a:xfrm>
+            <a:off x="457200" y="74042"/>
+            <a:ext cx="8229600" cy="363001"/>
+          </a:xfrm>
+        </p:spPr>
+        <p:txBody>
+          <a:bodyPr>
+            <a:noAutofit/>
+          </a:bodyPr>
+          <a:lstStyle>
+            <a:lvl1pPr>
+              <a:defRPr sz="2000"/>
+            </a:lvl1pPr>
+          </a:lstStyle>
+          <a:p>
+            <a:r>
+              <a:rPr lang="en-US" dirty="0"/>
               <a:t>Click to edit Master title style</a:t>
             </a:r>
-            <a:endParaRPr lang="en-US"/>
           </a:p>
         </p:txBody>
       </p:sp>
@@ -770,117 +775,56 @@
             <p:ph idx="1"/>
           </p:nvPr>
         </p:nvSpPr>
-        <p:spPr/>
+        <p:spPr>
+          <a:xfrm>
+            <a:off x="123707" y="206152"/>
+            <a:ext cx="8915142" cy="4856949"/>
+          </a:xfrm>
+        </p:spPr>
         <p:txBody>
           <a:bodyPr/>
           <a:lstStyle/>
           <a:p>
             <a:pPr lvl="0"/>
             <a:r>
-              <a:rPr lang="en-US" smtClean="0"/>
+              <a:rPr lang="en-US" dirty="0"/>
               <a:t>Click to edit Master text styles</a:t>
             </a:r>
           </a:p>
           <a:p>
             <a:pPr lvl="1"/>
             <a:r>
-              <a:rPr lang="en-US" smtClean="0"/>
+              <a:rPr lang="en-US" dirty="0"/>
               <a:t>Second level</a:t>
             </a:r>
           </a:p>
           <a:p>
             <a:pPr lvl="2"/>
             <a:r>
-              <a:rPr lang="en-US" smtClean="0"/>
+              <a:rPr lang="en-US" dirty="0"/>
               <a:t>Third level</a:t>
             </a:r>
           </a:p>
           <a:p>
             <a:pPr lvl="3"/>
             <a:r>
-              <a:rPr lang="en-US" smtClean="0"/>
+              <a:rPr lang="en-US" dirty="0"/>
               <a:t>Fourth level</a:t>
             </a:r>
           </a:p>
           <a:p>
             <a:pPr lvl="4"/>
             <a:r>
-              <a:rPr lang="en-US" smtClean="0"/>
+              <a:rPr lang="en-US" dirty="0"/>
               <a:t>Fifth level</a:t>
             </a:r>
-            <a:endParaRPr lang="en-US"/>
-          </a:p>
-        </p:txBody>
-      </p:sp>
-      <p:sp>
-        <p:nvSpPr>
-          <p:cNvPr id="4" name="Date Placeholder 3"/>
-          <p:cNvSpPr>
-            <a:spLocks noGrp="1"/>
-          </p:cNvSpPr>
-          <p:nvPr>
-            <p:ph type="dt" sz="half" idx="10"/>
-          </p:nvPr>
-        </p:nvSpPr>
-        <p:spPr/>
-        <p:txBody>
-          <a:bodyPr/>
-          <a:lstStyle/>
-          <a:p>
-            <a:fld id="{241EB5C9-1307-BA42-ABA2-0BC069CD8E7F}" type="datetimeFigureOut">
-              <a:rPr lang="en-US" smtClean="0"/>
-              <a:t>4/5/2019</a:t>
-            </a:fld>
-            <a:endParaRPr lang="en-US"/>
-          </a:p>
-        </p:txBody>
-      </p:sp>
-      <p:sp>
-        <p:nvSpPr>
-          <p:cNvPr id="5" name="Footer Placeholder 4"/>
-          <p:cNvSpPr>
-            <a:spLocks noGrp="1"/>
-          </p:cNvSpPr>
-          <p:nvPr>
-            <p:ph type="ftr" sz="quarter" idx="11"/>
-          </p:nvPr>
-        </p:nvSpPr>
-        <p:spPr/>
-        <p:txBody>
-          <a:bodyPr/>
-          <a:lstStyle/>
-          <a:p>
-            <a:endParaRPr lang="en-US"/>
-          </a:p>
-        </p:txBody>
-      </p:sp>
-      <p:sp>
-        <p:nvSpPr>
-          <p:cNvPr id="6" name="Slide Number Placeholder 5"/>
-          <p:cNvSpPr>
-            <a:spLocks noGrp="1"/>
-          </p:cNvSpPr>
-          <p:nvPr>
-            <p:ph type="sldNum" sz="quarter" idx="12"/>
-          </p:nvPr>
-        </p:nvSpPr>
-        <p:spPr/>
-        <p:txBody>
-          <a:bodyPr/>
-          <a:lstStyle/>
-          <a:p>
-            <a:fld id="{C5EF2332-01BF-834F-8236-50238282D533}" type="slidenum">
-              <a:rPr lang="en-US" smtClean="0"/>
-              <a:t>‹#›</a:t>
-            </a:fld>
-            <a:endParaRPr lang="en-US"/>
           </a:p>
         </p:txBody>
       </p:sp>
     </p:spTree>
     <p:extLst>
       <p:ext uri="{BB962C8B-B14F-4D97-AF65-F5344CB8AC3E}">
-        <p14:creationId xmlns:p14="http://schemas.microsoft.com/office/powerpoint/2010/main" val="338346009"/>
+        <p14:creationId xmlns:p14="http://schemas.microsoft.com/office/powerpoint/2010/main" val="3282377979"/>
       </p:ext>
     </p:extLst>
   </p:cSld>
@@ -919,8 +863,8 @@
         </p:nvSpPr>
         <p:spPr>
           <a:xfrm>
-            <a:off x="722313" y="4406900"/>
-            <a:ext cx="7772400" cy="1362075"/>
+            <a:off x="722313" y="3305176"/>
+            <a:ext cx="7772400" cy="1021556"/>
           </a:xfrm>
         </p:spPr>
         <p:txBody>
@@ -932,10 +876,9 @@
           </a:lstStyle>
           <a:p>
             <a:r>
-              <a:rPr lang="en-US" smtClean="0"/>
+              <a:rPr lang="en-US"/>
               <a:t>Click to edit Master title style</a:t>
             </a:r>
-            <a:endParaRPr lang="en-US"/>
           </a:p>
         </p:txBody>
       </p:sp>
@@ -951,8 +894,8 @@
         </p:nvSpPr>
         <p:spPr>
           <a:xfrm>
-            <a:off x="722313" y="2906713"/>
-            <a:ext cx="7772400" cy="1500187"/>
+            <a:off x="722313" y="2180035"/>
+            <a:ext cx="7772400" cy="1125140"/>
           </a:xfrm>
         </p:spPr>
         <p:txBody>
@@ -1052,30 +995,30 @@
           <a:p>
             <a:pPr lvl="0"/>
             <a:r>
+              <a:rPr lang="en-US"/>
+              <a:t>Click to edit Master text styles</a:t>
+            </a:r>
+          </a:p>
+        </p:txBody>
+      </p:sp>
+      <p:sp>
+        <p:nvSpPr>
+          <p:cNvPr id="4" name="Date Placeholder 3"/>
+          <p:cNvSpPr>
+            <a:spLocks noGrp="1"/>
+          </p:cNvSpPr>
+          <p:nvPr>
+            <p:ph type="dt" sz="half" idx="10"/>
+          </p:nvPr>
+        </p:nvSpPr>
+        <p:spPr/>
+        <p:txBody>
+          <a:bodyPr/>
+          <a:lstStyle/>
+          <a:p>
+            <a:fld id="{CC5155F2-B992-344D-B599-BA130F7AC538}" type="datetimeFigureOut">
               <a:rPr lang="en-US" smtClean="0"/>
-              <a:t>Click to edit Master text styles</a:t>
-            </a:r>
-          </a:p>
-        </p:txBody>
-      </p:sp>
-      <p:sp>
-        <p:nvSpPr>
-          <p:cNvPr id="4" name="Date Placeholder 3"/>
-          <p:cNvSpPr>
-            <a:spLocks noGrp="1"/>
-          </p:cNvSpPr>
-          <p:nvPr>
-            <p:ph type="dt" sz="half" idx="10"/>
-          </p:nvPr>
-        </p:nvSpPr>
-        <p:spPr/>
-        <p:txBody>
-          <a:bodyPr/>
-          <a:lstStyle/>
-          <a:p>
-            <a:fld id="{241EB5C9-1307-BA42-ABA2-0BC069CD8E7F}" type="datetimeFigureOut">
-              <a:rPr lang="en-US" smtClean="0"/>
-              <a:t>4/5/2019</a:t>
+              <a:t>2020-03-03</a:t>
             </a:fld>
             <a:endParaRPr lang="en-US"/>
           </a:p>
@@ -1115,7 +1058,7 @@
           <a:bodyPr/>
           <a:lstStyle/>
           <a:p>
-            <a:fld id="{C5EF2332-01BF-834F-8236-50238282D533}" type="slidenum">
+            <a:fld id="{90947476-F6E0-2F4C-97C9-975E697FF5F2}" type="slidenum">
               <a:rPr lang="en-US" smtClean="0"/>
               <a:t>‹#›</a:t>
             </a:fld>
@@ -1126,7 +1069,7 @@
     </p:spTree>
     <p:extLst>
       <p:ext uri="{BB962C8B-B14F-4D97-AF65-F5344CB8AC3E}">
-        <p14:creationId xmlns:p14="http://schemas.microsoft.com/office/powerpoint/2010/main" val="1073069076"/>
+        <p14:creationId xmlns:p14="http://schemas.microsoft.com/office/powerpoint/2010/main" val="2211412545"/>
       </p:ext>
     </p:extLst>
   </p:cSld>
@@ -1169,10 +1112,9 @@
           <a:lstStyle/>
           <a:p>
             <a:r>
-              <a:rPr lang="en-US" smtClean="0"/>
+              <a:rPr lang="en-US"/>
               <a:t>Click to edit Master title style</a:t>
             </a:r>
-            <a:endParaRPr lang="en-US"/>
           </a:p>
         </p:txBody>
       </p:sp>
@@ -1188,8 +1130,8 @@
         </p:nvSpPr>
         <p:spPr>
           <a:xfrm>
-            <a:off x="457200" y="1600200"/>
-            <a:ext cx="4038600" cy="4525963"/>
+            <a:off x="457200" y="1200151"/>
+            <a:ext cx="4038600" cy="3394472"/>
           </a:xfrm>
         </p:spPr>
         <p:txBody>
@@ -1226,38 +1168,37 @@
           <a:p>
             <a:pPr lvl="0"/>
             <a:r>
-              <a:rPr lang="en-US" smtClean="0"/>
+              <a:rPr lang="en-US"/>
               <a:t>Click to edit Master text styles</a:t>
             </a:r>
           </a:p>
           <a:p>
             <a:pPr lvl="1"/>
             <a:r>
-              <a:rPr lang="en-US" smtClean="0"/>
+              <a:rPr lang="en-US"/>
               <a:t>Second level</a:t>
             </a:r>
           </a:p>
           <a:p>
             <a:pPr lvl="2"/>
             <a:r>
-              <a:rPr lang="en-US" smtClean="0"/>
+              <a:rPr lang="en-US"/>
               <a:t>Third level</a:t>
             </a:r>
           </a:p>
           <a:p>
             <a:pPr lvl="3"/>
             <a:r>
-              <a:rPr lang="en-US" smtClean="0"/>
+              <a:rPr lang="en-US"/>
               <a:t>Fourth level</a:t>
             </a:r>
           </a:p>
           <a:p>
             <a:pPr lvl="4"/>
             <a:r>
-              <a:rPr lang="en-US" smtClean="0"/>
+              <a:rPr lang="en-US"/>
               <a:t>Fifth level</a:t>
             </a:r>
-            <a:endParaRPr lang="en-US"/>
           </a:p>
         </p:txBody>
       </p:sp>
@@ -1273,8 +1214,8 @@
         </p:nvSpPr>
         <p:spPr>
           <a:xfrm>
-            <a:off x="4648200" y="1600200"/>
-            <a:ext cx="4038600" cy="4525963"/>
+            <a:off x="4648200" y="1200151"/>
+            <a:ext cx="4038600" cy="3394472"/>
           </a:xfrm>
         </p:spPr>
         <p:txBody>
@@ -1311,59 +1252,58 @@
           <a:p>
             <a:pPr lvl="0"/>
             <a:r>
+              <a:rPr lang="en-US"/>
+              <a:t>Click to edit Master text styles</a:t>
+            </a:r>
+          </a:p>
+          <a:p>
+            <a:pPr lvl="1"/>
+            <a:r>
+              <a:rPr lang="en-US"/>
+              <a:t>Second level</a:t>
+            </a:r>
+          </a:p>
+          <a:p>
+            <a:pPr lvl="2"/>
+            <a:r>
+              <a:rPr lang="en-US"/>
+              <a:t>Third level</a:t>
+            </a:r>
+          </a:p>
+          <a:p>
+            <a:pPr lvl="3"/>
+            <a:r>
+              <a:rPr lang="en-US"/>
+              <a:t>Fourth level</a:t>
+            </a:r>
+          </a:p>
+          <a:p>
+            <a:pPr lvl="4"/>
+            <a:r>
+              <a:rPr lang="en-US"/>
+              <a:t>Fifth level</a:t>
+            </a:r>
+          </a:p>
+        </p:txBody>
+      </p:sp>
+      <p:sp>
+        <p:nvSpPr>
+          <p:cNvPr id="5" name="Date Placeholder 4"/>
+          <p:cNvSpPr>
+            <a:spLocks noGrp="1"/>
+          </p:cNvSpPr>
+          <p:nvPr>
+            <p:ph type="dt" sz="half" idx="10"/>
+          </p:nvPr>
+        </p:nvSpPr>
+        <p:spPr/>
+        <p:txBody>
+          <a:bodyPr/>
+          <a:lstStyle/>
+          <a:p>
+            <a:fld id="{CC5155F2-B992-344D-B599-BA130F7AC538}" type="datetimeFigureOut">
               <a:rPr lang="en-US" smtClean="0"/>
-              <a:t>Click to edit Master text styles</a:t>
-            </a:r>
-          </a:p>
-          <a:p>
-            <a:pPr lvl="1"/>
-            <a:r>
-              <a:rPr lang="en-US" smtClean="0"/>
-              <a:t>Second level</a:t>
-            </a:r>
-          </a:p>
-          <a:p>
-            <a:pPr lvl="2"/>
-            <a:r>
-              <a:rPr lang="en-US" smtClean="0"/>
-              <a:t>Third level</a:t>
-            </a:r>
-          </a:p>
-          <a:p>
-            <a:pPr lvl="3"/>
-            <a:r>
-              <a:rPr lang="en-US" smtClean="0"/>
-              <a:t>Fourth level</a:t>
-            </a:r>
-          </a:p>
-          <a:p>
-            <a:pPr lvl="4"/>
-            <a:r>
-              <a:rPr lang="en-US" smtClean="0"/>
-              <a:t>Fifth level</a:t>
-            </a:r>
-            <a:endParaRPr lang="en-US"/>
-          </a:p>
-        </p:txBody>
-      </p:sp>
-      <p:sp>
-        <p:nvSpPr>
-          <p:cNvPr id="5" name="Date Placeholder 4"/>
-          <p:cNvSpPr>
-            <a:spLocks noGrp="1"/>
-          </p:cNvSpPr>
-          <p:nvPr>
-            <p:ph type="dt" sz="half" idx="10"/>
-          </p:nvPr>
-        </p:nvSpPr>
-        <p:spPr/>
-        <p:txBody>
-          <a:bodyPr/>
-          <a:lstStyle/>
-          <a:p>
-            <a:fld id="{241EB5C9-1307-BA42-ABA2-0BC069CD8E7F}" type="datetimeFigureOut">
-              <a:rPr lang="en-US" smtClean="0"/>
-              <a:t>4/5/2019</a:t>
+              <a:t>2020-03-03</a:t>
             </a:fld>
             <a:endParaRPr lang="en-US"/>
           </a:p>
@@ -1403,7 +1343,7 @@
           <a:bodyPr/>
           <a:lstStyle/>
           <a:p>
-            <a:fld id="{C5EF2332-01BF-834F-8236-50238282D533}" type="slidenum">
+            <a:fld id="{90947476-F6E0-2F4C-97C9-975E697FF5F2}" type="slidenum">
               <a:rPr lang="en-US" smtClean="0"/>
               <a:t>‹#›</a:t>
             </a:fld>
@@ -1414,7 +1354,7 @@
     </p:spTree>
     <p:extLst>
       <p:ext uri="{BB962C8B-B14F-4D97-AF65-F5344CB8AC3E}">
-        <p14:creationId xmlns:p14="http://schemas.microsoft.com/office/powerpoint/2010/main" val="2619886245"/>
+        <p14:creationId xmlns:p14="http://schemas.microsoft.com/office/powerpoint/2010/main" val="2255295053"/>
       </p:ext>
     </p:extLst>
   </p:cSld>
@@ -1461,10 +1401,9 @@
           </a:lstStyle>
           <a:p>
             <a:r>
-              <a:rPr lang="en-US" smtClean="0"/>
+              <a:rPr lang="en-US"/>
               <a:t>Click to edit Master title style</a:t>
             </a:r>
-            <a:endParaRPr lang="en-US"/>
           </a:p>
         </p:txBody>
       </p:sp>
@@ -1480,8 +1419,8 @@
         </p:nvSpPr>
         <p:spPr>
           <a:xfrm>
-            <a:off x="457200" y="1535113"/>
-            <a:ext cx="4040188" cy="639762"/>
+            <a:off x="457200" y="1151335"/>
+            <a:ext cx="4040188" cy="479822"/>
           </a:xfrm>
         </p:spPr>
         <p:txBody>
@@ -1527,7 +1466,7 @@
           <a:p>
             <a:pPr lvl="0"/>
             <a:r>
-              <a:rPr lang="en-US" smtClean="0"/>
+              <a:rPr lang="en-US"/>
               <a:t>Click to edit Master text styles</a:t>
             </a:r>
           </a:p>
@@ -1545,8 +1484,8 @@
         </p:nvSpPr>
         <p:spPr>
           <a:xfrm>
-            <a:off x="457200" y="2174875"/>
-            <a:ext cx="4040188" cy="3951288"/>
+            <a:off x="457200" y="1631156"/>
+            <a:ext cx="4040188" cy="2963466"/>
           </a:xfrm>
         </p:spPr>
         <p:txBody>
@@ -1583,38 +1522,37 @@
           <a:p>
             <a:pPr lvl="0"/>
             <a:r>
-              <a:rPr lang="en-US" smtClean="0"/>
+              <a:rPr lang="en-US"/>
               <a:t>Click to edit Master text styles</a:t>
             </a:r>
           </a:p>
           <a:p>
             <a:pPr lvl="1"/>
             <a:r>
-              <a:rPr lang="en-US" smtClean="0"/>
+              <a:rPr lang="en-US"/>
               <a:t>Second level</a:t>
             </a:r>
           </a:p>
           <a:p>
             <a:pPr lvl="2"/>
             <a:r>
-              <a:rPr lang="en-US" smtClean="0"/>
+              <a:rPr lang="en-US"/>
               <a:t>Third level</a:t>
             </a:r>
           </a:p>
           <a:p>
             <a:pPr lvl="3"/>
             <a:r>
-              <a:rPr lang="en-US" smtClean="0"/>
+              <a:rPr lang="en-US"/>
               <a:t>Fourth level</a:t>
             </a:r>
           </a:p>
           <a:p>
             <a:pPr lvl="4"/>
             <a:r>
-              <a:rPr lang="en-US" smtClean="0"/>
+              <a:rPr lang="en-US"/>
               <a:t>Fifth level</a:t>
             </a:r>
-            <a:endParaRPr lang="en-US"/>
           </a:p>
         </p:txBody>
       </p:sp>
@@ -1630,8 +1568,8 @@
         </p:nvSpPr>
         <p:spPr>
           <a:xfrm>
-            <a:off x="4645025" y="1535113"/>
-            <a:ext cx="4041775" cy="639762"/>
+            <a:off x="4645026" y="1151335"/>
+            <a:ext cx="4041775" cy="479822"/>
           </a:xfrm>
         </p:spPr>
         <p:txBody>
@@ -1677,7 +1615,7 @@
           <a:p>
             <a:pPr lvl="0"/>
             <a:r>
-              <a:rPr lang="en-US" smtClean="0"/>
+              <a:rPr lang="en-US"/>
               <a:t>Click to edit Master text styles</a:t>
             </a:r>
           </a:p>
@@ -1695,8 +1633,8 @@
         </p:nvSpPr>
         <p:spPr>
           <a:xfrm>
-            <a:off x="4645025" y="2174875"/>
-            <a:ext cx="4041775" cy="3951288"/>
+            <a:off x="4645026" y="1631156"/>
+            <a:ext cx="4041775" cy="2963466"/>
           </a:xfrm>
         </p:spPr>
         <p:txBody>
@@ -1733,59 +1671,58 @@
           <a:p>
             <a:pPr lvl="0"/>
             <a:r>
+              <a:rPr lang="en-US"/>
+              <a:t>Click to edit Master text styles</a:t>
+            </a:r>
+          </a:p>
+          <a:p>
+            <a:pPr lvl="1"/>
+            <a:r>
+              <a:rPr lang="en-US"/>
+              <a:t>Second level</a:t>
+            </a:r>
+          </a:p>
+          <a:p>
+            <a:pPr lvl="2"/>
+            <a:r>
+              <a:rPr lang="en-US"/>
+              <a:t>Third level</a:t>
+            </a:r>
+          </a:p>
+          <a:p>
+            <a:pPr lvl="3"/>
+            <a:r>
+              <a:rPr lang="en-US"/>
+              <a:t>Fourth level</a:t>
+            </a:r>
+          </a:p>
+          <a:p>
+            <a:pPr lvl="4"/>
+            <a:r>
+              <a:rPr lang="en-US"/>
+              <a:t>Fifth level</a:t>
+            </a:r>
+          </a:p>
+        </p:txBody>
+      </p:sp>
+      <p:sp>
+        <p:nvSpPr>
+          <p:cNvPr id="7" name="Date Placeholder 6"/>
+          <p:cNvSpPr>
+            <a:spLocks noGrp="1"/>
+          </p:cNvSpPr>
+          <p:nvPr>
+            <p:ph type="dt" sz="half" idx="10"/>
+          </p:nvPr>
+        </p:nvSpPr>
+        <p:spPr/>
+        <p:txBody>
+          <a:bodyPr/>
+          <a:lstStyle/>
+          <a:p>
+            <a:fld id="{CC5155F2-B992-344D-B599-BA130F7AC538}" type="datetimeFigureOut">
               <a:rPr lang="en-US" smtClean="0"/>
-              <a:t>Click to edit Master text styles</a:t>
-            </a:r>
-          </a:p>
-          <a:p>
-            <a:pPr lvl="1"/>
-            <a:r>
-              <a:rPr lang="en-US" smtClean="0"/>
-              <a:t>Second level</a:t>
-            </a:r>
-          </a:p>
-          <a:p>
-            <a:pPr lvl="2"/>
-            <a:r>
-              <a:rPr lang="en-US" smtClean="0"/>
-              <a:t>Third level</a:t>
-            </a:r>
-          </a:p>
-          <a:p>
-            <a:pPr lvl="3"/>
-            <a:r>
-              <a:rPr lang="en-US" smtClean="0"/>
-              <a:t>Fourth level</a:t>
-            </a:r>
-          </a:p>
-          <a:p>
-            <a:pPr lvl="4"/>
-            <a:r>
-              <a:rPr lang="en-US" smtClean="0"/>
-              <a:t>Fifth level</a:t>
-            </a:r>
-            <a:endParaRPr lang="en-US"/>
-          </a:p>
-        </p:txBody>
-      </p:sp>
-      <p:sp>
-        <p:nvSpPr>
-          <p:cNvPr id="7" name="Date Placeholder 6"/>
-          <p:cNvSpPr>
-            <a:spLocks noGrp="1"/>
-          </p:cNvSpPr>
-          <p:nvPr>
-            <p:ph type="dt" sz="half" idx="10"/>
-          </p:nvPr>
-        </p:nvSpPr>
-        <p:spPr/>
-        <p:txBody>
-          <a:bodyPr/>
-          <a:lstStyle/>
-          <a:p>
-            <a:fld id="{241EB5C9-1307-BA42-ABA2-0BC069CD8E7F}" type="datetimeFigureOut">
-              <a:rPr lang="en-US" smtClean="0"/>
-              <a:t>4/5/2019</a:t>
+              <a:t>2020-03-03</a:t>
             </a:fld>
             <a:endParaRPr lang="en-US"/>
           </a:p>
@@ -1825,7 +1762,7 @@
           <a:bodyPr/>
           <a:lstStyle/>
           <a:p>
-            <a:fld id="{C5EF2332-01BF-834F-8236-50238282D533}" type="slidenum">
+            <a:fld id="{90947476-F6E0-2F4C-97C9-975E697FF5F2}" type="slidenum">
               <a:rPr lang="en-US" smtClean="0"/>
               <a:t>‹#›</a:t>
             </a:fld>
@@ -1836,7 +1773,7 @@
     </p:spTree>
     <p:extLst>
       <p:ext uri="{BB962C8B-B14F-4D97-AF65-F5344CB8AC3E}">
-        <p14:creationId xmlns:p14="http://schemas.microsoft.com/office/powerpoint/2010/main" val="2535793967"/>
+        <p14:creationId xmlns:p14="http://schemas.microsoft.com/office/powerpoint/2010/main" val="2062360993"/>
       </p:ext>
     </p:extLst>
   </p:cSld>
@@ -1879,31 +1816,30 @@
           <a:lstStyle/>
           <a:p>
             <a:r>
+              <a:rPr lang="en-US"/>
+              <a:t>Click to edit Master title style</a:t>
+            </a:r>
+          </a:p>
+        </p:txBody>
+      </p:sp>
+      <p:sp>
+        <p:nvSpPr>
+          <p:cNvPr id="3" name="Date Placeholder 2"/>
+          <p:cNvSpPr>
+            <a:spLocks noGrp="1"/>
+          </p:cNvSpPr>
+          <p:nvPr>
+            <p:ph type="dt" sz="half" idx="10"/>
+          </p:nvPr>
+        </p:nvSpPr>
+        <p:spPr/>
+        <p:txBody>
+          <a:bodyPr/>
+          <a:lstStyle/>
+          <a:p>
+            <a:fld id="{CC5155F2-B992-344D-B599-BA130F7AC538}" type="datetimeFigureOut">
               <a:rPr lang="en-US" smtClean="0"/>
-              <a:t>Click to edit Master title style</a:t>
-            </a:r>
-            <a:endParaRPr lang="en-US"/>
-          </a:p>
-        </p:txBody>
-      </p:sp>
-      <p:sp>
-        <p:nvSpPr>
-          <p:cNvPr id="3" name="Date Placeholder 2"/>
-          <p:cNvSpPr>
-            <a:spLocks noGrp="1"/>
-          </p:cNvSpPr>
-          <p:nvPr>
-            <p:ph type="dt" sz="half" idx="10"/>
-          </p:nvPr>
-        </p:nvSpPr>
-        <p:spPr/>
-        <p:txBody>
-          <a:bodyPr/>
-          <a:lstStyle/>
-          <a:p>
-            <a:fld id="{241EB5C9-1307-BA42-ABA2-0BC069CD8E7F}" type="datetimeFigureOut">
-              <a:rPr lang="en-US" smtClean="0"/>
-              <a:t>4/5/2019</a:t>
+              <a:t>2020-03-03</a:t>
             </a:fld>
             <a:endParaRPr lang="en-US"/>
           </a:p>
@@ -1943,7 +1879,7 @@
           <a:bodyPr/>
           <a:lstStyle/>
           <a:p>
-            <a:fld id="{C5EF2332-01BF-834F-8236-50238282D533}" type="slidenum">
+            <a:fld id="{90947476-F6E0-2F4C-97C9-975E697FF5F2}" type="slidenum">
               <a:rPr lang="en-US" smtClean="0"/>
               <a:t>‹#›</a:t>
             </a:fld>
@@ -1954,7 +1890,7 @@
     </p:spTree>
     <p:extLst>
       <p:ext uri="{BB962C8B-B14F-4D97-AF65-F5344CB8AC3E}">
-        <p14:creationId xmlns:p14="http://schemas.microsoft.com/office/powerpoint/2010/main" val="3472721253"/>
+        <p14:creationId xmlns:p14="http://schemas.microsoft.com/office/powerpoint/2010/main" val="3288444297"/>
       </p:ext>
     </p:extLst>
   </p:cSld>
@@ -1996,9 +1932,9 @@
           <a:bodyPr/>
           <a:lstStyle/>
           <a:p>
-            <a:fld id="{241EB5C9-1307-BA42-ABA2-0BC069CD8E7F}" type="datetimeFigureOut">
+            <a:fld id="{CC5155F2-B992-344D-B599-BA130F7AC538}" type="datetimeFigureOut">
               <a:rPr lang="en-US" smtClean="0"/>
-              <a:t>4/5/2019</a:t>
+              <a:t>2020-03-03</a:t>
             </a:fld>
             <a:endParaRPr lang="en-US"/>
           </a:p>
@@ -2038,7 +1974,7 @@
           <a:bodyPr/>
           <a:lstStyle/>
           <a:p>
-            <a:fld id="{C5EF2332-01BF-834F-8236-50238282D533}" type="slidenum">
+            <a:fld id="{90947476-F6E0-2F4C-97C9-975E697FF5F2}" type="slidenum">
               <a:rPr lang="en-US" smtClean="0"/>
               <a:t>‹#›</a:t>
             </a:fld>
@@ -2049,7 +1985,7 @@
     </p:spTree>
     <p:extLst>
       <p:ext uri="{BB962C8B-B14F-4D97-AF65-F5344CB8AC3E}">
-        <p14:creationId xmlns:p14="http://schemas.microsoft.com/office/powerpoint/2010/main" val="2130901097"/>
+        <p14:creationId xmlns:p14="http://schemas.microsoft.com/office/powerpoint/2010/main" val="3681898821"/>
       </p:ext>
     </p:extLst>
   </p:cSld>
@@ -2088,8 +2024,8 @@
         </p:nvSpPr>
         <p:spPr>
           <a:xfrm>
-            <a:off x="457200" y="273050"/>
-            <a:ext cx="3008313" cy="1162050"/>
+            <a:off x="457201" y="204787"/>
+            <a:ext cx="3008313" cy="871538"/>
           </a:xfrm>
         </p:spPr>
         <p:txBody>
@@ -2101,10 +2037,9 @@
           </a:lstStyle>
           <a:p>
             <a:r>
-              <a:rPr lang="en-US" smtClean="0"/>
+              <a:rPr lang="en-US"/>
               <a:t>Click to edit Master title style</a:t>
             </a:r>
-            <a:endParaRPr lang="en-US"/>
           </a:p>
         </p:txBody>
       </p:sp>
@@ -2120,8 +2055,8 @@
         </p:nvSpPr>
         <p:spPr>
           <a:xfrm>
-            <a:off x="3575050" y="273050"/>
-            <a:ext cx="5111750" cy="5853113"/>
+            <a:off x="3575050" y="204788"/>
+            <a:ext cx="5111750" cy="4389835"/>
           </a:xfrm>
         </p:spPr>
         <p:txBody>
@@ -2158,38 +2093,37 @@
           <a:p>
             <a:pPr lvl="0"/>
             <a:r>
-              <a:rPr lang="en-US" smtClean="0"/>
+              <a:rPr lang="en-US"/>
               <a:t>Click to edit Master text styles</a:t>
             </a:r>
           </a:p>
           <a:p>
             <a:pPr lvl="1"/>
             <a:r>
-              <a:rPr lang="en-US" smtClean="0"/>
+              <a:rPr lang="en-US"/>
               <a:t>Second level</a:t>
             </a:r>
           </a:p>
           <a:p>
             <a:pPr lvl="2"/>
             <a:r>
-              <a:rPr lang="en-US" smtClean="0"/>
+              <a:rPr lang="en-US"/>
               <a:t>Third level</a:t>
             </a:r>
           </a:p>
           <a:p>
             <a:pPr lvl="3"/>
             <a:r>
-              <a:rPr lang="en-US" smtClean="0"/>
+              <a:rPr lang="en-US"/>
               <a:t>Fourth level</a:t>
             </a:r>
           </a:p>
           <a:p>
             <a:pPr lvl="4"/>
             <a:r>
-              <a:rPr lang="en-US" smtClean="0"/>
+              <a:rPr lang="en-US"/>
               <a:t>Fifth level</a:t>
             </a:r>
-            <a:endParaRPr lang="en-US"/>
           </a:p>
         </p:txBody>
       </p:sp>
@@ -2205,8 +2139,8 @@
         </p:nvSpPr>
         <p:spPr>
           <a:xfrm>
-            <a:off x="457200" y="1435100"/>
-            <a:ext cx="3008313" cy="4691063"/>
+            <a:off x="457201" y="1076326"/>
+            <a:ext cx="3008313" cy="3518297"/>
           </a:xfrm>
         </p:spPr>
         <p:txBody>
@@ -2252,30 +2186,30 @@
           <a:p>
             <a:pPr lvl="0"/>
             <a:r>
+              <a:rPr lang="en-US"/>
+              <a:t>Click to edit Master text styles</a:t>
+            </a:r>
+          </a:p>
+        </p:txBody>
+      </p:sp>
+      <p:sp>
+        <p:nvSpPr>
+          <p:cNvPr id="5" name="Date Placeholder 4"/>
+          <p:cNvSpPr>
+            <a:spLocks noGrp="1"/>
+          </p:cNvSpPr>
+          <p:nvPr>
+            <p:ph type="dt" sz="half" idx="10"/>
+          </p:nvPr>
+        </p:nvSpPr>
+        <p:spPr/>
+        <p:txBody>
+          <a:bodyPr/>
+          <a:lstStyle/>
+          <a:p>
+            <a:fld id="{CC5155F2-B992-344D-B599-BA130F7AC538}" type="datetimeFigureOut">
               <a:rPr lang="en-US" smtClean="0"/>
-              <a:t>Click to edit Master text styles</a:t>
-            </a:r>
-          </a:p>
-        </p:txBody>
-      </p:sp>
-      <p:sp>
-        <p:nvSpPr>
-          <p:cNvPr id="5" name="Date Placeholder 4"/>
-          <p:cNvSpPr>
-            <a:spLocks noGrp="1"/>
-          </p:cNvSpPr>
-          <p:nvPr>
-            <p:ph type="dt" sz="half" idx="10"/>
-          </p:nvPr>
-        </p:nvSpPr>
-        <p:spPr/>
-        <p:txBody>
-          <a:bodyPr/>
-          <a:lstStyle/>
-          <a:p>
-            <a:fld id="{241EB5C9-1307-BA42-ABA2-0BC069CD8E7F}" type="datetimeFigureOut">
-              <a:rPr lang="en-US" smtClean="0"/>
-              <a:t>4/5/2019</a:t>
+              <a:t>2020-03-03</a:t>
             </a:fld>
             <a:endParaRPr lang="en-US"/>
           </a:p>
@@ -2315,7 +2249,7 @@
           <a:bodyPr/>
           <a:lstStyle/>
           <a:p>
-            <a:fld id="{C5EF2332-01BF-834F-8236-50238282D533}" type="slidenum">
+            <a:fld id="{90947476-F6E0-2F4C-97C9-975E697FF5F2}" type="slidenum">
               <a:rPr lang="en-US" smtClean="0"/>
               <a:t>‹#›</a:t>
             </a:fld>
@@ -2326,7 +2260,7 @@
     </p:spTree>
     <p:extLst>
       <p:ext uri="{BB962C8B-B14F-4D97-AF65-F5344CB8AC3E}">
-        <p14:creationId xmlns:p14="http://schemas.microsoft.com/office/powerpoint/2010/main" val="3540895647"/>
+        <p14:creationId xmlns:p14="http://schemas.microsoft.com/office/powerpoint/2010/main" val="2010087523"/>
       </p:ext>
     </p:extLst>
   </p:cSld>
@@ -2365,8 +2299,8 @@
         </p:nvSpPr>
         <p:spPr>
           <a:xfrm>
-            <a:off x="1792288" y="4800600"/>
-            <a:ext cx="5486400" cy="566738"/>
+            <a:off x="1792288" y="3600450"/>
+            <a:ext cx="5486400" cy="425054"/>
           </a:xfrm>
         </p:spPr>
         <p:txBody>
@@ -2378,10 +2312,9 @@
           </a:lstStyle>
           <a:p>
             <a:r>
-              <a:rPr lang="en-US" smtClean="0"/>
+              <a:rPr lang="en-US"/>
               <a:t>Click to edit Master title style</a:t>
             </a:r>
-            <a:endParaRPr lang="en-US"/>
           </a:p>
         </p:txBody>
       </p:sp>
@@ -2397,8 +2330,8 @@
         </p:nvSpPr>
         <p:spPr>
           <a:xfrm>
-            <a:off x="1792288" y="612775"/>
-            <a:ext cx="5486400" cy="4114800"/>
+            <a:off x="1792288" y="459581"/>
+            <a:ext cx="5486400" cy="3086100"/>
           </a:xfrm>
         </p:spPr>
         <p:txBody>
@@ -2458,8 +2391,8 @@
         </p:nvSpPr>
         <p:spPr>
           <a:xfrm>
-            <a:off x="1792288" y="5367338"/>
-            <a:ext cx="5486400" cy="804862"/>
+            <a:off x="1792288" y="4025503"/>
+            <a:ext cx="5486400" cy="603647"/>
           </a:xfrm>
         </p:spPr>
         <p:txBody>
@@ -2505,30 +2438,30 @@
           <a:p>
             <a:pPr lvl="0"/>
             <a:r>
+              <a:rPr lang="en-US"/>
+              <a:t>Click to edit Master text styles</a:t>
+            </a:r>
+          </a:p>
+        </p:txBody>
+      </p:sp>
+      <p:sp>
+        <p:nvSpPr>
+          <p:cNvPr id="5" name="Date Placeholder 4"/>
+          <p:cNvSpPr>
+            <a:spLocks noGrp="1"/>
+          </p:cNvSpPr>
+          <p:nvPr>
+            <p:ph type="dt" sz="half" idx="10"/>
+          </p:nvPr>
+        </p:nvSpPr>
+        <p:spPr/>
+        <p:txBody>
+          <a:bodyPr/>
+          <a:lstStyle/>
+          <a:p>
+            <a:fld id="{CC5155F2-B992-344D-B599-BA130F7AC538}" type="datetimeFigureOut">
               <a:rPr lang="en-US" smtClean="0"/>
-              <a:t>Click to edit Master text styles</a:t>
-            </a:r>
-          </a:p>
-        </p:txBody>
-      </p:sp>
-      <p:sp>
-        <p:nvSpPr>
-          <p:cNvPr id="5" name="Date Placeholder 4"/>
-          <p:cNvSpPr>
-            <a:spLocks noGrp="1"/>
-          </p:cNvSpPr>
-          <p:nvPr>
-            <p:ph type="dt" sz="half" idx="10"/>
-          </p:nvPr>
-        </p:nvSpPr>
-        <p:spPr/>
-        <p:txBody>
-          <a:bodyPr/>
-          <a:lstStyle/>
-          <a:p>
-            <a:fld id="{241EB5C9-1307-BA42-ABA2-0BC069CD8E7F}" type="datetimeFigureOut">
-              <a:rPr lang="en-US" smtClean="0"/>
-              <a:t>4/5/2019</a:t>
+              <a:t>2020-03-03</a:t>
             </a:fld>
             <a:endParaRPr lang="en-US"/>
           </a:p>
@@ -2568,7 +2501,7 @@
           <a:bodyPr/>
           <a:lstStyle/>
           <a:p>
-            <a:fld id="{C5EF2332-01BF-834F-8236-50238282D533}" type="slidenum">
+            <a:fld id="{90947476-F6E0-2F4C-97C9-975E697FF5F2}" type="slidenum">
               <a:rPr lang="en-US" smtClean="0"/>
               <a:t>‹#›</a:t>
             </a:fld>
@@ -2579,7 +2512,7 @@
     </p:spTree>
     <p:extLst>
       <p:ext uri="{BB962C8B-B14F-4D97-AF65-F5344CB8AC3E}">
-        <p14:creationId xmlns:p14="http://schemas.microsoft.com/office/powerpoint/2010/main" val="3566899855"/>
+        <p14:creationId xmlns:p14="http://schemas.microsoft.com/office/powerpoint/2010/main" val="789328968"/>
       </p:ext>
     </p:extLst>
   </p:cSld>
@@ -2623,8 +2556,8 @@
         </p:nvSpPr>
         <p:spPr>
           <a:xfrm>
-            <a:off x="457200" y="274638"/>
-            <a:ext cx="8229600" cy="1143000"/>
+            <a:off x="457200" y="205979"/>
+            <a:ext cx="8229600" cy="857250"/>
           </a:xfrm>
           <a:prstGeom prst="rect">
             <a:avLst/>
@@ -2637,10 +2570,9 @@
           <a:lstStyle/>
           <a:p>
             <a:r>
-              <a:rPr lang="en-US" smtClean="0"/>
+              <a:rPr lang="en-US"/>
               <a:t>Click to edit Master title style</a:t>
             </a:r>
-            <a:endParaRPr lang="en-US"/>
           </a:p>
         </p:txBody>
       </p:sp>
@@ -2656,8 +2588,8 @@
         </p:nvSpPr>
         <p:spPr>
           <a:xfrm>
-            <a:off x="457200" y="1600200"/>
-            <a:ext cx="8229600" cy="4525963"/>
+            <a:off x="457200" y="1200151"/>
+            <a:ext cx="8229600" cy="3394472"/>
           </a:xfrm>
           <a:prstGeom prst="rect">
             <a:avLst/>
@@ -2671,38 +2603,37 @@
           <a:p>
             <a:pPr lvl="0"/>
             <a:r>
-              <a:rPr lang="en-US" smtClean="0"/>
+              <a:rPr lang="en-US"/>
               <a:t>Click to edit Master text styles</a:t>
             </a:r>
           </a:p>
           <a:p>
             <a:pPr lvl="1"/>
             <a:r>
-              <a:rPr lang="en-US" smtClean="0"/>
+              <a:rPr lang="en-US"/>
               <a:t>Second level</a:t>
             </a:r>
           </a:p>
           <a:p>
             <a:pPr lvl="2"/>
             <a:r>
-              <a:rPr lang="en-US" smtClean="0"/>
+              <a:rPr lang="en-US"/>
               <a:t>Third level</a:t>
             </a:r>
           </a:p>
           <a:p>
             <a:pPr lvl="3"/>
             <a:r>
-              <a:rPr lang="en-US" smtClean="0"/>
+              <a:rPr lang="en-US"/>
               <a:t>Fourth level</a:t>
             </a:r>
           </a:p>
           <a:p>
             <a:pPr lvl="4"/>
             <a:r>
-              <a:rPr lang="en-US" smtClean="0"/>
+              <a:rPr lang="en-US"/>
               <a:t>Fifth level</a:t>
             </a:r>
-            <a:endParaRPr lang="en-US"/>
           </a:p>
         </p:txBody>
       </p:sp>
@@ -2718,8 +2649,8 @@
         </p:nvSpPr>
         <p:spPr>
           <a:xfrm>
-            <a:off x="457200" y="6356350"/>
-            <a:ext cx="2133600" cy="365125"/>
+            <a:off x="457200" y="4767263"/>
+            <a:ext cx="2133600" cy="273844"/>
           </a:xfrm>
           <a:prstGeom prst="rect">
             <a:avLst/>
@@ -2739,9 +2670,9 @@
             </a:lvl1pPr>
           </a:lstStyle>
           <a:p>
-            <a:fld id="{241EB5C9-1307-BA42-ABA2-0BC069CD8E7F}" type="datetimeFigureOut">
+            <a:fld id="{CC5155F2-B992-344D-B599-BA130F7AC538}" type="datetimeFigureOut">
               <a:rPr lang="en-US" smtClean="0"/>
-              <a:t>4/5/2019</a:t>
+              <a:t>2020-03-03</a:t>
             </a:fld>
             <a:endParaRPr lang="en-US"/>
           </a:p>
@@ -2759,8 +2690,8 @@
         </p:nvSpPr>
         <p:spPr>
           <a:xfrm>
-            <a:off x="3124200" y="6356350"/>
-            <a:ext cx="2895600" cy="365125"/>
+            <a:off x="3124200" y="4767263"/>
+            <a:ext cx="2895600" cy="273844"/>
           </a:xfrm>
           <a:prstGeom prst="rect">
             <a:avLst/>
@@ -2796,8 +2727,8 @@
         </p:nvSpPr>
         <p:spPr>
           <a:xfrm>
-            <a:off x="6553200" y="6356350"/>
-            <a:ext cx="2133600" cy="365125"/>
+            <a:off x="6553200" y="4767263"/>
+            <a:ext cx="2133600" cy="273844"/>
           </a:xfrm>
           <a:prstGeom prst="rect">
             <a:avLst/>
@@ -2817,7 +2748,7 @@
             </a:lvl1pPr>
           </a:lstStyle>
           <a:p>
-            <a:fld id="{C5EF2332-01BF-834F-8236-50238282D533}" type="slidenum">
+            <a:fld id="{90947476-F6E0-2F4C-97C9-975E697FF5F2}" type="slidenum">
               <a:rPr lang="en-US" smtClean="0"/>
               <a:t>‹#›</a:t>
             </a:fld>
@@ -2828,7 +2759,7 @@
     </p:spTree>
     <p:extLst>
       <p:ext uri="{BB962C8B-B14F-4D97-AF65-F5344CB8AC3E}">
-        <p14:creationId xmlns:p14="http://schemas.microsoft.com/office/powerpoint/2010/main" val="3676200875"/>
+        <p14:creationId xmlns:p14="http://schemas.microsoft.com/office/powerpoint/2010/main" val="1101409942"/>
       </p:ext>
     </p:extLst>
   </p:cSld>
@@ -3128,8 +3059,8 @@
         </p:nvSpPr>
         <p:spPr>
           <a:xfrm>
-            <a:off x="685800" y="2130425"/>
-            <a:ext cx="7772400" cy="1470025"/>
+            <a:off x="685800" y="1597819"/>
+            <a:ext cx="7772400" cy="1102519"/>
           </a:xfrm>
         </p:spPr>
         <p:txBody>
@@ -3141,7 +3072,39 @@
             </a:pPr>
             <a:r>
               <a:rPr/>
-              <a:t>GiGte</a:t>
+              <a:t>Start</a:t>
+            </a:r>
+            <a:r>
+              <a:rPr/>
+              <a:t> </a:t>
+            </a:r>
+            <a:r>
+              <a:rPr/>
+              <a:t>Writing</a:t>
+            </a:r>
+            <a:r>
+              <a:rPr/>
+              <a:t> </a:t>
+            </a:r>
+            <a:r>
+              <a:rPr/>
+              <a:t>Manuscripts</a:t>
+            </a:r>
+            <a:r>
+              <a:rPr/>
+              <a:t> </a:t>
+            </a:r>
+            <a:r>
+              <a:rPr/>
+              <a:t>in</a:t>
+            </a:r>
+            <a:r>
+              <a:rPr/>
+              <a:t> </a:t>
+            </a:r>
+            <a:r>
+              <a:rPr/>
+              <a:t>Rmarkdown…</a:t>
             </a:r>
           </a:p>
         </p:txBody>
@@ -3158,8 +3121,8 @@
         </p:nvSpPr>
         <p:spPr>
           <a:xfrm>
-            <a:off x="1371600" y="3886200"/>
-            <a:ext cx="6400800" cy="1752600"/>
+            <a:off x="1371600" y="2914650"/>
+            <a:ext cx="6400800" cy="1314450"/>
           </a:xfrm>
         </p:spPr>
         <p:txBody>
@@ -3169,6 +3132,50 @@
             <a:pPr lvl="0" marL="0" indent="0">
               <a:buNone/>
             </a:pPr>
+            <a:r>
+              <a:rPr/>
+              <a:t>…especially</a:t>
+            </a:r>
+            <a:r>
+              <a:rPr/>
+              <a:t> </a:t>
+            </a:r>
+            <a:r>
+              <a:rPr/>
+              <a:t>if</a:t>
+            </a:r>
+            <a:r>
+              <a:rPr/>
+              <a:t> </a:t>
+            </a:r>
+            <a:r>
+              <a:rPr/>
+              <a:t>you</a:t>
+            </a:r>
+            <a:r>
+              <a:rPr/>
+              <a:t> </a:t>
+            </a:r>
+            <a:r>
+              <a:rPr/>
+              <a:t>already</a:t>
+            </a:r>
+            <a:r>
+              <a:rPr/>
+              <a:t> </a:t>
+            </a:r>
+            <a:r>
+              <a:rPr/>
+              <a:t>know</a:t>
+            </a:r>
+            <a:r>
+              <a:rPr/>
+              <a:t> </a:t>
+            </a:r>
+            <a:r>
+              <a:rPr/>
+              <a:t>R</a:t>
+            </a:r>
             <a:br/>
             <a:br/>
             <a:r>
@@ -3182,31 +3189,6 @@
             <a:r>
               <a:rPr/>
               <a:t>Hamlin</a:t>
-            </a:r>
-          </a:p>
-        </p:txBody>
-      </p:sp>
-      <p:sp>
-        <p:nvSpPr>
-          <p:cNvPr id="4" name="Date Placeholder 3"/>
-          <p:cNvSpPr>
-            <a:spLocks noGrp="1"/>
-          </p:cNvSpPr>
-          <p:nvPr>
-            <p:ph type="dt" sz="half" idx="10"/>
-          </p:nvPr>
-        </p:nvSpPr>
-        <p:spPr/>
-        <p:txBody>
-          <a:bodyPr/>
-          <a:lstStyle/>
-          <a:p>
-            <a:pPr lvl="0" marL="0" indent="0">
-              <a:buNone/>
-            </a:pPr>
-            <a:r>
-              <a:rPr/>
-              <a:t>3/27/2020</a:t>
             </a:r>
           </a:p>
         </p:txBody>
@@ -3245,8 +3227,8 @@
         </p:nvSpPr>
         <p:spPr>
           <a:xfrm>
-            <a:off x="722313" y="4406900"/>
-            <a:ext cx="7772400" cy="1362075"/>
+            <a:off x="457200" y="74042"/>
+            <a:ext cx="8229600" cy="363001"/>
           </a:xfrm>
         </p:spPr>
         <p:txBody>
@@ -3258,23 +3240,39 @@
             </a:pPr>
             <a:r>
               <a:rPr/>
-              <a:t>Reproduciable</a:t>
-            </a:r>
-            <a:r>
-              <a:rPr/>
-              <a:t> </a:t>
-            </a:r>
-            <a:r>
-              <a:rPr/>
-              <a:t>Research</a:t>
-            </a:r>
-            <a:r>
-              <a:rPr/>
-              <a:t> </a:t>
-            </a:r>
-            <a:r>
-              <a:rPr/>
-              <a:t>with</a:t>
+              <a:t>Highlights</a:t>
+            </a:r>
+            <a:r>
+              <a:rPr/>
+              <a:t> </a:t>
+            </a:r>
+            <a:r>
+              <a:rPr/>
+              <a:t>on</a:t>
+            </a:r>
+            <a:r>
+              <a:rPr/>
+              <a:t> </a:t>
+            </a:r>
+            <a:r>
+              <a:rPr/>
+              <a:t>our</a:t>
+            </a:r>
+            <a:r>
+              <a:rPr/>
+              <a:t> </a:t>
+            </a:r>
+            <a:r>
+              <a:rPr/>
+              <a:t>tour</a:t>
+            </a:r>
+            <a:r>
+              <a:rPr/>
+              <a:t> </a:t>
+            </a:r>
+            <a:r>
+              <a:rPr/>
+              <a:t>of</a:t>
             </a:r>
             <a:r>
               <a:rPr/>
@@ -3283,6 +3281,71 @@
             <a:r>
               <a:rPr/>
               <a:t>Rmarkdown</a:t>
+            </a:r>
+          </a:p>
+        </p:txBody>
+      </p:sp>
+      <p:sp>
+        <p:nvSpPr>
+          <p:cNvPr id="3" name="Content Placeholder 2"/>
+          <p:cNvSpPr>
+            <a:spLocks noGrp="1"/>
+          </p:cNvSpPr>
+          <p:nvPr>
+            <p:ph idx="1"/>
+          </p:nvPr>
+        </p:nvSpPr>
+        <p:spPr/>
+        <p:txBody>
+          <a:bodyPr/>
+          <a:lstStyle/>
+          <a:p>
+            <a:pPr lvl="1"/>
+            <a:r>
+              <a:rPr/>
+              <a:t>What is markdown</a:t>
+            </a:r>
+          </a:p>
+          <a:p>
+            <a:pPr lvl="1"/>
+            <a:r>
+              <a:rPr/>
+              <a:t>What is Rmarkdown</a:t>
+            </a:r>
+          </a:p>
+          <a:p>
+            <a:pPr lvl="1"/>
+            <a:r>
+              <a:rPr/>
+              <a:t>Integrating references using BibTeX</a:t>
+            </a:r>
+          </a:p>
+          <a:p>
+            <a:pPr lvl="1"/>
+            <a:r>
+              <a:rPr/>
+              <a:t>Analyses using R</a:t>
+            </a:r>
+          </a:p>
+          <a:p>
+            <a:pPr lvl="1"/>
+            <a:r>
+              <a:rPr/>
+              <a:t>Equations and other formatting with LaTeX</a:t>
+            </a:r>
+          </a:p>
+          <a:p>
+            <a:pPr lvl="1"/>
+            <a:r>
+              <a:rPr/>
+              <a:t>Formatting references using CSL files</a:t>
+            </a:r>
+          </a:p>
+          <a:p>
+            <a:pPr lvl="1"/>
+            <a:r>
+              <a:rPr/>
+              <a:t>Incorporating version control with git/github</a:t>
             </a:r>
           </a:p>
         </p:txBody>
@@ -3319,7 +3382,12 @@
             <p:ph type="title"/>
           </p:nvPr>
         </p:nvSpPr>
-        <p:spPr/>
+        <p:spPr>
+          <a:xfrm>
+            <a:off x="457200" y="74042"/>
+            <a:ext cx="8229600" cy="363001"/>
+          </a:xfrm>
+        </p:spPr>
         <p:txBody>
           <a:bodyPr/>
           <a:lstStyle/>
@@ -3329,54 +3397,14 @@
             </a:pPr>
             <a:r>
               <a:rPr/>
-              <a:t>especially</a:t>
-            </a:r>
-            <a:r>
-              <a:rPr/>
-              <a:t> </a:t>
-            </a:r>
-            <a:r>
-              <a:rPr/>
-              <a:t>if</a:t>
-            </a:r>
-            <a:r>
-              <a:rPr/>
-              <a:t> </a:t>
-            </a:r>
-            <a:r>
-              <a:rPr/>
-              <a:t>you</a:t>
-            </a:r>
-            <a:r>
-              <a:rPr/>
-              <a:t> </a:t>
-            </a:r>
-            <a:r>
-              <a:rPr/>
-              <a:t>already</a:t>
-            </a:r>
-            <a:r>
-              <a:rPr/>
-              <a:t> </a:t>
-            </a:r>
-            <a:r>
-              <a:rPr/>
-              <a:t>know</a:t>
-            </a:r>
-            <a:r>
-              <a:rPr/>
-              <a:t> </a:t>
-            </a:r>
-            <a:r>
-              <a:rPr/>
-              <a:t>R</a:t>
+              <a:t>Markdown</a:t>
             </a:r>
           </a:p>
         </p:txBody>
       </p:sp>
       <p:pic>
         <p:nvPicPr>
-          <p:cNvPr descr="/Users/jennahamlin/Desktop/GiGte/markdown.open.png" id="0" name="Picture 1"/>
+          <p:cNvPr descr="markdownCheatSheet.png" id="0" name="Picture 1"/>
           <p:cNvPicPr>
             <a:picLocks noGrp="1" noChangeAspect="1"/>
           </p:cNvPicPr>
@@ -3390,8 +3418,8 @@
         </p:blipFill>
         <p:spPr bwMode="auto">
           <a:xfrm>
-            <a:off x="457200" y="2235200"/>
-            <a:ext cx="8229600" cy="2730500"/>
+            <a:off x="1727200" y="203200"/>
+            <a:ext cx="5689600" cy="4343400"/>
           </a:xfrm>
           <a:prstGeom prst="rect">
             <a:avLst/>
@@ -3412,8 +3440,8 @@
         </p:nvSpPr>
         <p:spPr>
           <a:xfrm>
-            <a:off x="457200" y="5613400"/>
-            <a:ext cx="8229600" cy="508000"/>
+            <a:off x="114300" y="4546600"/>
+            <a:ext cx="8902700" cy="508000"/>
           </a:xfrm>
           <a:prstGeom prst="rect">
             <a:avLst/>
@@ -3429,15 +3457,71 @@
             </a:pPr>
             <a:r>
               <a:rPr/>
-              <a:t>rmarkdown</a:t>
-            </a:r>
-            <a:r>
-              <a:rPr/>
-              <a:t> </a:t>
-            </a:r>
-            <a:r>
-              <a:rPr/>
-              <a:t>open</a:t>
+              <a:t>Markdown</a:t>
+            </a:r>
+            <a:r>
+              <a:rPr/>
+              <a:t> </a:t>
+            </a:r>
+            <a:r>
+              <a:rPr/>
+              <a:t>is</a:t>
+            </a:r>
+            <a:r>
+              <a:rPr/>
+              <a:t> </a:t>
+            </a:r>
+            <a:r>
+              <a:rPr/>
+              <a:t>a</a:t>
+            </a:r>
+            <a:r>
+              <a:rPr/>
+              <a:t> </a:t>
+            </a:r>
+            <a:r>
+              <a:rPr/>
+              <a:t>lightweight</a:t>
+            </a:r>
+            <a:r>
+              <a:rPr/>
+              <a:t> </a:t>
+            </a:r>
+            <a:r>
+              <a:rPr/>
+              <a:t>markup</a:t>
+            </a:r>
+            <a:r>
+              <a:rPr/>
+              <a:t> </a:t>
+            </a:r>
+            <a:r>
+              <a:rPr/>
+              <a:t>language</a:t>
+            </a:r>
+            <a:r>
+              <a:rPr/>
+              <a:t> </a:t>
+            </a:r>
+            <a:r>
+              <a:rPr/>
+              <a:t>with</a:t>
+            </a:r>
+            <a:r>
+              <a:rPr/>
+              <a:t> </a:t>
+            </a:r>
+            <a:r>
+              <a:rPr/>
+              <a:t>plain-text-formatting</a:t>
+            </a:r>
+            <a:r>
+              <a:rPr/>
+              <a:t> </a:t>
+            </a:r>
+            <a:r>
+              <a:rPr/>
+              <a:t>syntax</a:t>
             </a:r>
           </a:p>
         </p:txBody>
@@ -3466,12 +3550,12 @@
       </p:grpSpPr>
       <p:sp>
         <p:nvSpPr>
-          <p:cNvPr id="2" name="Title 1"/>
-          <p:cNvSpPr>
-            <a:spLocks noGrp="1"/>
-          </p:cNvSpPr>
-          <p:nvPr>
-            <p:ph type="title"/>
+          <p:cNvPr id="3" name="Content Placeholder 2"/>
+          <p:cNvSpPr>
+            <a:spLocks noGrp="1"/>
+          </p:cNvSpPr>
+          <p:nvPr>
+            <p:ph idx="1"/>
           </p:nvPr>
         </p:nvSpPr>
         <p:spPr/>
@@ -3484,60 +3568,13 @@
             </a:pPr>
             <a:r>
               <a:rPr/>
-              <a:t>Slide</a:t>
-            </a:r>
-            <a:r>
-              <a:rPr/>
-              <a:t> </a:t>
-            </a:r>
-            <a:r>
-              <a:rPr/>
-              <a:t>with</a:t>
-            </a:r>
-            <a:r>
-              <a:rPr/>
-              <a:t> </a:t>
-            </a:r>
-            <a:r>
-              <a:rPr/>
-              <a:t>Bullets</a:t>
-            </a:r>
-          </a:p>
-        </p:txBody>
-      </p:sp>
-      <p:sp>
-        <p:nvSpPr>
-          <p:cNvPr id="3" name="Content Placeholder 2"/>
-          <p:cNvSpPr>
-            <a:spLocks noGrp="1"/>
-          </p:cNvSpPr>
-          <p:nvPr>
-            <p:ph idx="1"/>
-          </p:nvPr>
-        </p:nvSpPr>
-        <p:spPr/>
-        <p:txBody>
-          <a:bodyPr/>
-          <a:lstStyle/>
-          <a:p>
-            <a:pPr lvl="1"/>
-            <a:r>
-              <a:rPr/>
-              <a:t>Bullet 1</a:t>
-            </a:r>
-          </a:p>
-          <a:p>
-            <a:pPr lvl="1"/>
-            <a:r>
-              <a:rPr/>
-              <a:t>Bullet 2</a:t>
-            </a:r>
-          </a:p>
-          <a:p>
-            <a:pPr lvl="1"/>
-            <a:r>
-              <a:rPr/>
-              <a:t>Bullet 3</a:t>
+              <a:t> </a:t>
+            </a:r>
+            <a:r>
+              <a:rPr>
+                <a:hlinkClick r:id="rId2"/>
+              </a:rPr>
+              <a:t>link to pdf</a:t>
             </a:r>
           </a:p>
         </p:txBody>
@@ -3574,7 +3611,12 @@
             <p:ph type="title"/>
           </p:nvPr>
         </p:nvSpPr>
-        <p:spPr/>
+        <p:spPr>
+          <a:xfrm>
+            <a:off x="457200" y="74042"/>
+            <a:ext cx="8229600" cy="363001"/>
+          </a:xfrm>
+        </p:spPr>
         <p:txBody>
           <a:bodyPr/>
           <a:lstStyle/>
@@ -3584,7 +3626,291 @@
             </a:pPr>
             <a:r>
               <a:rPr/>
-              <a:t>Slide</a:t>
+              <a:t>Rmarkdown</a:t>
+            </a:r>
+          </a:p>
+        </p:txBody>
+      </p:sp>
+      <p:pic>
+        <p:nvPicPr>
+          <p:cNvPr descr="markdown.open.png" id="0" name="Picture 1"/>
+          <p:cNvPicPr>
+            <a:picLocks noGrp="1" noChangeAspect="1"/>
+          </p:cNvPicPr>
+          <p:nvPr/>
+        </p:nvPicPr>
+        <p:blipFill>
+          <a:blip r:embed="rId2"/>
+          <a:stretch>
+            <a:fillRect/>
+          </a:stretch>
+        </p:blipFill>
+        <p:spPr bwMode="auto">
+          <a:xfrm>
+            <a:off x="114300" y="889000"/>
+            <a:ext cx="8902700" cy="2959100"/>
+          </a:xfrm>
+          <a:prstGeom prst="rect">
+            <a:avLst/>
+          </a:prstGeom>
+          <a:noFill/>
+          <a:ln w="9525">
+            <a:noFill/>
+            <a:headEnd/>
+            <a:tailEnd/>
+          </a:ln>
+        </p:spPr>
+      </p:pic>
+      <p:sp>
+        <p:nvSpPr>
+          <p:cNvPr id="1" name="TextBox 3"/>
+          <p:cNvSpPr txBox="1"/>
+          <p:nvPr/>
+        </p:nvSpPr>
+        <p:spPr>
+          <a:xfrm>
+            <a:off x="114300" y="4546600"/>
+            <a:ext cx="8902700" cy="508000"/>
+          </a:xfrm>
+          <a:prstGeom prst="rect">
+            <a:avLst/>
+          </a:prstGeom>
+          <a:noFill/>
+        </p:spPr>
+        <p:txBody>
+          <a:bodyPr/>
+          <a:lstStyle/>
+          <a:p>
+            <a:pPr lvl="0" marL="0" indent="0" algn="ctr">
+              <a:buNone/>
+            </a:pPr>
+            <a:r>
+              <a:rPr/>
+              <a:t>provides</a:t>
+            </a:r>
+            <a:r>
+              <a:rPr/>
+              <a:t> </a:t>
+            </a:r>
+            <a:r>
+              <a:rPr/>
+              <a:t>an</a:t>
+            </a:r>
+            <a:r>
+              <a:rPr/>
+              <a:t> </a:t>
+            </a:r>
+            <a:r>
+              <a:rPr/>
+              <a:t>authoring</a:t>
+            </a:r>
+            <a:r>
+              <a:rPr/>
+              <a:t> </a:t>
+            </a:r>
+            <a:r>
+              <a:rPr/>
+              <a:t>framework</a:t>
+            </a:r>
+            <a:r>
+              <a:rPr/>
+              <a:t> </a:t>
+            </a:r>
+            <a:r>
+              <a:rPr/>
+              <a:t>for</a:t>
+            </a:r>
+            <a:r>
+              <a:rPr/>
+              <a:t> </a:t>
+            </a:r>
+            <a:r>
+              <a:rPr/>
+              <a:t>data</a:t>
+            </a:r>
+            <a:r>
+              <a:rPr/>
+              <a:t> </a:t>
+            </a:r>
+            <a:r>
+              <a:rPr/>
+              <a:t>science.</a:t>
+            </a:r>
+            <a:r>
+              <a:rPr/>
+              <a:t> </a:t>
+            </a:r>
+            <a:r>
+              <a:rPr/>
+              <a:t>You</a:t>
+            </a:r>
+            <a:r>
+              <a:rPr/>
+              <a:t> </a:t>
+            </a:r>
+            <a:r>
+              <a:rPr/>
+              <a:t>can</a:t>
+            </a:r>
+            <a:r>
+              <a:rPr/>
+              <a:t> </a:t>
+            </a:r>
+            <a:r>
+              <a:rPr/>
+              <a:t>use</a:t>
+            </a:r>
+            <a:r>
+              <a:rPr/>
+              <a:t> </a:t>
+            </a:r>
+            <a:r>
+              <a:rPr/>
+              <a:t>a</a:t>
+            </a:r>
+            <a:r>
+              <a:rPr/>
+              <a:t> </a:t>
+            </a:r>
+            <a:r>
+              <a:rPr/>
+              <a:t>single</a:t>
+            </a:r>
+            <a:r>
+              <a:rPr/>
+              <a:t> </a:t>
+            </a:r>
+            <a:r>
+              <a:rPr/>
+              <a:t>R</a:t>
+            </a:r>
+            <a:r>
+              <a:rPr/>
+              <a:t> </a:t>
+            </a:r>
+            <a:r>
+              <a:rPr/>
+              <a:t>Markdown</a:t>
+            </a:r>
+            <a:r>
+              <a:rPr/>
+              <a:t> </a:t>
+            </a:r>
+            <a:r>
+              <a:rPr/>
+              <a:t>file</a:t>
+            </a:r>
+            <a:r>
+              <a:rPr/>
+              <a:t> </a:t>
+            </a:r>
+            <a:r>
+              <a:rPr/>
+              <a:t>to</a:t>
+            </a:r>
+            <a:r>
+              <a:rPr/>
+              <a:t> </a:t>
+            </a:r>
+            <a:r>
+              <a:rPr/>
+              <a:t>both</a:t>
+            </a:r>
+            <a:r>
+              <a:rPr/>
+              <a:t> </a:t>
+            </a:r>
+            <a:r>
+              <a:rPr/>
+              <a:t>save</a:t>
+            </a:r>
+            <a:r>
+              <a:rPr/>
+              <a:t> </a:t>
+            </a:r>
+            <a:r>
+              <a:rPr/>
+              <a:t>and</a:t>
+            </a:r>
+            <a:r>
+              <a:rPr/>
+              <a:t> </a:t>
+            </a:r>
+            <a:r>
+              <a:rPr/>
+              <a:t>execute</a:t>
+            </a:r>
+            <a:r>
+              <a:rPr/>
+              <a:t> </a:t>
+            </a:r>
+            <a:r>
+              <a:rPr/>
+              <a:t>code</a:t>
+            </a:r>
+            <a:r>
+              <a:rPr/>
+              <a:t> </a:t>
+            </a:r>
+            <a:r>
+              <a:rPr/>
+              <a:t>generate</a:t>
+            </a:r>
+            <a:r>
+              <a:rPr/>
+              <a:t> </a:t>
+            </a:r>
+            <a:r>
+              <a:rPr/>
+              <a:t>high</a:t>
+            </a:r>
+            <a:r>
+              <a:rPr/>
+              <a:t> </a:t>
+            </a:r>
+            <a:r>
+              <a:rPr/>
+              <a:t>quality</a:t>
+            </a:r>
+            <a:r>
+              <a:rPr/>
+              <a:t> </a:t>
+            </a:r>
+            <a:r>
+              <a:rPr/>
+              <a:t>reports</a:t>
+            </a:r>
+            <a:r>
+              <a:rPr/>
+              <a:t> </a:t>
+            </a:r>
+            <a:r>
+              <a:rPr/>
+              <a:t>that</a:t>
+            </a:r>
+            <a:r>
+              <a:rPr/>
+              <a:t> </a:t>
+            </a:r>
+            <a:r>
+              <a:rPr/>
+              <a:t>can</a:t>
+            </a:r>
+            <a:r>
+              <a:rPr/>
+              <a:t> </a:t>
+            </a:r>
+            <a:r>
+              <a:rPr/>
+              <a:t>be</a:t>
+            </a:r>
+            <a:r>
+              <a:rPr/>
+              <a:t> </a:t>
+            </a:r>
+            <a:r>
+              <a:rPr/>
+              <a:t>shared</a:t>
             </a:r>
             <a:r>
               <a:rPr/>
@@ -3600,6 +3926,22 @@
             </a:r>
             <a:r>
               <a:rPr/>
+              <a:t>an</a:t>
+            </a:r>
+            <a:r>
+              <a:rPr/>
+              <a:t> </a:t>
+            </a:r>
+            <a:r>
+              <a:rPr/>
+              <a:t>audience</a:t>
+            </a:r>
+            <a:r>
+              <a:rPr/>
+              <a:t> </a:t>
+            </a:r>
+            <a:r>
+              <a:rPr/>
               <a:t>R</a:t>
             </a:r>
             <a:r>
@@ -3608,60 +3950,111 @@
             </a:r>
             <a:r>
               <a:rPr/>
-              <a:t>Output</a:t>
-            </a:r>
-          </a:p>
-        </p:txBody>
-      </p:sp>
-      <p:sp>
-        <p:nvSpPr>
-          <p:cNvPr id="3" name="Content Placeholder 2"/>
-          <p:cNvSpPr>
-            <a:spLocks noGrp="1"/>
-          </p:cNvSpPr>
-          <p:nvPr>
-            <p:ph idx="1"/>
-          </p:nvPr>
-        </p:nvSpPr>
-        <p:spPr/>
-        <p:txBody>
-          <a:bodyPr/>
-          <a:lstStyle/>
-          <a:p>
-            <a:pPr lvl="0" marL="1270000" indent="0">
-              <a:buNone/>
-            </a:pPr>
-            <a:r>
-              <a:rPr sz="1800" b="1">
-                <a:solidFill>
-                  <a:srgbClr val="007020"/>
-                </a:solidFill>
-                <a:latin typeface="Courier"/>
-              </a:rPr>
-              <a:t>summary</a:t>
-            </a:r>
-            <a:r>
-              <a:rPr sz="1800">
-                <a:latin typeface="Courier"/>
-              </a:rPr>
-              <a:t>(cars)</a:t>
-            </a:r>
-          </a:p>
-          <a:p>
-            <a:pPr lvl="0" marL="1270000" indent="0">
-              <a:buNone/>
-            </a:pPr>
-            <a:r>
-              <a:rPr sz="1800">
-                <a:latin typeface="Courier"/>
-              </a:rPr>
-              <a:t>##      speed           dist       
-##  Min.   : 4.0   Min.   :  2.00  
-##  1st Qu.:12.0   1st Qu.: 26.00  
-##  Median :15.0   Median : 36.00  
-##  Mean   :15.4   Mean   : 42.98  
-##  3rd Qu.:19.0   3rd Qu.: 56.00  
-##  Max.   :25.0   Max.   :120.00</a:t>
+              <a:t>Markdown</a:t>
+            </a:r>
+            <a:r>
+              <a:rPr/>
+              <a:t> </a:t>
+            </a:r>
+            <a:r>
+              <a:rPr/>
+              <a:t>documents</a:t>
+            </a:r>
+            <a:r>
+              <a:rPr/>
+              <a:t> </a:t>
+            </a:r>
+            <a:r>
+              <a:rPr/>
+              <a:t>are</a:t>
+            </a:r>
+            <a:r>
+              <a:rPr/>
+              <a:t> </a:t>
+            </a:r>
+            <a:r>
+              <a:rPr/>
+              <a:t>fully</a:t>
+            </a:r>
+            <a:r>
+              <a:rPr/>
+              <a:t> </a:t>
+            </a:r>
+            <a:r>
+              <a:rPr/>
+              <a:t>reproducible</a:t>
+            </a:r>
+            <a:r>
+              <a:rPr/>
+              <a:t> </a:t>
+            </a:r>
+            <a:r>
+              <a:rPr/>
+              <a:t>and</a:t>
+            </a:r>
+            <a:r>
+              <a:rPr/>
+              <a:t> </a:t>
+            </a:r>
+            <a:r>
+              <a:rPr/>
+              <a:t>support</a:t>
+            </a:r>
+            <a:r>
+              <a:rPr/>
+              <a:t> </a:t>
+            </a:r>
+            <a:r>
+              <a:rPr/>
+              <a:t>dozens</a:t>
+            </a:r>
+            <a:r>
+              <a:rPr/>
+              <a:t> </a:t>
+            </a:r>
+            <a:r>
+              <a:rPr/>
+              <a:t>of</a:t>
+            </a:r>
+            <a:r>
+              <a:rPr/>
+              <a:t> </a:t>
+            </a:r>
+            <a:r>
+              <a:rPr/>
+              <a:t>static</a:t>
+            </a:r>
+            <a:r>
+              <a:rPr/>
+              <a:t> </a:t>
+            </a:r>
+            <a:r>
+              <a:rPr/>
+              <a:t>and</a:t>
+            </a:r>
+            <a:r>
+              <a:rPr/>
+              <a:t> </a:t>
+            </a:r>
+            <a:r>
+              <a:rPr/>
+              <a:t>dynamic</a:t>
+            </a:r>
+            <a:r>
+              <a:rPr/>
+              <a:t> </a:t>
+            </a:r>
+            <a:r>
+              <a:rPr/>
+              <a:t>output</a:t>
+            </a:r>
+            <a:r>
+              <a:rPr/>
+              <a:t> </a:t>
+            </a:r>
+            <a:r>
+              <a:rPr/>
+              <a:t>formats.</a:t>
             </a:r>
           </a:p>
         </p:txBody>
@@ -3690,12 +4083,12 @@
       </p:grpSpPr>
       <p:sp>
         <p:nvSpPr>
-          <p:cNvPr id="2" name="Title 1"/>
-          <p:cNvSpPr>
-            <a:spLocks noGrp="1"/>
-          </p:cNvSpPr>
-          <p:nvPr>
-            <p:ph type="title"/>
+          <p:cNvPr id="3" name="Content Placeholder 2"/>
+          <p:cNvSpPr>
+            <a:spLocks noGrp="1"/>
+          </p:cNvSpPr>
+          <p:nvPr>
+            <p:ph idx="1"/>
           </p:nvPr>
         </p:nvSpPr>
         <p:spPr/>
@@ -3708,30 +4101,67 @@
             </a:pPr>
             <a:r>
               <a:rPr/>
-              <a:t>Slide</a:t>
-            </a:r>
-            <a:r>
-              <a:rPr/>
-              <a:t> </a:t>
-            </a:r>
-            <a:r>
-              <a:rPr/>
-              <a:t>with</a:t>
-            </a:r>
-            <a:r>
-              <a:rPr/>
-              <a:t> </a:t>
-            </a:r>
-            <a:r>
-              <a:rPr/>
-              <a:t>Plot</a:t>
+              <a:t> </a:t>
+            </a:r>
+            <a:r>
+              <a:rPr>
+                <a:hlinkClick r:id="rId2"/>
+              </a:rPr>
+              <a:t>link to Rmarkdown</a:t>
+            </a:r>
+          </a:p>
+        </p:txBody>
+      </p:sp>
+    </p:spTree>
+  </p:cSld>
+</p:sld>
+</file>
+
+<file path=ppt/slides/slide7.xml><?xml version="1.0" encoding="utf-8"?>
+<p:sld xmlns:a="http://schemas.openxmlformats.org/drawingml/2006/main" xmlns:r="http://schemas.openxmlformats.org/officeDocument/2006/relationships" xmlns:p="http://schemas.openxmlformats.org/presentationml/2006/main">
+  <p:cSld>
+    <p:spTree>
+      <p:nvGrpSpPr>
+        <p:cNvPr id="1" name=""/>
+        <p:cNvGrpSpPr/>
+        <p:nvPr/>
+      </p:nvGrpSpPr>
+      <p:grpSpPr>
+        <a:xfrm>
+          <a:off x="0" y="0"/>
+          <a:ext cx="0" cy="0"/>
+          <a:chOff x="0" y="0"/>
+          <a:chExt cx="0" cy="0"/>
+        </a:xfrm>
+      </p:grpSpPr>
+      <p:sp>
+        <p:nvSpPr>
+          <p:cNvPr id="3" name="Content Placeholder 2"/>
+          <p:cNvSpPr>
+            <a:spLocks noGrp="1"/>
+          </p:cNvSpPr>
+          <p:nvPr>
+            <p:ph sz="half" idx="1"/>
+          </p:nvPr>
+        </p:nvSpPr>
+        <p:spPr/>
+        <p:txBody>
+          <a:bodyPr/>
+          <a:lstStyle/>
+          <a:p>
+            <a:pPr lvl="0" marL="0" indent="0">
+              <a:buNone/>
+            </a:pPr>
+            <a:r>
+              <a:rPr/>
+              <a:t>Data science is an exciting discipline that allows you to turn raw data into understanding, insight, and knowledge. The goal of “R for Data Science” is to help you learn the most important tools in R that will allow you to do data science.</a:t>
             </a:r>
           </a:p>
         </p:txBody>
       </p:sp>
       <p:pic>
         <p:nvPicPr>
-          <p:cNvPr descr="GiGte_files/figure-pptx/pressure-1.png" id="0" name="Picture 1"/>
+          <p:cNvPr descr="markdown.open.png" id="0" name="Picture 1"/>
           <p:cNvPicPr>
             <a:picLocks noGrp="1" noChangeAspect="1"/>
           </p:cNvPicPr>
@@ -3745,8 +4175,8 @@
         </p:blipFill>
         <p:spPr bwMode="auto">
           <a:xfrm>
-            <a:off x="1752600" y="1600200"/>
-            <a:ext cx="5651500" cy="4521200"/>
+            <a:off x="4648200" y="2222500"/>
+            <a:ext cx="4038600" cy="1346200"/>
           </a:xfrm>
           <a:prstGeom prst="rect">
             <a:avLst/>

</xml_diff>

<commit_message>
made folder for images and created a few more slides
</commit_message>
<xml_diff>
--- a/GiGte.pptx
+++ b/GiGte.pptx
@@ -12,6 +12,8 @@
     <p:sldId id="260" r:id="rId6"/>
     <p:sldId id="261" r:id="rId7"/>
     <p:sldId id="262" r:id="rId8"/>
+    <p:sldId id="263" r:id="rId9"/>
+    <p:sldId id="264" r:id="rId10"/>
   </p:sldIdLst>
   <p:sldSz cx="9144000" cy="5143500" type="screen16x9"/>
   <p:notesSz cx="6858000" cy="9144000"/>
@@ -3317,14 +3319,14 @@
             <a:pPr lvl="1"/>
             <a:r>
               <a:rPr/>
+              <a:t>Analyses using R in Rmarkdown</a:t>
+            </a:r>
+          </a:p>
+          <a:p>
+            <a:pPr lvl="1"/>
+            <a:r>
+              <a:rPr/>
               <a:t>Integrating references using BibTeX</a:t>
-            </a:r>
-          </a:p>
-          <a:p>
-            <a:pPr lvl="1"/>
-            <a:r>
-              <a:rPr/>
-              <a:t>Analyses using R</a:t>
             </a:r>
           </a:p>
           <a:p>
@@ -3404,7 +3406,7 @@
       </p:sp>
       <p:pic>
         <p:nvPicPr>
-          <p:cNvPr descr="markdownCheatSheet.png" id="0" name="Picture 1"/>
+          <p:cNvPr descr="/Users/jennahamlin/Desktop/GiGte/images/markdownCheatSheet.png" id="0" name="Picture 1"/>
           <p:cNvPicPr>
             <a:picLocks noGrp="1" noChangeAspect="1"/>
           </p:cNvPicPr>
@@ -3418,8 +3420,8 @@
         </p:blipFill>
         <p:spPr bwMode="auto">
           <a:xfrm>
-            <a:off x="1727200" y="203200"/>
-            <a:ext cx="5689600" cy="4343400"/>
+            <a:off x="1422400" y="203200"/>
+            <a:ext cx="6273800" cy="4343400"/>
           </a:xfrm>
           <a:prstGeom prst="rect">
             <a:avLst/>
@@ -3571,10 +3573,8 @@
               <a:t> </a:t>
             </a:r>
             <a:r>
-              <a:rPr>
-                <a:hlinkClick r:id="rId2"/>
-              </a:rPr>
-              <a:t>link to pdf</a:t>
+              <a:rPr/>
+              <a:t>link</a:t>
             </a:r>
           </a:p>
         </p:txBody>
@@ -3633,7 +3633,7 @@
       </p:sp>
       <p:pic>
         <p:nvPicPr>
-          <p:cNvPr descr="markdown.open.png" id="0" name="Picture 1"/>
+          <p:cNvPr descr="/Users/jennahamlin/Desktop/GiGte/images/Rmarkdown.open.png" id="0" name="Picture 1"/>
           <p:cNvPicPr>
             <a:picLocks noGrp="1" noChangeAspect="1"/>
           </p:cNvPicPr>
@@ -3686,31 +3686,135 @@
             </a:pPr>
             <a:r>
               <a:rPr/>
-              <a:t>provides</a:t>
-            </a:r>
-            <a:r>
-              <a:rPr/>
-              <a:t> </a:t>
-            </a:r>
-            <a:r>
-              <a:rPr/>
-              <a:t>an</a:t>
-            </a:r>
-            <a:r>
-              <a:rPr/>
-              <a:t> </a:t>
-            </a:r>
-            <a:r>
-              <a:rPr/>
-              <a:t>authoring</a:t>
-            </a:r>
-            <a:r>
-              <a:rPr/>
-              <a:t> </a:t>
-            </a:r>
-            <a:r>
-              <a:rPr/>
-              <a:t>framework</a:t>
+              <a:t>Rmarkdown</a:t>
+            </a:r>
+            <a:r>
+              <a:rPr/>
+              <a:t> </a:t>
+            </a:r>
+            <a:r>
+              <a:rPr/>
+              <a:t>is</a:t>
+            </a:r>
+            <a:r>
+              <a:rPr/>
+              <a:t> </a:t>
+            </a:r>
+            <a:r>
+              <a:rPr/>
+              <a:t>a</a:t>
+            </a:r>
+            <a:r>
+              <a:rPr/>
+              <a:t> </a:t>
+            </a:r>
+            <a:r>
+              <a:rPr/>
+              <a:t>text</a:t>
+            </a:r>
+            <a:r>
+              <a:rPr/>
+              <a:t> </a:t>
+            </a:r>
+            <a:r>
+              <a:rPr/>
+              <a:t>file</a:t>
+            </a:r>
+            <a:r>
+              <a:rPr/>
+              <a:t> </a:t>
+            </a:r>
+            <a:r>
+              <a:rPr/>
+              <a:t>that</a:t>
+            </a:r>
+            <a:r>
+              <a:rPr/>
+              <a:t> </a:t>
+            </a:r>
+            <a:r>
+              <a:rPr/>
+              <a:t>can</a:t>
+            </a:r>
+            <a:r>
+              <a:rPr/>
+              <a:t> </a:t>
+            </a:r>
+            <a:r>
+              <a:rPr/>
+              <a:t>generate</a:t>
+            </a:r>
+            <a:r>
+              <a:rPr/>
+              <a:t> </a:t>
+            </a:r>
+            <a:r>
+              <a:rPr/>
+              <a:t>high</a:t>
+            </a:r>
+            <a:r>
+              <a:rPr/>
+              <a:t> </a:t>
+            </a:r>
+            <a:r>
+              <a:rPr/>
+              <a:t>quality</a:t>
+            </a:r>
+            <a:r>
+              <a:rPr/>
+              <a:t> </a:t>
+            </a:r>
+            <a:r>
+              <a:rPr/>
+              <a:t>reports</a:t>
+            </a:r>
+            <a:r>
+              <a:rPr/>
+              <a:t> </a:t>
+            </a:r>
+            <a:r>
+              <a:rPr/>
+              <a:t>and</a:t>
+            </a:r>
+            <a:r>
+              <a:rPr/>
+              <a:t> </a:t>
+            </a:r>
+            <a:r>
+              <a:rPr/>
+              <a:t>execute</a:t>
+            </a:r>
+            <a:r>
+              <a:rPr/>
+              <a:t> </a:t>
+            </a:r>
+            <a:r>
+              <a:rPr/>
+              <a:t>code</a:t>
+            </a:r>
+            <a:r>
+              <a:rPr/>
+              <a:t> </a:t>
+            </a:r>
+            <a:r>
+              <a:rPr/>
+              <a:t>which</a:t>
+            </a:r>
+            <a:r>
+              <a:rPr/>
+              <a:t> </a:t>
+            </a:r>
+            <a:r>
+              <a:rPr/>
+              <a:t>allows</a:t>
+            </a:r>
+            <a:r>
+              <a:rPr/>
+              <a:t> </a:t>
+            </a:r>
+            <a:r>
+              <a:rPr/>
+              <a:t>reproducibility</a:t>
             </a:r>
             <a:r>
               <a:rPr/>
@@ -3726,39 +3830,15 @@
             </a:r>
             <a:r>
               <a:rPr/>
-              <a:t>data</a:t>
-            </a:r>
-            <a:r>
-              <a:rPr/>
-              <a:t> </a:t>
-            </a:r>
-            <a:r>
-              <a:rPr/>
-              <a:t>science.</a:t>
-            </a:r>
-            <a:r>
-              <a:rPr/>
-              <a:t> </a:t>
-            </a:r>
-            <a:r>
-              <a:rPr/>
-              <a:t>You</a:t>
-            </a:r>
-            <a:r>
-              <a:rPr/>
-              <a:t> </a:t>
-            </a:r>
-            <a:r>
-              <a:rPr/>
-              <a:t>can</a:t>
-            </a:r>
-            <a:r>
-              <a:rPr/>
-              <a:t> </a:t>
-            </a:r>
-            <a:r>
-              <a:rPr/>
-              <a:t>use</a:t>
+              <a:t>output</a:t>
+            </a:r>
+            <a:r>
+              <a:rPr/>
+              <a:t> </a:t>
+            </a:r>
+            <a:r>
+              <a:rPr/>
+              <a:t>in</a:t>
             </a:r>
             <a:r>
               <a:rPr/>
@@ -3774,55 +3854,15 @@
             </a:r>
             <a:r>
               <a:rPr/>
-              <a:t>single</a:t>
-            </a:r>
-            <a:r>
-              <a:rPr/>
-              <a:t> </a:t>
-            </a:r>
-            <a:r>
-              <a:rPr/>
-              <a:t>R</a:t>
-            </a:r>
-            <a:r>
-              <a:rPr/>
-              <a:t> </a:t>
-            </a:r>
-            <a:r>
-              <a:rPr/>
-              <a:t>Markdown</a:t>
-            </a:r>
-            <a:r>
-              <a:rPr/>
-              <a:t> </a:t>
-            </a:r>
-            <a:r>
-              <a:rPr/>
-              <a:t>file</a:t>
-            </a:r>
-            <a:r>
-              <a:rPr/>
-              <a:t> </a:t>
-            </a:r>
-            <a:r>
-              <a:rPr/>
-              <a:t>to</a:t>
-            </a:r>
-            <a:r>
-              <a:rPr/>
-              <a:t> </a:t>
-            </a:r>
-            <a:r>
-              <a:rPr/>
-              <a:t>both</a:t>
-            </a:r>
-            <a:r>
-              <a:rPr/>
-              <a:t> </a:t>
-            </a:r>
-            <a:r>
-              <a:rPr/>
-              <a:t>save</a:t>
+              <a:t>dozen</a:t>
+            </a:r>
+            <a:r>
+              <a:rPr/>
+              <a:t> </a:t>
+            </a:r>
+            <a:r>
+              <a:rPr/>
+              <a:t>static</a:t>
             </a:r>
             <a:r>
               <a:rPr/>
@@ -3838,206 +3878,6 @@
             </a:r>
             <a:r>
               <a:rPr/>
-              <a:t>execute</a:t>
-            </a:r>
-            <a:r>
-              <a:rPr/>
-              <a:t> </a:t>
-            </a:r>
-            <a:r>
-              <a:rPr/>
-              <a:t>code</a:t>
-            </a:r>
-            <a:r>
-              <a:rPr/>
-              <a:t> </a:t>
-            </a:r>
-            <a:r>
-              <a:rPr/>
-              <a:t>generate</a:t>
-            </a:r>
-            <a:r>
-              <a:rPr/>
-              <a:t> </a:t>
-            </a:r>
-            <a:r>
-              <a:rPr/>
-              <a:t>high</a:t>
-            </a:r>
-            <a:r>
-              <a:rPr/>
-              <a:t> </a:t>
-            </a:r>
-            <a:r>
-              <a:rPr/>
-              <a:t>quality</a:t>
-            </a:r>
-            <a:r>
-              <a:rPr/>
-              <a:t> </a:t>
-            </a:r>
-            <a:r>
-              <a:rPr/>
-              <a:t>reports</a:t>
-            </a:r>
-            <a:r>
-              <a:rPr/>
-              <a:t> </a:t>
-            </a:r>
-            <a:r>
-              <a:rPr/>
-              <a:t>that</a:t>
-            </a:r>
-            <a:r>
-              <a:rPr/>
-              <a:t> </a:t>
-            </a:r>
-            <a:r>
-              <a:rPr/>
-              <a:t>can</a:t>
-            </a:r>
-            <a:r>
-              <a:rPr/>
-              <a:t> </a:t>
-            </a:r>
-            <a:r>
-              <a:rPr/>
-              <a:t>be</a:t>
-            </a:r>
-            <a:r>
-              <a:rPr/>
-              <a:t> </a:t>
-            </a:r>
-            <a:r>
-              <a:rPr/>
-              <a:t>shared</a:t>
-            </a:r>
-            <a:r>
-              <a:rPr/>
-              <a:t> </a:t>
-            </a:r>
-            <a:r>
-              <a:rPr/>
-              <a:t>with</a:t>
-            </a:r>
-            <a:r>
-              <a:rPr/>
-              <a:t> </a:t>
-            </a:r>
-            <a:r>
-              <a:rPr/>
-              <a:t>an</a:t>
-            </a:r>
-            <a:r>
-              <a:rPr/>
-              <a:t> </a:t>
-            </a:r>
-            <a:r>
-              <a:rPr/>
-              <a:t>audience</a:t>
-            </a:r>
-            <a:r>
-              <a:rPr/>
-              <a:t> </a:t>
-            </a:r>
-            <a:r>
-              <a:rPr/>
-              <a:t>R</a:t>
-            </a:r>
-            <a:r>
-              <a:rPr/>
-              <a:t> </a:t>
-            </a:r>
-            <a:r>
-              <a:rPr/>
-              <a:t>Markdown</a:t>
-            </a:r>
-            <a:r>
-              <a:rPr/>
-              <a:t> </a:t>
-            </a:r>
-            <a:r>
-              <a:rPr/>
-              <a:t>documents</a:t>
-            </a:r>
-            <a:r>
-              <a:rPr/>
-              <a:t> </a:t>
-            </a:r>
-            <a:r>
-              <a:rPr/>
-              <a:t>are</a:t>
-            </a:r>
-            <a:r>
-              <a:rPr/>
-              <a:t> </a:t>
-            </a:r>
-            <a:r>
-              <a:rPr/>
-              <a:t>fully</a:t>
-            </a:r>
-            <a:r>
-              <a:rPr/>
-              <a:t> </a:t>
-            </a:r>
-            <a:r>
-              <a:rPr/>
-              <a:t>reproducible</a:t>
-            </a:r>
-            <a:r>
-              <a:rPr/>
-              <a:t> </a:t>
-            </a:r>
-            <a:r>
-              <a:rPr/>
-              <a:t>and</a:t>
-            </a:r>
-            <a:r>
-              <a:rPr/>
-              <a:t> </a:t>
-            </a:r>
-            <a:r>
-              <a:rPr/>
-              <a:t>support</a:t>
-            </a:r>
-            <a:r>
-              <a:rPr/>
-              <a:t> </a:t>
-            </a:r>
-            <a:r>
-              <a:rPr/>
-              <a:t>dozens</a:t>
-            </a:r>
-            <a:r>
-              <a:rPr/>
-              <a:t> </a:t>
-            </a:r>
-            <a:r>
-              <a:rPr/>
-              <a:t>of</a:t>
-            </a:r>
-            <a:r>
-              <a:rPr/>
-              <a:t> </a:t>
-            </a:r>
-            <a:r>
-              <a:rPr/>
-              <a:t>static</a:t>
-            </a:r>
-            <a:r>
-              <a:rPr/>
-              <a:t> </a:t>
-            </a:r>
-            <a:r>
-              <a:rPr/>
-              <a:t>and</a:t>
-            </a:r>
-            <a:r>
-              <a:rPr/>
-              <a:t> </a:t>
-            </a:r>
-            <a:r>
-              <a:rPr/>
               <a:t>dynamic</a:t>
             </a:r>
             <a:r>
@@ -4046,15 +3886,31 @@
             </a:r>
             <a:r>
               <a:rPr/>
-              <a:t>output</a:t>
-            </a:r>
-            <a:r>
-              <a:rPr/>
-              <a:t> </a:t>
-            </a:r>
-            <a:r>
-              <a:rPr/>
-              <a:t>formats.</a:t>
+              <a:t>formats</a:t>
+            </a:r>
+            <a:r>
+              <a:rPr/>
+              <a:t> </a:t>
+            </a:r>
+            <a:r>
+              <a:rPr/>
+              <a:t>(including</a:t>
+            </a:r>
+            <a:r>
+              <a:rPr/>
+              <a:t> </a:t>
+            </a:r>
+            <a:r>
+              <a:rPr/>
+              <a:t>this</a:t>
+            </a:r>
+            <a:r>
+              <a:rPr/>
+              <a:t> </a:t>
+            </a:r>
+            <a:r>
+              <a:rPr/>
+              <a:t>powerpoint).</a:t>
             </a:r>
           </a:p>
         </p:txBody>
@@ -4107,7 +3963,7 @@
               <a:rPr>
                 <a:hlinkClick r:id="rId2"/>
               </a:rPr>
-              <a:t>link to Rmarkdown</a:t>
+              <a:t>https://rmarkdown.rstudio.com/lesson-1.html</a:t>
             </a:r>
           </a:p>
         </p:txBody>
@@ -4136,15 +3992,20 @@
       </p:grpSpPr>
       <p:sp>
         <p:nvSpPr>
-          <p:cNvPr id="3" name="Content Placeholder 2"/>
-          <p:cNvSpPr>
-            <a:spLocks noGrp="1"/>
-          </p:cNvSpPr>
-          <p:nvPr>
-            <p:ph sz="half" idx="1"/>
-          </p:nvPr>
-        </p:nvSpPr>
-        <p:spPr/>
+          <p:cNvPr id="2" name="Title 1"/>
+          <p:cNvSpPr>
+            <a:spLocks noGrp="1"/>
+          </p:cNvSpPr>
+          <p:nvPr>
+            <p:ph type="title"/>
+          </p:nvPr>
+        </p:nvSpPr>
+        <p:spPr>
+          <a:xfrm>
+            <a:off x="457200" y="74042"/>
+            <a:ext cx="8229600" cy="363001"/>
+          </a:xfrm>
+        </p:spPr>
         <p:txBody>
           <a:bodyPr/>
           <a:lstStyle/>
@@ -4154,14 +4015,22 @@
             </a:pPr>
             <a:r>
               <a:rPr/>
-              <a:t>Data science is an exciting discipline that allows you to turn raw data into understanding, insight, and knowledge. The goal of “R for Data Science” is to help you learn the most important tools in R that will allow you to do data science.</a:t>
+              <a:t>.Rmd</a:t>
+            </a:r>
+            <a:r>
+              <a:rPr/>
+              <a:t> </a:t>
+            </a:r>
+            <a:r>
+              <a:rPr/>
+              <a:t>files</a:t>
             </a:r>
           </a:p>
         </p:txBody>
       </p:sp>
       <p:pic>
         <p:nvPicPr>
-          <p:cNvPr descr="markdown.open.png" id="0" name="Picture 1"/>
+          <p:cNvPr descr="/Users/jennahamlin/Desktop/GiGte/images/Rmd.output.png" id="0" name="Picture 1"/>
           <p:cNvPicPr>
             <a:picLocks noGrp="1" noChangeAspect="1"/>
           </p:cNvPicPr>
@@ -4175,8 +4044,8 @@
         </p:blipFill>
         <p:spPr bwMode="auto">
           <a:xfrm>
-            <a:off x="4648200" y="2222500"/>
-            <a:ext cx="4038600" cy="1346200"/>
+            <a:off x="1676400" y="203200"/>
+            <a:ext cx="5791200" cy="4343400"/>
           </a:xfrm>
           <a:prstGeom prst="rect">
             <a:avLst/>
@@ -4189,6 +4058,516 @@
           </a:ln>
         </p:spPr>
       </p:pic>
+      <p:sp>
+        <p:nvSpPr>
+          <p:cNvPr id="1" name="TextBox 3"/>
+          <p:cNvSpPr txBox="1"/>
+          <p:nvPr/>
+        </p:nvSpPr>
+        <p:spPr>
+          <a:xfrm>
+            <a:off x="114300" y="4546600"/>
+            <a:ext cx="8902700" cy="508000"/>
+          </a:xfrm>
+          <a:prstGeom prst="rect">
+            <a:avLst/>
+          </a:prstGeom>
+          <a:noFill/>
+        </p:spPr>
+        <p:txBody>
+          <a:bodyPr/>
+          <a:lstStyle/>
+          <a:p>
+            <a:pPr lvl="0" marL="0" indent="0" algn="ctr">
+              <a:buNone/>
+            </a:pPr>
+            <a:r>
+              <a:rPr/>
+              <a:t>.Rmd</a:t>
+            </a:r>
+            <a:r>
+              <a:rPr/>
+              <a:t> </a:t>
+            </a:r>
+            <a:r>
+              <a:rPr/>
+              <a:t>files</a:t>
+            </a:r>
+            <a:r>
+              <a:rPr/>
+              <a:t> </a:t>
+            </a:r>
+            <a:r>
+              <a:rPr/>
+              <a:t>can</a:t>
+            </a:r>
+            <a:r>
+              <a:rPr/>
+              <a:t> </a:t>
+            </a:r>
+            <a:r>
+              <a:rPr/>
+              <a:t>be</a:t>
+            </a:r>
+            <a:r>
+              <a:rPr/>
+              <a:t> </a:t>
+            </a:r>
+            <a:r>
+              <a:rPr/>
+              <a:t>opened</a:t>
+            </a:r>
+            <a:r>
+              <a:rPr/>
+              <a:t> </a:t>
+            </a:r>
+            <a:r>
+              <a:rPr/>
+              <a:t>and</a:t>
+            </a:r>
+            <a:r>
+              <a:rPr/>
+              <a:t> </a:t>
+            </a:r>
+            <a:r>
+              <a:rPr/>
+              <a:t>edited</a:t>
+            </a:r>
+            <a:r>
+              <a:rPr/>
+              <a:t> </a:t>
+            </a:r>
+            <a:r>
+              <a:rPr/>
+              <a:t>in</a:t>
+            </a:r>
+            <a:r>
+              <a:rPr/>
+              <a:t> </a:t>
+            </a:r>
+            <a:r>
+              <a:rPr/>
+              <a:t>Rstudio,</a:t>
+            </a:r>
+            <a:r>
+              <a:rPr/>
+              <a:t> </a:t>
+            </a:r>
+            <a:r>
+              <a:rPr/>
+              <a:t>and</a:t>
+            </a:r>
+            <a:r>
+              <a:rPr/>
+              <a:t> </a:t>
+            </a:r>
+            <a:r>
+              <a:rPr/>
+              <a:t>turned</a:t>
+            </a:r>
+            <a:r>
+              <a:rPr/>
+              <a:t> </a:t>
+            </a:r>
+            <a:r>
+              <a:rPr/>
+              <a:t>into</a:t>
+            </a:r>
+            <a:r>
+              <a:rPr/>
+              <a:t> </a:t>
+            </a:r>
+            <a:r>
+              <a:rPr/>
+              <a:t>HTML,</a:t>
+            </a:r>
+            <a:r>
+              <a:rPr/>
+              <a:t> </a:t>
+            </a:r>
+            <a:r>
+              <a:rPr/>
+              <a:t>PDF,</a:t>
+            </a:r>
+            <a:r>
+              <a:rPr/>
+              <a:t> </a:t>
+            </a:r>
+            <a:r>
+              <a:rPr/>
+              <a:t>or</a:t>
+            </a:r>
+            <a:r>
+              <a:rPr/>
+              <a:t> </a:t>
+            </a:r>
+            <a:r>
+              <a:rPr/>
+              <a:t>DOCX</a:t>
+            </a:r>
+            <a:r>
+              <a:rPr/>
+              <a:t> </a:t>
+            </a:r>
+            <a:r>
+              <a:rPr/>
+              <a:t>files</a:t>
+            </a:r>
+            <a:r>
+              <a:rPr/>
+              <a:t> </a:t>
+            </a:r>
+            <a:r>
+              <a:rPr/>
+              <a:t>with</a:t>
+            </a:r>
+            <a:r>
+              <a:rPr/>
+              <a:t> </a:t>
+            </a:r>
+            <a:r>
+              <a:rPr/>
+              <a:t>the</a:t>
+            </a:r>
+            <a:r>
+              <a:rPr/>
+              <a:t> </a:t>
+            </a:r>
+            <a:r>
+              <a:rPr/>
+              <a:t>push</a:t>
+            </a:r>
+            <a:r>
+              <a:rPr/>
+              <a:t> </a:t>
+            </a:r>
+            <a:r>
+              <a:rPr/>
+              <a:t>of</a:t>
+            </a:r>
+            <a:r>
+              <a:rPr/>
+              <a:t> </a:t>
+            </a:r>
+            <a:r>
+              <a:rPr/>
+              <a:t>button</a:t>
+            </a:r>
+          </a:p>
+        </p:txBody>
+      </p:sp>
+    </p:spTree>
+  </p:cSld>
+</p:sld>
+</file>
+
+<file path=ppt/slides/slide8.xml><?xml version="1.0" encoding="utf-8"?>
+<p:sld xmlns:a="http://schemas.openxmlformats.org/drawingml/2006/main" xmlns:r="http://schemas.openxmlformats.org/officeDocument/2006/relationships" xmlns:p="http://schemas.openxmlformats.org/presentationml/2006/main">
+  <p:cSld>
+    <p:spTree>
+      <p:nvGrpSpPr>
+        <p:cNvPr id="1" name=""/>
+        <p:cNvGrpSpPr/>
+        <p:nvPr/>
+      </p:nvGrpSpPr>
+      <p:grpSpPr>
+        <a:xfrm>
+          <a:off x="0" y="0"/>
+          <a:ext cx="0" cy="0"/>
+          <a:chOff x="0" y="0"/>
+          <a:chExt cx="0" cy="0"/>
+        </a:xfrm>
+      </p:grpSpPr>
+      <p:sp>
+        <p:nvSpPr>
+          <p:cNvPr id="2" name="Title 1"/>
+          <p:cNvSpPr>
+            <a:spLocks noGrp="1"/>
+          </p:cNvSpPr>
+          <p:nvPr>
+            <p:ph type="title"/>
+          </p:nvPr>
+        </p:nvSpPr>
+        <p:spPr>
+          <a:xfrm>
+            <a:off x="457200" y="74042"/>
+            <a:ext cx="8229600" cy="363001"/>
+          </a:xfrm>
+        </p:spPr>
+        <p:txBody>
+          <a:bodyPr/>
+          <a:lstStyle/>
+          <a:p>
+            <a:pPr lvl="0" marL="0" indent="0">
+              <a:buNone/>
+            </a:pPr>
+            <a:r>
+              <a:rPr/>
+              <a:t>Analyses</a:t>
+            </a:r>
+            <a:r>
+              <a:rPr/>
+              <a:t> </a:t>
+            </a:r>
+            <a:r>
+              <a:rPr/>
+              <a:t>using</a:t>
+            </a:r>
+            <a:r>
+              <a:rPr/>
+              <a:t> </a:t>
+            </a:r>
+            <a:r>
+              <a:rPr/>
+              <a:t>R</a:t>
+            </a:r>
+            <a:r>
+              <a:rPr/>
+              <a:t> </a:t>
+            </a:r>
+            <a:r>
+              <a:rPr/>
+              <a:t>code</a:t>
+            </a:r>
+          </a:p>
+        </p:txBody>
+      </p:sp>
+      <p:pic>
+        <p:nvPicPr>
+          <p:cNvPr descr="/Users/jennahamlin/Desktop/GiGte/images/integrateRCode.png" id="0" name="Picture 1"/>
+          <p:cNvPicPr>
+            <a:picLocks noGrp="1" noChangeAspect="1"/>
+          </p:cNvPicPr>
+          <p:nvPr/>
+        </p:nvPicPr>
+        <p:blipFill>
+          <a:blip r:embed="rId2"/>
+          <a:stretch>
+            <a:fillRect/>
+          </a:stretch>
+        </p:blipFill>
+        <p:spPr bwMode="auto">
+          <a:xfrm>
+            <a:off x="1676400" y="203200"/>
+            <a:ext cx="5791200" cy="4343400"/>
+          </a:xfrm>
+          <a:prstGeom prst="rect">
+            <a:avLst/>
+          </a:prstGeom>
+          <a:noFill/>
+          <a:ln w="9525">
+            <a:noFill/>
+            <a:headEnd/>
+            <a:tailEnd/>
+          </a:ln>
+        </p:spPr>
+      </p:pic>
+      <p:sp>
+        <p:nvSpPr>
+          <p:cNvPr id="1" name="TextBox 3"/>
+          <p:cNvSpPr txBox="1"/>
+          <p:nvPr/>
+        </p:nvSpPr>
+        <p:spPr>
+          <a:xfrm>
+            <a:off x="114300" y="4546600"/>
+            <a:ext cx="8902700" cy="508000"/>
+          </a:xfrm>
+          <a:prstGeom prst="rect">
+            <a:avLst/>
+          </a:prstGeom>
+          <a:noFill/>
+        </p:spPr>
+        <p:txBody>
+          <a:bodyPr/>
+          <a:lstStyle/>
+          <a:p>
+            <a:pPr lvl="0" marL="0" indent="0" algn="ctr">
+              <a:buNone/>
+            </a:pPr>
+            <a:r>
+              <a:rPr/>
+              <a:t>Integrate</a:t>
+            </a:r>
+            <a:r>
+              <a:rPr/>
+              <a:t> </a:t>
+            </a:r>
+            <a:r>
+              <a:rPr/>
+              <a:t>R</a:t>
+            </a:r>
+            <a:r>
+              <a:rPr/>
+              <a:t> </a:t>
+            </a:r>
+            <a:r>
+              <a:rPr/>
+              <a:t>code</a:t>
+            </a:r>
+            <a:r>
+              <a:rPr/>
+              <a:t> </a:t>
+            </a:r>
+            <a:r>
+              <a:rPr/>
+              <a:t>directly</a:t>
+            </a:r>
+            <a:r>
+              <a:rPr/>
+              <a:t> </a:t>
+            </a:r>
+            <a:r>
+              <a:rPr/>
+              <a:t>(avoiding</a:t>
+            </a:r>
+            <a:r>
+              <a:rPr/>
+              <a:t> </a:t>
+            </a:r>
+            <a:r>
+              <a:rPr/>
+              <a:t>the</a:t>
+            </a:r>
+            <a:r>
+              <a:rPr/>
+              <a:t> </a:t>
+            </a:r>
+            <a:r>
+              <a:rPr/>
+              <a:t>need</a:t>
+            </a:r>
+            <a:r>
+              <a:rPr/>
+              <a:t> </a:t>
+            </a:r>
+            <a:r>
+              <a:rPr/>
+              <a:t>to</a:t>
+            </a:r>
+            <a:r>
+              <a:rPr/>
+              <a:t> </a:t>
+            </a:r>
+            <a:r>
+              <a:rPr/>
+              <a:t>awkwardly</a:t>
+            </a:r>
+            <a:r>
+              <a:rPr/>
+              <a:t> </a:t>
+            </a:r>
+            <a:r>
+              <a:rPr/>
+              <a:t>copy-paste</a:t>
+            </a:r>
+            <a:r>
+              <a:rPr/>
+              <a:t> </a:t>
+            </a:r>
+            <a:r>
+              <a:rPr/>
+              <a:t>analyses,</a:t>
+            </a:r>
+            <a:r>
+              <a:rPr/>
+              <a:t> </a:t>
+            </a:r>
+            <a:r>
+              <a:rPr/>
+              <a:t>tables,</a:t>
+            </a:r>
+            <a:r>
+              <a:rPr/>
+              <a:t> </a:t>
+            </a:r>
+            <a:r>
+              <a:rPr/>
+              <a:t>or</a:t>
+            </a:r>
+            <a:r>
+              <a:rPr/>
+              <a:t> </a:t>
+            </a:r>
+            <a:r>
+              <a:rPr/>
+              <a:t>figures)</a:t>
+            </a:r>
+          </a:p>
+        </p:txBody>
+      </p:sp>
+    </p:spTree>
+  </p:cSld>
+</p:sld>
+</file>
+
+<file path=ppt/slides/slide9.xml><?xml version="1.0" encoding="utf-8"?>
+<p:sld xmlns:a="http://schemas.openxmlformats.org/drawingml/2006/main" xmlns:r="http://schemas.openxmlformats.org/officeDocument/2006/relationships" xmlns:p="http://schemas.openxmlformats.org/presentationml/2006/main">
+  <p:cSld>
+    <p:spTree>
+      <p:nvGrpSpPr>
+        <p:cNvPr id="1" name=""/>
+        <p:cNvGrpSpPr/>
+        <p:nvPr/>
+      </p:nvGrpSpPr>
+      <p:grpSpPr>
+        <a:xfrm>
+          <a:off x="0" y="0"/>
+          <a:ext cx="0" cy="0"/>
+          <a:chOff x="0" y="0"/>
+          <a:chExt cx="0" cy="0"/>
+        </a:xfrm>
+      </p:grpSpPr>
+      <p:sp>
+        <p:nvSpPr>
+          <p:cNvPr id="3" name="Content Placeholder 2"/>
+          <p:cNvSpPr>
+            <a:spLocks noGrp="1"/>
+          </p:cNvSpPr>
+          <p:nvPr>
+            <p:ph sz="half" idx="1"/>
+          </p:nvPr>
+        </p:nvSpPr>
+        <p:spPr/>
+        <p:txBody>
+          <a:bodyPr/>
+          <a:lstStyle/>
+          <a:p>
+            <a:pPr lvl="0" marL="0" indent="0">
+              <a:buNone/>
+            </a:pPr>
+            <a:r>
+              <a:rPr/>
+              <a:t>Data science is an exciting discipline that allows you to turn raw data into understanding, insight, and knowledge. The goal of “R for Data Science” is to help you learn the most important tools in R that will allow you to do data science.</a:t>
+            </a:r>
+          </a:p>
+        </p:txBody>
+      </p:sp>
+      <p:sp>
+        <p:nvSpPr>
+          <p:cNvPr id="4" name="Content Placeholder 3"/>
+          <p:cNvSpPr>
+            <a:spLocks noGrp="1"/>
+          </p:cNvSpPr>
+          <p:nvPr>
+            <p:ph sz="half" idx="2"/>
+          </p:nvPr>
+        </p:nvSpPr>
+        <p:spPr/>
+        <p:txBody>
+          <a:bodyPr/>
+          <a:lstStyle/>
+          <a:p>
+            <a:pPr lvl="0" marL="0" indent="0">
+              <a:buNone/>
+            </a:pPr>
+            <a:r>
+              <a:rPr/>
+              <a:t>#[]R(markdown.open.png)</a:t>
+            </a:r>
+          </a:p>
+        </p:txBody>
+      </p:sp>
     </p:spTree>
   </p:cSld>
 </p:sld>

</xml_diff>

<commit_message>
add most of images and slides for ppt
</commit_message>
<xml_diff>
--- a/GiGte.pptx
+++ b/GiGte.pptx
@@ -14,6 +14,12 @@
     <p:sldId id="262" r:id="rId8"/>
     <p:sldId id="263" r:id="rId9"/>
     <p:sldId id="264" r:id="rId10"/>
+    <p:sldId id="265" r:id="rId11"/>
+    <p:sldId id="266" r:id="rId12"/>
+    <p:sldId id="267" r:id="rId13"/>
+    <p:sldId id="268" r:id="rId14"/>
+    <p:sldId id="269" r:id="rId15"/>
+    <p:sldId id="270" r:id="rId16"/>
   </p:sldIdLst>
   <p:sldSz cx="9144000" cy="5143500" type="screen16x9"/>
   <p:notesSz cx="6858000" cy="9144000"/>
@@ -310,7 +316,7 @@
           <a:p>
             <a:fld id="{CC5155F2-B992-344D-B599-BA130F7AC538}" type="datetimeFigureOut">
               <a:rPr lang="en-US" smtClean="0"/>
-              <a:t>2020-03-03</a:t>
+              <a:t>3/31/2020</a:t>
             </a:fld>
             <a:endParaRPr lang="en-US"/>
           </a:p>
@@ -478,7 +484,7 @@
           <a:p>
             <a:fld id="{CC5155F2-B992-344D-B599-BA130F7AC538}" type="datetimeFigureOut">
               <a:rPr lang="en-US" smtClean="0"/>
-              <a:t>2020-03-03</a:t>
+              <a:t>3/31/2020</a:t>
             </a:fld>
             <a:endParaRPr lang="en-US"/>
           </a:p>
@@ -656,7 +662,7 @@
           <a:p>
             <a:fld id="{CC5155F2-B992-344D-B599-BA130F7AC538}" type="datetimeFigureOut">
               <a:rPr lang="en-US" smtClean="0"/>
-              <a:t>2020-03-03</a:t>
+              <a:t>3/31/2020</a:t>
             </a:fld>
             <a:endParaRPr lang="en-US"/>
           </a:p>
@@ -746,8 +752,8 @@
         </p:nvSpPr>
         <p:spPr>
           <a:xfrm>
-            <a:off x="457200" y="74042"/>
-            <a:ext cx="8229600" cy="363001"/>
+            <a:off x="0" y="368238"/>
+            <a:ext cx="9144000" cy="363001"/>
           </a:xfrm>
         </p:spPr>
         <p:txBody>
@@ -755,8 +761,8 @@
             <a:noAutofit/>
           </a:bodyPr>
           <a:lstStyle>
-            <a:lvl1pPr>
-              <a:defRPr sz="2000"/>
+            <a:lvl1pPr algn="l">
+              <a:defRPr sz="4000" u="sng"/>
             </a:lvl1pPr>
           </a:lstStyle>
           <a:p>
@@ -779,8 +785,8 @@
         </p:nvSpPr>
         <p:spPr>
           <a:xfrm>
-            <a:off x="123707" y="206152"/>
-            <a:ext cx="8915142" cy="4856949"/>
+            <a:off x="123707" y="970059"/>
+            <a:ext cx="8915142" cy="4093042"/>
           </a:xfrm>
         </p:spPr>
         <p:txBody>
@@ -1020,7 +1026,7 @@
           <a:p>
             <a:fld id="{CC5155F2-B992-344D-B599-BA130F7AC538}" type="datetimeFigureOut">
               <a:rPr lang="en-US" smtClean="0"/>
-              <a:t>2020-03-03</a:t>
+              <a:t>3/31/2020</a:t>
             </a:fld>
             <a:endParaRPr lang="en-US"/>
           </a:p>
@@ -1108,10 +1114,21 @@
             <p:ph type="title"/>
           </p:nvPr>
         </p:nvSpPr>
-        <p:spPr/>
-        <p:txBody>
-          <a:bodyPr/>
-          <a:lstStyle/>
+        <p:spPr>
+          <a:xfrm>
+            <a:off x="0" y="205979"/>
+            <a:ext cx="9144000" cy="857250"/>
+          </a:xfrm>
+        </p:spPr>
+        <p:txBody>
+          <a:bodyPr>
+            <a:normAutofit/>
+          </a:bodyPr>
+          <a:lstStyle>
+            <a:lvl1pPr algn="l">
+              <a:defRPr sz="4000" u="sng"/>
+            </a:lvl1pPr>
+          </a:lstStyle>
           <a:p>
             <a:r>
               <a:rPr lang="en-US"/>
@@ -1305,7 +1322,7 @@
           <a:p>
             <a:fld id="{CC5155F2-B992-344D-B599-BA130F7AC538}" type="datetimeFigureOut">
               <a:rPr lang="en-US" smtClean="0"/>
-              <a:t>2020-03-03</a:t>
+              <a:t>3/31/2020</a:t>
             </a:fld>
             <a:endParaRPr lang="en-US"/>
           </a:p>
@@ -1367,7 +1384,7 @@
 </file>
 
 <file path=ppt/slideLayouts/slideLayout5.xml><?xml version="1.0" encoding="utf-8"?>
-<p:sldLayout xmlns:a="http://schemas.openxmlformats.org/drawingml/2006/main" xmlns:r="http://schemas.openxmlformats.org/officeDocument/2006/relationships" xmlns:p="http://schemas.openxmlformats.org/presentationml/2006/main" type="twoTxTwoObj" preserve="1">
+<p:sldLayout xmlns:a="http://schemas.openxmlformats.org/drawingml/2006/main" xmlns:r="http://schemas.openxmlformats.org/officeDocument/2006/relationships" xmlns:p="http://schemas.openxmlformats.org/presentationml/2006/main" preserve="1" userDrawn="1">
   <p:cSld name="Comparison">
     <p:spTree>
       <p:nvGrpSpPr>
@@ -1393,83 +1410,23 @@
             <p:ph type="title"/>
           </p:nvPr>
         </p:nvSpPr>
-        <p:spPr/>
+        <p:spPr>
+          <a:xfrm>
+            <a:off x="-1" y="205979"/>
+            <a:ext cx="9064487" cy="857250"/>
+          </a:xfrm>
+        </p:spPr>
         <p:txBody>
           <a:bodyPr/>
           <a:lstStyle>
-            <a:lvl1pPr>
-              <a:defRPr/>
+            <a:lvl1pPr algn="l">
+              <a:defRPr u="sng"/>
             </a:lvl1pPr>
           </a:lstStyle>
           <a:p>
             <a:r>
-              <a:rPr lang="en-US"/>
+              <a:rPr lang="en-US" dirty="0"/>
               <a:t>Click to edit Master title style</a:t>
-            </a:r>
-          </a:p>
-        </p:txBody>
-      </p:sp>
-      <p:sp>
-        <p:nvSpPr>
-          <p:cNvPr id="3" name="Text Placeholder 2"/>
-          <p:cNvSpPr>
-            <a:spLocks noGrp="1"/>
-          </p:cNvSpPr>
-          <p:nvPr>
-            <p:ph type="body" idx="1"/>
-          </p:nvPr>
-        </p:nvSpPr>
-        <p:spPr>
-          <a:xfrm>
-            <a:off x="457200" y="1151335"/>
-            <a:ext cx="4040188" cy="479822"/>
-          </a:xfrm>
-        </p:spPr>
-        <p:txBody>
-          <a:bodyPr anchor="b"/>
-          <a:lstStyle>
-            <a:lvl1pPr marL="0" indent="0">
-              <a:buNone/>
-              <a:defRPr sz="2400" b="1"/>
-            </a:lvl1pPr>
-            <a:lvl2pPr marL="457200" indent="0">
-              <a:buNone/>
-              <a:defRPr sz="2000" b="1"/>
-            </a:lvl2pPr>
-            <a:lvl3pPr marL="914400" indent="0">
-              <a:buNone/>
-              <a:defRPr sz="1800" b="1"/>
-            </a:lvl3pPr>
-            <a:lvl4pPr marL="1371600" indent="0">
-              <a:buNone/>
-              <a:defRPr sz="1600" b="1"/>
-            </a:lvl4pPr>
-            <a:lvl5pPr marL="1828800" indent="0">
-              <a:buNone/>
-              <a:defRPr sz="1600" b="1"/>
-            </a:lvl5pPr>
-            <a:lvl6pPr marL="2286000" indent="0">
-              <a:buNone/>
-              <a:defRPr sz="1600" b="1"/>
-            </a:lvl6pPr>
-            <a:lvl7pPr marL="2743200" indent="0">
-              <a:buNone/>
-              <a:defRPr sz="1600" b="1"/>
-            </a:lvl7pPr>
-            <a:lvl8pPr marL="3200400" indent="0">
-              <a:buNone/>
-              <a:defRPr sz="1600" b="1"/>
-            </a:lvl8pPr>
-            <a:lvl9pPr marL="3657600" indent="0">
-              <a:buNone/>
-              <a:defRPr sz="1600" b="1"/>
-            </a:lvl9pPr>
-          </a:lstStyle>
-          <a:p>
-            <a:pPr lvl="0"/>
-            <a:r>
-              <a:rPr lang="en-US"/>
-              <a:t>Click to edit Master text styles</a:t>
             </a:r>
           </a:p>
         </p:txBody>
@@ -1560,71 +1517,6 @@
       </p:sp>
       <p:sp>
         <p:nvSpPr>
-          <p:cNvPr id="5" name="Text Placeholder 4"/>
-          <p:cNvSpPr>
-            <a:spLocks noGrp="1"/>
-          </p:cNvSpPr>
-          <p:nvPr>
-            <p:ph type="body" sz="quarter" idx="3"/>
-          </p:nvPr>
-        </p:nvSpPr>
-        <p:spPr>
-          <a:xfrm>
-            <a:off x="4645026" y="1151335"/>
-            <a:ext cx="4041775" cy="479822"/>
-          </a:xfrm>
-        </p:spPr>
-        <p:txBody>
-          <a:bodyPr anchor="b"/>
-          <a:lstStyle>
-            <a:lvl1pPr marL="0" indent="0">
-              <a:buNone/>
-              <a:defRPr sz="2400" b="1"/>
-            </a:lvl1pPr>
-            <a:lvl2pPr marL="457200" indent="0">
-              <a:buNone/>
-              <a:defRPr sz="2000" b="1"/>
-            </a:lvl2pPr>
-            <a:lvl3pPr marL="914400" indent="0">
-              <a:buNone/>
-              <a:defRPr sz="1800" b="1"/>
-            </a:lvl3pPr>
-            <a:lvl4pPr marL="1371600" indent="0">
-              <a:buNone/>
-              <a:defRPr sz="1600" b="1"/>
-            </a:lvl4pPr>
-            <a:lvl5pPr marL="1828800" indent="0">
-              <a:buNone/>
-              <a:defRPr sz="1600" b="1"/>
-            </a:lvl5pPr>
-            <a:lvl6pPr marL="2286000" indent="0">
-              <a:buNone/>
-              <a:defRPr sz="1600" b="1"/>
-            </a:lvl6pPr>
-            <a:lvl7pPr marL="2743200" indent="0">
-              <a:buNone/>
-              <a:defRPr sz="1600" b="1"/>
-            </a:lvl7pPr>
-            <a:lvl8pPr marL="3200400" indent="0">
-              <a:buNone/>
-              <a:defRPr sz="1600" b="1"/>
-            </a:lvl8pPr>
-            <a:lvl9pPr marL="3657600" indent="0">
-              <a:buNone/>
-              <a:defRPr sz="1600" b="1"/>
-            </a:lvl9pPr>
-          </a:lstStyle>
-          <a:p>
-            <a:pPr lvl="0"/>
-            <a:r>
-              <a:rPr lang="en-US"/>
-              <a:t>Click to edit Master text styles</a:t>
-            </a:r>
-          </a:p>
-        </p:txBody>
-      </p:sp>
-      <p:sp>
-        <p:nvSpPr>
           <p:cNvPr id="6" name="Content Placeholder 5"/>
           <p:cNvSpPr>
             <a:spLocks noGrp="1"/>
@@ -1724,7 +1616,7 @@
           <a:p>
             <a:fld id="{CC5155F2-B992-344D-B599-BA130F7AC538}" type="datetimeFigureOut">
               <a:rPr lang="en-US" smtClean="0"/>
-              <a:t>2020-03-03</a:t>
+              <a:t>3/31/2020</a:t>
             </a:fld>
             <a:endParaRPr lang="en-US"/>
           </a:p>
@@ -1841,7 +1733,7 @@
           <a:p>
             <a:fld id="{CC5155F2-B992-344D-B599-BA130F7AC538}" type="datetimeFigureOut">
               <a:rPr lang="en-US" smtClean="0"/>
-              <a:t>2020-03-03</a:t>
+              <a:t>3/31/2020</a:t>
             </a:fld>
             <a:endParaRPr lang="en-US"/>
           </a:p>
@@ -1936,7 +1828,7 @@
           <a:p>
             <a:fld id="{CC5155F2-B992-344D-B599-BA130F7AC538}" type="datetimeFigureOut">
               <a:rPr lang="en-US" smtClean="0"/>
-              <a:t>2020-03-03</a:t>
+              <a:t>3/31/2020</a:t>
             </a:fld>
             <a:endParaRPr lang="en-US"/>
           </a:p>
@@ -2211,7 +2103,7 @@
           <a:p>
             <a:fld id="{CC5155F2-B992-344D-B599-BA130F7AC538}" type="datetimeFigureOut">
               <a:rPr lang="en-US" smtClean="0"/>
-              <a:t>2020-03-03</a:t>
+              <a:t>3/31/2020</a:t>
             </a:fld>
             <a:endParaRPr lang="en-US"/>
           </a:p>
@@ -2463,7 +2355,7 @@
           <a:p>
             <a:fld id="{CC5155F2-B992-344D-B599-BA130F7AC538}" type="datetimeFigureOut">
               <a:rPr lang="en-US" smtClean="0"/>
-              <a:t>2020-03-03</a:t>
+              <a:t>3/31/2020</a:t>
             </a:fld>
             <a:endParaRPr lang="en-US"/>
           </a:p>
@@ -2674,7 +2566,7 @@
           <a:p>
             <a:fld id="{CC5155F2-B992-344D-B599-BA130F7AC538}" type="datetimeFigureOut">
               <a:rPr lang="en-US" smtClean="0"/>
-              <a:t>2020-03-03</a:t>
+              <a:t>3/31/2020</a:t>
             </a:fld>
             <a:endParaRPr lang="en-US"/>
           </a:p>
@@ -3200,6 +3092,1089 @@
 </p:sld>
 </file>
 
+<file path=ppt/slides/slide10.xml><?xml version="1.0" encoding="utf-8"?>
+<p:sld xmlns:a="http://schemas.openxmlformats.org/drawingml/2006/main" xmlns:r="http://schemas.openxmlformats.org/officeDocument/2006/relationships" xmlns:p="http://schemas.openxmlformats.org/presentationml/2006/main">
+  <p:cSld>
+    <p:spTree>
+      <p:nvGrpSpPr>
+        <p:cNvPr id="1" name=""/>
+        <p:cNvGrpSpPr/>
+        <p:nvPr/>
+      </p:nvGrpSpPr>
+      <p:grpSpPr>
+        <a:xfrm>
+          <a:off x="0" y="0"/>
+          <a:ext cx="0" cy="0"/>
+          <a:chOff x="0" y="0"/>
+          <a:chExt cx="0" cy="0"/>
+        </a:xfrm>
+      </p:grpSpPr>
+      <p:sp>
+        <p:nvSpPr>
+          <p:cNvPr id="2" name="Title 1"/>
+          <p:cNvSpPr>
+            <a:spLocks noGrp="1"/>
+          </p:cNvSpPr>
+          <p:nvPr>
+            <p:ph type="title"/>
+          </p:nvPr>
+        </p:nvSpPr>
+        <p:spPr>
+          <a:xfrm>
+            <a:off x="0" y="368238"/>
+            <a:ext cx="9144000" cy="363001"/>
+          </a:xfrm>
+        </p:spPr>
+        <p:txBody>
+          <a:bodyPr/>
+          <a:lstStyle/>
+          <a:p>
+            <a:pPr lvl="0" marL="0" indent="0">
+              <a:buNone/>
+            </a:pPr>
+            <a:r>
+              <a:rPr/>
+              <a:t>Equations</a:t>
+            </a:r>
+            <a:r>
+              <a:rPr/>
+              <a:t> </a:t>
+            </a:r>
+            <a:r>
+              <a:rPr/>
+              <a:t>and</a:t>
+            </a:r>
+            <a:r>
+              <a:rPr/>
+              <a:t> </a:t>
+            </a:r>
+            <a:r>
+              <a:rPr/>
+              <a:t>other</a:t>
+            </a:r>
+            <a:r>
+              <a:rPr/>
+              <a:t> </a:t>
+            </a:r>
+            <a:r>
+              <a:rPr/>
+              <a:t>formatting</a:t>
+            </a:r>
+            <a:r>
+              <a:rPr/>
+              <a:t> </a:t>
+            </a:r>
+            <a:r>
+              <a:rPr/>
+              <a:t>with</a:t>
+            </a:r>
+            <a:r>
+              <a:rPr/>
+              <a:t> </a:t>
+            </a:r>
+            <a:r>
+              <a:rPr/>
+              <a:t>LaTeX</a:t>
+            </a:r>
+          </a:p>
+        </p:txBody>
+      </p:sp>
+      <p:pic>
+        <p:nvPicPr>
+          <p:cNvPr descr="/Users/jennahamlin/Desktop/GiGte/images/latexImage.png" id="0" name="Picture 1"/>
+          <p:cNvPicPr>
+            <a:picLocks noGrp="1" noChangeAspect="1"/>
+          </p:cNvPicPr>
+          <p:nvPr/>
+        </p:nvPicPr>
+        <p:blipFill>
+          <a:blip r:embed="rId2"/>
+          <a:stretch>
+            <a:fillRect/>
+          </a:stretch>
+        </p:blipFill>
+        <p:spPr bwMode="auto">
+          <a:xfrm>
+            <a:off x="2184400" y="965200"/>
+            <a:ext cx="4775200" cy="3581400"/>
+          </a:xfrm>
+          <a:prstGeom prst="rect">
+            <a:avLst/>
+          </a:prstGeom>
+          <a:noFill/>
+          <a:ln w="9525">
+            <a:noFill/>
+            <a:headEnd/>
+            <a:tailEnd/>
+          </a:ln>
+        </p:spPr>
+      </p:pic>
+      <p:sp>
+        <p:nvSpPr>
+          <p:cNvPr id="1" name="TextBox 3"/>
+          <p:cNvSpPr txBox="1"/>
+          <p:nvPr/>
+        </p:nvSpPr>
+        <p:spPr>
+          <a:xfrm>
+            <a:off x="114300" y="4546600"/>
+            <a:ext cx="8902700" cy="508000"/>
+          </a:xfrm>
+          <a:prstGeom prst="rect">
+            <a:avLst/>
+          </a:prstGeom>
+          <a:noFill/>
+        </p:spPr>
+        <p:txBody>
+          <a:bodyPr/>
+          <a:lstStyle/>
+          <a:p>
+            <a:pPr lvl="0" marL="0" indent="0" algn="ctr">
+              <a:buNone/>
+            </a:pPr>
+            <a:r>
+              <a:rPr/>
+              <a:t>LaTeX</a:t>
+            </a:r>
+            <a:r>
+              <a:rPr/>
+              <a:t> </a:t>
+            </a:r>
+            <a:r>
+              <a:rPr/>
+              <a:t>produces</a:t>
+            </a:r>
+            <a:r>
+              <a:rPr/>
+              <a:t> </a:t>
+            </a:r>
+            <a:r>
+              <a:rPr/>
+              <a:t>highly</a:t>
+            </a:r>
+            <a:r>
+              <a:rPr/>
+              <a:t> </a:t>
+            </a:r>
+            <a:r>
+              <a:rPr/>
+              <a:t>professional</a:t>
+            </a:r>
+            <a:r>
+              <a:rPr/>
+              <a:t> </a:t>
+            </a:r>
+            <a:r>
+              <a:rPr/>
+              <a:t>looking</a:t>
+            </a:r>
+            <a:r>
+              <a:rPr/>
+              <a:t> </a:t>
+            </a:r>
+            <a:r>
+              <a:rPr/>
+              <a:t>equations</a:t>
+            </a:r>
+          </a:p>
+        </p:txBody>
+      </p:sp>
+    </p:spTree>
+  </p:cSld>
+</p:sld>
+</file>
+
+<file path=ppt/slides/slide11.xml><?xml version="1.0" encoding="utf-8"?>
+<p:sld xmlns:a="http://schemas.openxmlformats.org/drawingml/2006/main" xmlns:r="http://schemas.openxmlformats.org/officeDocument/2006/relationships" xmlns:p="http://schemas.openxmlformats.org/presentationml/2006/main">
+  <p:cSld>
+    <p:spTree>
+      <p:nvGrpSpPr>
+        <p:cNvPr id="1" name=""/>
+        <p:cNvGrpSpPr/>
+        <p:nvPr/>
+      </p:nvGrpSpPr>
+      <p:grpSpPr>
+        <a:xfrm>
+          <a:off x="0" y="0"/>
+          <a:ext cx="0" cy="0"/>
+          <a:chOff x="0" y="0"/>
+          <a:chExt cx="0" cy="0"/>
+        </a:xfrm>
+      </p:grpSpPr>
+      <p:sp>
+        <p:nvSpPr>
+          <p:cNvPr id="2" name="Title 1"/>
+          <p:cNvSpPr>
+            <a:spLocks noGrp="1"/>
+          </p:cNvSpPr>
+          <p:nvPr>
+            <p:ph type="title"/>
+          </p:nvPr>
+        </p:nvSpPr>
+        <p:spPr>
+          <a:xfrm>
+            <a:off x="0" y="205979"/>
+            <a:ext cx="9144000" cy="857250"/>
+          </a:xfrm>
+        </p:spPr>
+        <p:txBody>
+          <a:bodyPr/>
+          <a:lstStyle/>
+          <a:p>
+            <a:pPr lvl="0" marL="0" indent="0">
+              <a:buNone/>
+            </a:pPr>
+            <a:r>
+              <a:rPr/>
+              <a:t>Integrating</a:t>
+            </a:r>
+            <a:r>
+              <a:rPr/>
+              <a:t> </a:t>
+            </a:r>
+            <a:r>
+              <a:rPr/>
+              <a:t>references</a:t>
+            </a:r>
+            <a:r>
+              <a:rPr/>
+              <a:t> </a:t>
+            </a:r>
+            <a:r>
+              <a:rPr/>
+              <a:t>with</a:t>
+            </a:r>
+            <a:r>
+              <a:rPr/>
+              <a:t> </a:t>
+            </a:r>
+            <a:r>
+              <a:rPr/>
+              <a:t>BibTeX</a:t>
+            </a:r>
+          </a:p>
+        </p:txBody>
+      </p:sp>
+      <p:sp>
+        <p:nvSpPr>
+          <p:cNvPr id="3" name="Content Placeholder 2"/>
+          <p:cNvSpPr>
+            <a:spLocks noGrp="1"/>
+          </p:cNvSpPr>
+          <p:nvPr>
+            <p:ph sz="half" idx="1"/>
+          </p:nvPr>
+        </p:nvSpPr>
+        <p:spPr/>
+        <p:txBody>
+          <a:bodyPr/>
+          <a:lstStyle/>
+          <a:p>
+            <a:pPr lvl="0" marL="0" indent="0">
+              <a:buNone/>
+            </a:pPr>
+            <a:r>
+              <a:rPr/>
+              <a:t>Each references has a unique ‘key’ used within Rmd files (e.g. [@author]) and willautomatically building the reference section</a:t>
+            </a:r>
+          </a:p>
+        </p:txBody>
+      </p:sp>
+      <p:pic>
+        <p:nvPicPr>
+          <p:cNvPr descr="/Users/jennahamlin/Desktop/GiGte/images/refsBib.png" id="0" name="Picture 1"/>
+          <p:cNvPicPr>
+            <a:picLocks noGrp="1" noChangeAspect="1"/>
+          </p:cNvPicPr>
+          <p:nvPr/>
+        </p:nvPicPr>
+        <p:blipFill>
+          <a:blip r:embed="rId2"/>
+          <a:stretch>
+            <a:fillRect/>
+          </a:stretch>
+        </p:blipFill>
+        <p:spPr bwMode="auto">
+          <a:xfrm>
+            <a:off x="4648200" y="2197100"/>
+            <a:ext cx="4038600" cy="1384300"/>
+          </a:xfrm>
+          <a:prstGeom prst="rect">
+            <a:avLst/>
+          </a:prstGeom>
+          <a:noFill/>
+          <a:ln w="9525">
+            <a:noFill/>
+            <a:headEnd/>
+            <a:tailEnd/>
+          </a:ln>
+        </p:spPr>
+      </p:pic>
+    </p:spTree>
+  </p:cSld>
+</p:sld>
+</file>
+
+<file path=ppt/slides/slide12.xml><?xml version="1.0" encoding="utf-8"?>
+<p:sld xmlns:a="http://schemas.openxmlformats.org/drawingml/2006/main" xmlns:r="http://schemas.openxmlformats.org/officeDocument/2006/relationships" xmlns:p="http://schemas.openxmlformats.org/presentationml/2006/main">
+  <p:cSld>
+    <p:spTree>
+      <p:nvGrpSpPr>
+        <p:cNvPr id="1" name=""/>
+        <p:cNvGrpSpPr/>
+        <p:nvPr/>
+      </p:nvGrpSpPr>
+      <p:grpSpPr>
+        <a:xfrm>
+          <a:off x="0" y="0"/>
+          <a:ext cx="0" cy="0"/>
+          <a:chOff x="0" y="0"/>
+          <a:chExt cx="0" cy="0"/>
+        </a:xfrm>
+      </p:grpSpPr>
+      <p:sp>
+        <p:nvSpPr>
+          <p:cNvPr id="2" name="Title 1"/>
+          <p:cNvSpPr>
+            <a:spLocks noGrp="1"/>
+          </p:cNvSpPr>
+          <p:nvPr>
+            <p:ph type="title"/>
+          </p:nvPr>
+        </p:nvSpPr>
+        <p:spPr>
+          <a:xfrm>
+            <a:off x="0" y="368238"/>
+            <a:ext cx="9144000" cy="363001"/>
+          </a:xfrm>
+        </p:spPr>
+        <p:txBody>
+          <a:bodyPr/>
+          <a:lstStyle/>
+          <a:p>
+            <a:pPr lvl="0" marL="0" indent="0">
+              <a:buNone/>
+            </a:pPr>
+            <a:r>
+              <a:rPr/>
+              <a:t>Formatting</a:t>
+            </a:r>
+            <a:r>
+              <a:rPr/>
+              <a:t> </a:t>
+            </a:r>
+            <a:r>
+              <a:rPr/>
+              <a:t>using</a:t>
+            </a:r>
+            <a:r>
+              <a:rPr/>
+              <a:t> </a:t>
+            </a:r>
+            <a:r>
+              <a:rPr/>
+              <a:t>CSL</a:t>
+            </a:r>
+            <a:r>
+              <a:rPr/>
+              <a:t> </a:t>
+            </a:r>
+            <a:r>
+              <a:rPr/>
+              <a:t>files</a:t>
+            </a:r>
+          </a:p>
+        </p:txBody>
+      </p:sp>
+      <p:pic>
+        <p:nvPicPr>
+          <p:cNvPr descr="/Users/jennahamlin/Desktop/GiGte/images/cslPage.png" id="0" name="Picture 1"/>
+          <p:cNvPicPr>
+            <a:picLocks noGrp="1" noChangeAspect="1"/>
+          </p:cNvPicPr>
+          <p:nvPr/>
+        </p:nvPicPr>
+        <p:blipFill>
+          <a:blip r:embed="rId2"/>
+          <a:stretch>
+            <a:fillRect/>
+          </a:stretch>
+        </p:blipFill>
+        <p:spPr bwMode="auto">
+          <a:xfrm>
+            <a:off x="114300" y="1663700"/>
+            <a:ext cx="8902700" cy="2197100"/>
+          </a:xfrm>
+          <a:prstGeom prst="rect">
+            <a:avLst/>
+          </a:prstGeom>
+          <a:noFill/>
+          <a:ln w="9525">
+            <a:noFill/>
+            <a:headEnd/>
+            <a:tailEnd/>
+          </a:ln>
+        </p:spPr>
+      </p:pic>
+      <p:sp>
+        <p:nvSpPr>
+          <p:cNvPr id="1" name="TextBox 3"/>
+          <p:cNvSpPr txBox="1"/>
+          <p:nvPr/>
+        </p:nvSpPr>
+        <p:spPr>
+          <a:xfrm>
+            <a:off x="114300" y="4546600"/>
+            <a:ext cx="8902700" cy="508000"/>
+          </a:xfrm>
+          <a:prstGeom prst="rect">
+            <a:avLst/>
+          </a:prstGeom>
+          <a:noFill/>
+        </p:spPr>
+        <p:txBody>
+          <a:bodyPr/>
+          <a:lstStyle/>
+          <a:p>
+            <a:pPr lvl="0" marL="0" indent="0" algn="ctr">
+              <a:buNone/>
+            </a:pPr>
+            <a:r>
+              <a:rPr/>
+              <a:t>CSL</a:t>
+            </a:r>
+            <a:r>
+              <a:rPr/>
+              <a:t> </a:t>
+            </a:r>
+            <a:r>
+              <a:rPr/>
+              <a:t>-</a:t>
+            </a:r>
+            <a:r>
+              <a:rPr/>
+              <a:t> </a:t>
+            </a:r>
+            <a:r>
+              <a:rPr/>
+              <a:t>Citation</a:t>
+            </a:r>
+            <a:r>
+              <a:rPr/>
+              <a:t> </a:t>
+            </a:r>
+            <a:r>
+              <a:rPr/>
+              <a:t>Style</a:t>
+            </a:r>
+            <a:r>
+              <a:rPr/>
+              <a:t> </a:t>
+            </a:r>
+            <a:r>
+              <a:rPr/>
+              <a:t>Language</a:t>
+            </a:r>
+            <a:r>
+              <a:rPr/>
+              <a:t> </a:t>
+            </a:r>
+            <a:r>
+              <a:rPr/>
+              <a:t>-</a:t>
+            </a:r>
+            <a:r>
+              <a:rPr/>
+              <a:t> </a:t>
+            </a:r>
+            <a:r>
+              <a:rPr/>
+              <a:t>essentially</a:t>
+            </a:r>
+            <a:r>
+              <a:rPr/>
+              <a:t> </a:t>
+            </a:r>
+            <a:r>
+              <a:rPr/>
+              <a:t>text</a:t>
+            </a:r>
+            <a:r>
+              <a:rPr/>
+              <a:t> </a:t>
+            </a:r>
+            <a:r>
+              <a:rPr/>
+              <a:t>files</a:t>
+            </a:r>
+            <a:r>
+              <a:rPr/>
+              <a:t> </a:t>
+            </a:r>
+            <a:r>
+              <a:rPr/>
+              <a:t>that</a:t>
+            </a:r>
+            <a:r>
+              <a:rPr/>
+              <a:t> </a:t>
+            </a:r>
+            <a:r>
+              <a:rPr/>
+              <a:t>tell</a:t>
+            </a:r>
+            <a:r>
+              <a:rPr/>
+              <a:t> </a:t>
+            </a:r>
+            <a:r>
+              <a:rPr/>
+              <a:t>the</a:t>
+            </a:r>
+            <a:r>
+              <a:rPr/>
+              <a:t> </a:t>
+            </a:r>
+            <a:r>
+              <a:rPr/>
+              <a:t>Rmarkdown</a:t>
+            </a:r>
+            <a:r>
+              <a:rPr/>
+              <a:t> </a:t>
+            </a:r>
+            <a:r>
+              <a:rPr/>
+              <a:t>file</a:t>
+            </a:r>
+            <a:r>
+              <a:rPr/>
+              <a:t> </a:t>
+            </a:r>
+            <a:r>
+              <a:rPr/>
+              <a:t>how</a:t>
+            </a:r>
+            <a:r>
+              <a:rPr/>
+              <a:t> </a:t>
+            </a:r>
+            <a:r>
+              <a:rPr/>
+              <a:t>to</a:t>
+            </a:r>
+            <a:r>
+              <a:rPr/>
+              <a:t> </a:t>
+            </a:r>
+            <a:r>
+              <a:rPr/>
+              <a:t>use</a:t>
+            </a:r>
+            <a:r>
+              <a:rPr/>
+              <a:t> </a:t>
+            </a:r>
+            <a:r>
+              <a:rPr/>
+              <a:t>the</a:t>
+            </a:r>
+            <a:r>
+              <a:rPr/>
+              <a:t> </a:t>
+            </a:r>
+            <a:r>
+              <a:rPr/>
+              <a:t>information</a:t>
+            </a:r>
+            <a:r>
+              <a:rPr/>
+              <a:t> </a:t>
+            </a:r>
+            <a:r>
+              <a:rPr/>
+              <a:t>in</a:t>
+            </a:r>
+            <a:r>
+              <a:rPr/>
+              <a:t> </a:t>
+            </a:r>
+            <a:r>
+              <a:rPr/>
+              <a:t>the</a:t>
+            </a:r>
+            <a:r>
+              <a:rPr/>
+              <a:t> </a:t>
+            </a:r>
+            <a:r>
+              <a:rPr/>
+              <a:t>BibTeX</a:t>
+            </a:r>
+            <a:r>
+              <a:rPr/>
+              <a:t> </a:t>
+            </a:r>
+            <a:r>
+              <a:rPr/>
+              <a:t>file</a:t>
+            </a:r>
+            <a:r>
+              <a:rPr/>
+              <a:t> </a:t>
+            </a:r>
+            <a:r>
+              <a:rPr/>
+              <a:t>to</a:t>
+            </a:r>
+            <a:r>
+              <a:rPr/>
+              <a:t> </a:t>
+            </a:r>
+            <a:r>
+              <a:rPr/>
+              <a:t>build</a:t>
+            </a:r>
+            <a:r>
+              <a:rPr/>
+              <a:t> </a:t>
+            </a:r>
+            <a:r>
+              <a:rPr/>
+              <a:t>the</a:t>
+            </a:r>
+            <a:r>
+              <a:rPr/>
+              <a:t> </a:t>
+            </a:r>
+            <a:r>
+              <a:rPr/>
+              <a:t>citations</a:t>
+            </a:r>
+            <a:r>
+              <a:rPr/>
+              <a:t> </a:t>
+            </a:r>
+            <a:r>
+              <a:rPr/>
+              <a:t>that</a:t>
+            </a:r>
+            <a:r>
+              <a:rPr/>
+              <a:t> </a:t>
+            </a:r>
+            <a:r>
+              <a:rPr/>
+              <a:t>are</a:t>
+            </a:r>
+            <a:r>
+              <a:rPr/>
+              <a:t> </a:t>
+            </a:r>
+            <a:r>
+              <a:rPr/>
+              <a:t>journal</a:t>
+            </a:r>
+            <a:r>
+              <a:rPr/>
+              <a:t> </a:t>
+            </a:r>
+            <a:r>
+              <a:rPr/>
+              <a:t>specific</a:t>
+            </a:r>
+          </a:p>
+        </p:txBody>
+      </p:sp>
+    </p:spTree>
+  </p:cSld>
+</p:sld>
+</file>
+
+<file path=ppt/slides/slide13.xml><?xml version="1.0" encoding="utf-8"?>
+<p:sld xmlns:a="http://schemas.openxmlformats.org/drawingml/2006/main" xmlns:r="http://schemas.openxmlformats.org/officeDocument/2006/relationships" xmlns:p="http://schemas.openxmlformats.org/presentationml/2006/main">
+  <p:cSld>
+    <p:spTree>
+      <p:nvGrpSpPr>
+        <p:cNvPr id="1" name=""/>
+        <p:cNvGrpSpPr/>
+        <p:nvPr/>
+      </p:nvGrpSpPr>
+      <p:grpSpPr>
+        <a:xfrm>
+          <a:off x="0" y="0"/>
+          <a:ext cx="0" cy="0"/>
+          <a:chOff x="0" y="0"/>
+          <a:chExt cx="0" cy="0"/>
+        </a:xfrm>
+      </p:grpSpPr>
+      <p:sp>
+        <p:nvSpPr>
+          <p:cNvPr id="2" name="Title 1"/>
+          <p:cNvSpPr>
+            <a:spLocks noGrp="1"/>
+          </p:cNvSpPr>
+          <p:nvPr>
+            <p:ph type="title"/>
+          </p:nvPr>
+        </p:nvSpPr>
+        <p:spPr>
+          <a:xfrm>
+            <a:off x="0" y="368238"/>
+            <a:ext cx="9144000" cy="363001"/>
+          </a:xfrm>
+        </p:spPr>
+        <p:txBody>
+          <a:bodyPr/>
+          <a:lstStyle/>
+          <a:p>
+            <a:pPr lvl="0" marL="0" indent="0">
+              <a:buNone/>
+            </a:pPr>
+            <a:r>
+              <a:rPr/>
+              <a:t>Incorporating</a:t>
+            </a:r>
+            <a:r>
+              <a:rPr/>
+              <a:t> </a:t>
+            </a:r>
+            <a:r>
+              <a:rPr/>
+              <a:t>version</a:t>
+            </a:r>
+            <a:r>
+              <a:rPr/>
+              <a:t> </a:t>
+            </a:r>
+            <a:r>
+              <a:rPr/>
+              <a:t>control</a:t>
+            </a:r>
+            <a:r>
+              <a:rPr/>
+              <a:t> </a:t>
+            </a:r>
+            <a:r>
+              <a:rPr/>
+              <a:t>with</a:t>
+            </a:r>
+            <a:r>
+              <a:rPr/>
+              <a:t> </a:t>
+            </a:r>
+            <a:r>
+              <a:rPr/>
+              <a:t>git/github</a:t>
+            </a:r>
+          </a:p>
+        </p:txBody>
+      </p:sp>
+    </p:spTree>
+  </p:cSld>
+</p:sld>
+</file>
+
+<file path=ppt/slides/slide14.xml><?xml version="1.0" encoding="utf-8"?>
+<p:sld xmlns:a="http://schemas.openxmlformats.org/drawingml/2006/main" xmlns:r="http://schemas.openxmlformats.org/officeDocument/2006/relationships" xmlns:p="http://schemas.openxmlformats.org/presentationml/2006/main">
+  <p:cSld>
+    <p:spTree>
+      <p:nvGrpSpPr>
+        <p:cNvPr id="1" name=""/>
+        <p:cNvGrpSpPr/>
+        <p:nvPr/>
+      </p:nvGrpSpPr>
+      <p:grpSpPr>
+        <a:xfrm>
+          <a:off x="0" y="0"/>
+          <a:ext cx="0" cy="0"/>
+          <a:chOff x="0" y="0"/>
+          <a:chExt cx="0" cy="0"/>
+        </a:xfrm>
+      </p:grpSpPr>
+      <p:sp>
+        <p:nvSpPr>
+          <p:cNvPr id="2" name="Title 1"/>
+          <p:cNvSpPr>
+            <a:spLocks noGrp="1"/>
+          </p:cNvSpPr>
+          <p:nvPr>
+            <p:ph type="title"/>
+          </p:nvPr>
+        </p:nvSpPr>
+        <p:spPr>
+          <a:xfrm>
+            <a:off x="0" y="368238"/>
+            <a:ext cx="9144000" cy="363001"/>
+          </a:xfrm>
+        </p:spPr>
+        <p:txBody>
+          <a:bodyPr/>
+          <a:lstStyle/>
+          <a:p>
+            <a:pPr lvl="0" marL="0" indent="0">
+              <a:buNone/>
+            </a:pPr>
+            <a:r>
+              <a:rPr/>
+              <a:t>Quick</a:t>
+            </a:r>
+            <a:r>
+              <a:rPr/>
+              <a:t> </a:t>
+            </a:r>
+            <a:r>
+              <a:rPr/>
+              <a:t>look</a:t>
+            </a:r>
+            <a:r>
+              <a:rPr/>
+              <a:t> </a:t>
+            </a:r>
+            <a:r>
+              <a:rPr/>
+              <a:t>at</a:t>
+            </a:r>
+            <a:r>
+              <a:rPr/>
+              <a:t> </a:t>
+            </a:r>
+            <a:r>
+              <a:rPr/>
+              <a:t>a</a:t>
+            </a:r>
+            <a:r>
+              <a:rPr/>
+              <a:t> </a:t>
+            </a:r>
+            <a:r>
+              <a:rPr/>
+              <a:t>manuscript</a:t>
+            </a:r>
+            <a:r>
+              <a:rPr/>
+              <a:t> </a:t>
+            </a:r>
+            <a:r>
+              <a:rPr/>
+              <a:t>-</a:t>
+            </a:r>
+            <a:r>
+              <a:rPr/>
+              <a:t> </a:t>
+            </a:r>
+            <a:r>
+              <a:rPr/>
+              <a:t>dummy</a:t>
+            </a:r>
+            <a:r>
+              <a:rPr/>
+              <a:t> </a:t>
+            </a:r>
+            <a:r>
+              <a:rPr/>
+              <a:t>Rmarkdown</a:t>
+            </a:r>
+            <a:r>
+              <a:rPr/>
+              <a:t> </a:t>
+            </a:r>
+            <a:r>
+              <a:rPr/>
+              <a:t>document</a:t>
+            </a:r>
+          </a:p>
+        </p:txBody>
+      </p:sp>
+    </p:spTree>
+  </p:cSld>
+</p:sld>
+</file>
+
+<file path=ppt/slides/slide15.xml><?xml version="1.0" encoding="utf-8"?>
+<p:sld xmlns:a="http://schemas.openxmlformats.org/drawingml/2006/main" xmlns:r="http://schemas.openxmlformats.org/officeDocument/2006/relationships" xmlns:p="http://schemas.openxmlformats.org/presentationml/2006/main">
+  <p:cSld>
+    <p:spTree>
+      <p:nvGrpSpPr>
+        <p:cNvPr id="1" name=""/>
+        <p:cNvGrpSpPr/>
+        <p:nvPr/>
+      </p:nvGrpSpPr>
+      <p:grpSpPr>
+        <a:xfrm>
+          <a:off x="0" y="0"/>
+          <a:ext cx="0" cy="0"/>
+          <a:chOff x="0" y="0"/>
+          <a:chExt cx="0" cy="0"/>
+        </a:xfrm>
+      </p:grpSpPr>
+      <p:sp>
+        <p:nvSpPr>
+          <p:cNvPr id="2" name="Title 1"/>
+          <p:cNvSpPr>
+            <a:spLocks noGrp="1"/>
+          </p:cNvSpPr>
+          <p:nvPr>
+            <p:ph type="title"/>
+          </p:nvPr>
+        </p:nvSpPr>
+        <p:spPr>
+          <a:xfrm>
+            <a:off x="0" y="368238"/>
+            <a:ext cx="9144000" cy="363001"/>
+          </a:xfrm>
+        </p:spPr>
+        <p:txBody>
+          <a:bodyPr/>
+          <a:lstStyle/>
+          <a:p>
+            <a:pPr lvl="0" marL="0" indent="0">
+              <a:buNone/>
+            </a:pPr>
+            <a:r>
+              <a:rPr/>
+              <a:t>Links</a:t>
+            </a:r>
+          </a:p>
+        </p:txBody>
+      </p:sp>
+      <p:sp>
+        <p:nvSpPr>
+          <p:cNvPr id="3" name="Content Placeholder 2"/>
+          <p:cNvSpPr>
+            <a:spLocks noGrp="1"/>
+          </p:cNvSpPr>
+          <p:nvPr>
+            <p:ph idx="1"/>
+          </p:nvPr>
+        </p:nvSpPr>
+        <p:spPr/>
+        <p:txBody>
+          <a:bodyPr/>
+          <a:lstStyle/>
+          <a:p>
+            <a:pPr lvl="1"/>
+            <a:r>
+              <a:rPr/>
+              <a:t>markdown </a:t>
+            </a:r>
+            <a:r>
+              <a:rPr>
+                <a:hlinkClick r:id="rId2"/>
+              </a:rPr>
+              <a:t>https://rstudio.com/wp-content/uploads/2015/03/rmarkdown-reference.pdf</a:t>
+            </a:r>
+            <a:r>
+              <a:rPr/>
+              <a:t>)</a:t>
+            </a:r>
+          </a:p>
+          <a:p>
+            <a:pPr lvl="1"/>
+            <a:r>
+              <a:rPr/>
+              <a:t>rmarkdown </a:t>
+            </a:r>
+            <a:r>
+              <a:rPr>
+                <a:hlinkClick r:id="rId3"/>
+              </a:rPr>
+              <a:t>https://rmarkdown.rstudio.com/lesson-1.html</a:t>
+            </a:r>
+          </a:p>
+          <a:p>
+            <a:pPr lvl="1"/>
+            <a:r>
+              <a:rPr/>
+              <a:t>rmarkdown cheat sheet </a:t>
+            </a:r>
+            <a:r>
+              <a:rPr>
+                <a:hlinkClick r:id="rId4"/>
+              </a:rPr>
+              <a:t>https://rstudio.com/wp-content/uploads/2015/02/rmarkdown-cheatsheet.pdf</a:t>
+            </a:r>
+          </a:p>
+          <a:p>
+            <a:pPr lvl="1"/>
+            <a:r>
+              <a:rPr/>
+              <a:t>rmarkdown book </a:t>
+            </a:r>
+            <a:r>
+              <a:rPr>
+                <a:hlinkClick r:id="rId5"/>
+              </a:rPr>
+              <a:t>https://bookdown.org/yihui/rmarkdown/powerpoint-presentation.html#ppt-templates</a:t>
+            </a:r>
+          </a:p>
+          <a:p>
+            <a:pPr lvl="1"/>
+            <a:r>
+              <a:rPr/>
+              <a:t>r chunks</a:t>
+            </a:r>
+          </a:p>
+          <a:p>
+            <a:pPr lvl="1"/>
+            <a:r>
+              <a:rPr/>
+              <a:t>template </a:t>
+            </a:r>
+            <a:r>
+              <a:rPr>
+                <a:hlinkClick r:id="rId6"/>
+              </a:rPr>
+              <a:t>https://support.office.com/en-us/article/create-a-template-86a1d089-5ae2-4d53-9042-1191bce57deb</a:t>
+            </a:r>
+          </a:p>
+          <a:p>
+            <a:pPr lvl="1"/>
+            <a:r>
+              <a:rPr/>
+              <a:t>equations </a:t>
+            </a:r>
+            <a:r>
+              <a:rPr>
+                <a:hlinkClick r:id="rId7"/>
+              </a:rPr>
+              <a:t>https://en.wikibooks.org/wiki/LaTeX/Mathematics</a:t>
+            </a:r>
+          </a:p>
+          <a:p>
+            <a:pPr lvl="1"/>
+            <a:r>
+              <a:rPr/>
+              <a:t>references</a:t>
+            </a:r>
+          </a:p>
+          <a:p>
+            <a:pPr lvl="1"/>
+            <a:r>
+              <a:rPr/>
+              <a:t>csl </a:t>
+            </a:r>
+            <a:r>
+              <a:rPr>
+                <a:hlinkClick r:id="rId8"/>
+              </a:rPr>
+              <a:t>https://github.com/citation-style-language/styles</a:t>
+            </a:r>
+          </a:p>
+          <a:p>
+            <a:pPr lvl="1"/>
+            <a:r>
+              <a:rPr/>
+              <a:t>version control with git/github</a:t>
+            </a:r>
+          </a:p>
+        </p:txBody>
+      </p:sp>
+    </p:spTree>
+  </p:cSld>
+</p:sld>
+</file>
+
 <file path=ppt/slides/slide2.xml><?xml version="1.0" encoding="utf-8"?>
 <p:sld xmlns:a="http://schemas.openxmlformats.org/drawingml/2006/main" xmlns:r="http://schemas.openxmlformats.org/officeDocument/2006/relationships" xmlns:p="http://schemas.openxmlformats.org/presentationml/2006/main">
   <p:cSld>
@@ -3229,8 +4204,8 @@
         </p:nvSpPr>
         <p:spPr>
           <a:xfrm>
-            <a:off x="457200" y="74042"/>
-            <a:ext cx="8229600" cy="363001"/>
+            <a:off x="0" y="368238"/>
+            <a:ext cx="9144000" cy="363001"/>
           </a:xfrm>
         </p:spPr>
         <p:txBody>
@@ -3326,7 +4301,7 @@
             <a:pPr lvl="1"/>
             <a:r>
               <a:rPr/>
-              <a:t>Integrating references using BibTeX</a:t>
+              <a:t>Using a word document template</a:t>
             </a:r>
           </a:p>
           <a:p>
@@ -3340,7 +4315,14 @@
             <a:pPr lvl="1"/>
             <a:r>
               <a:rPr/>
-              <a:t>Formatting references using CSL files</a:t>
+              <a:t>Integrating references</a:t>
+            </a:r>
+          </a:p>
+          <a:p>
+            <a:pPr lvl="1"/>
+            <a:r>
+              <a:rPr/>
+              <a:t>Formatting using CSL files</a:t>
             </a:r>
           </a:p>
           <a:p>
@@ -3386,8 +4368,8 @@
         </p:nvSpPr>
         <p:spPr>
           <a:xfrm>
-            <a:off x="457200" y="74042"/>
-            <a:ext cx="8229600" cy="363001"/>
+            <a:off x="0" y="368238"/>
+            <a:ext cx="9144000" cy="363001"/>
           </a:xfrm>
         </p:spPr>
         <p:txBody>
@@ -3420,8 +4402,8 @@
         </p:blipFill>
         <p:spPr bwMode="auto">
           <a:xfrm>
-            <a:off x="1422400" y="203200"/>
-            <a:ext cx="6273800" cy="4343400"/>
+            <a:off x="1981200" y="965200"/>
+            <a:ext cx="5181600" cy="3581400"/>
           </a:xfrm>
           <a:prstGeom prst="rect">
             <a:avLst/>
@@ -3552,15 +4534,20 @@
       </p:grpSpPr>
       <p:sp>
         <p:nvSpPr>
-          <p:cNvPr id="3" name="Content Placeholder 2"/>
-          <p:cNvSpPr>
-            <a:spLocks noGrp="1"/>
-          </p:cNvSpPr>
-          <p:nvPr>
-            <p:ph idx="1"/>
-          </p:nvPr>
-        </p:nvSpPr>
-        <p:spPr/>
+          <p:cNvPr id="2" name="Title 1"/>
+          <p:cNvSpPr>
+            <a:spLocks noGrp="1"/>
+          </p:cNvSpPr>
+          <p:nvPr>
+            <p:ph type="title"/>
+          </p:nvPr>
+        </p:nvSpPr>
+        <p:spPr>
+          <a:xfrm>
+            <a:off x="0" y="368238"/>
+            <a:ext cx="9144000" cy="363001"/>
+          </a:xfrm>
+        </p:spPr>
         <p:txBody>
           <a:bodyPr/>
           <a:lstStyle/>
@@ -3570,11 +4557,211 @@
             </a:pPr>
             <a:r>
               <a:rPr/>
-              <a:t> </a:t>
-            </a:r>
-            <a:r>
-              <a:rPr/>
-              <a:t>link</a:t>
+              <a:t>Rmarkdown</a:t>
+            </a:r>
+          </a:p>
+        </p:txBody>
+      </p:sp>
+      <p:pic>
+        <p:nvPicPr>
+          <p:cNvPr descr="/Users/jennahamlin/Desktop/GiGte/images/Rmarkdown.open.png" id="0" name="Picture 1"/>
+          <p:cNvPicPr>
+            <a:picLocks noGrp="1" noChangeAspect="1"/>
+          </p:cNvPicPr>
+          <p:nvPr/>
+        </p:nvPicPr>
+        <p:blipFill>
+          <a:blip r:embed="rId2"/>
+          <a:stretch>
+            <a:fillRect/>
+          </a:stretch>
+        </p:blipFill>
+        <p:spPr bwMode="auto">
+          <a:xfrm>
+            <a:off x="114300" y="1270000"/>
+            <a:ext cx="8902700" cy="2959100"/>
+          </a:xfrm>
+          <a:prstGeom prst="rect">
+            <a:avLst/>
+          </a:prstGeom>
+          <a:noFill/>
+          <a:ln w="9525">
+            <a:noFill/>
+            <a:headEnd/>
+            <a:tailEnd/>
+          </a:ln>
+        </p:spPr>
+      </p:pic>
+      <p:sp>
+        <p:nvSpPr>
+          <p:cNvPr id="1" name="TextBox 3"/>
+          <p:cNvSpPr txBox="1"/>
+          <p:nvPr/>
+        </p:nvSpPr>
+        <p:spPr>
+          <a:xfrm>
+            <a:off x="114300" y="4546600"/>
+            <a:ext cx="8902700" cy="508000"/>
+          </a:xfrm>
+          <a:prstGeom prst="rect">
+            <a:avLst/>
+          </a:prstGeom>
+          <a:noFill/>
+        </p:spPr>
+        <p:txBody>
+          <a:bodyPr/>
+          <a:lstStyle/>
+          <a:p>
+            <a:pPr lvl="0" marL="0" indent="0" algn="ctr">
+              <a:buNone/>
+            </a:pPr>
+            <a:r>
+              <a:rPr/>
+              <a:t>Text</a:t>
+            </a:r>
+            <a:r>
+              <a:rPr/>
+              <a:t> </a:t>
+            </a:r>
+            <a:r>
+              <a:rPr/>
+              <a:t>file</a:t>
+            </a:r>
+            <a:r>
+              <a:rPr/>
+              <a:t> </a:t>
+            </a:r>
+            <a:r>
+              <a:rPr/>
+              <a:t>that</a:t>
+            </a:r>
+            <a:r>
+              <a:rPr/>
+              <a:t> </a:t>
+            </a:r>
+            <a:r>
+              <a:rPr/>
+              <a:t>can</a:t>
+            </a:r>
+            <a:r>
+              <a:rPr/>
+              <a:t> </a:t>
+            </a:r>
+            <a:r>
+              <a:rPr/>
+              <a:t>execute</a:t>
+            </a:r>
+            <a:r>
+              <a:rPr/>
+              <a:t> </a:t>
+            </a:r>
+            <a:r>
+              <a:rPr/>
+              <a:t>code</a:t>
+            </a:r>
+            <a:r>
+              <a:rPr/>
+              <a:t> </a:t>
+            </a:r>
+            <a:r>
+              <a:rPr/>
+              <a:t>making</a:t>
+            </a:r>
+            <a:r>
+              <a:rPr/>
+              <a:t> </a:t>
+            </a:r>
+            <a:r>
+              <a:rPr/>
+              <a:t>reproducibile</a:t>
+            </a:r>
+            <a:r>
+              <a:rPr/>
+              <a:t> </a:t>
+            </a:r>
+            <a:r>
+              <a:rPr/>
+              <a:t>output</a:t>
+            </a:r>
+            <a:r>
+              <a:rPr/>
+              <a:t> </a:t>
+            </a:r>
+            <a:r>
+              <a:rPr/>
+              <a:t>in</a:t>
+            </a:r>
+            <a:r>
+              <a:rPr/>
+              <a:t> </a:t>
+            </a:r>
+            <a:r>
+              <a:rPr/>
+              <a:t>a</a:t>
+            </a:r>
+            <a:r>
+              <a:rPr/>
+              <a:t> </a:t>
+            </a:r>
+            <a:r>
+              <a:rPr/>
+              <a:t>dozen</a:t>
+            </a:r>
+            <a:r>
+              <a:rPr/>
+              <a:t> </a:t>
+            </a:r>
+            <a:r>
+              <a:rPr/>
+              <a:t>static</a:t>
+            </a:r>
+            <a:r>
+              <a:rPr/>
+              <a:t> </a:t>
+            </a:r>
+            <a:r>
+              <a:rPr/>
+              <a:t>and</a:t>
+            </a:r>
+            <a:r>
+              <a:rPr/>
+              <a:t> </a:t>
+            </a:r>
+            <a:r>
+              <a:rPr/>
+              <a:t>dynamic</a:t>
+            </a:r>
+            <a:r>
+              <a:rPr/>
+              <a:t> </a:t>
+            </a:r>
+            <a:r>
+              <a:rPr/>
+              <a:t>formats</a:t>
+            </a:r>
+            <a:r>
+              <a:rPr/>
+              <a:t> </a:t>
+            </a:r>
+            <a:r>
+              <a:rPr/>
+              <a:t>(including</a:t>
+            </a:r>
+            <a:r>
+              <a:rPr/>
+              <a:t> </a:t>
+            </a:r>
+            <a:r>
+              <a:rPr/>
+              <a:t>this</a:t>
+            </a:r>
+            <a:r>
+              <a:rPr/>
+              <a:t> </a:t>
+            </a:r>
+            <a:r>
+              <a:rPr/>
+              <a:t>powerpoint).</a:t>
             </a:r>
           </a:p>
         </p:txBody>
@@ -3613,8 +4800,8 @@
         </p:nvSpPr>
         <p:spPr>
           <a:xfrm>
-            <a:off x="457200" y="74042"/>
-            <a:ext cx="8229600" cy="363001"/>
+            <a:off x="0" y="368238"/>
+            <a:ext cx="9144000" cy="363001"/>
           </a:xfrm>
         </p:spPr>
         <p:txBody>
@@ -3626,14 +4813,22 @@
             </a:pPr>
             <a:r>
               <a:rPr/>
-              <a:t>Rmarkdown</a:t>
+              <a:t>.Rmd</a:t>
+            </a:r>
+            <a:r>
+              <a:rPr/>
+              <a:t> </a:t>
+            </a:r>
+            <a:r>
+              <a:rPr/>
+              <a:t>files</a:t>
             </a:r>
           </a:p>
         </p:txBody>
       </p:sp>
       <p:pic>
         <p:nvPicPr>
-          <p:cNvPr descr="/Users/jennahamlin/Desktop/GiGte/images/Rmarkdown.open.png" id="0" name="Picture 1"/>
+          <p:cNvPr descr="/Users/jennahamlin/Desktop/GiGte/images/Rmd.output.png" id="0" name="Picture 1"/>
           <p:cNvPicPr>
             <a:picLocks noGrp="1" noChangeAspect="1"/>
           </p:cNvPicPr>
@@ -3647,8 +4842,8 @@
         </p:blipFill>
         <p:spPr bwMode="auto">
           <a:xfrm>
-            <a:off x="114300" y="889000"/>
-            <a:ext cx="8902700" cy="2959100"/>
+            <a:off x="2184400" y="965200"/>
+            <a:ext cx="4775200" cy="3581400"/>
           </a:xfrm>
           <a:prstGeom prst="rect">
             <a:avLst/>
@@ -3686,47 +4881,15 @@
             </a:pPr>
             <a:r>
               <a:rPr/>
-              <a:t>Rmarkdown</a:t>
-            </a:r>
-            <a:r>
-              <a:rPr/>
-              <a:t> </a:t>
-            </a:r>
-            <a:r>
-              <a:rPr/>
-              <a:t>is</a:t>
-            </a:r>
-            <a:r>
-              <a:rPr/>
-              <a:t> </a:t>
-            </a:r>
-            <a:r>
-              <a:rPr/>
-              <a:t>a</a:t>
-            </a:r>
-            <a:r>
-              <a:rPr/>
-              <a:t> </a:t>
-            </a:r>
-            <a:r>
-              <a:rPr/>
-              <a:t>text</a:t>
-            </a:r>
-            <a:r>
-              <a:rPr/>
-              <a:t> </a:t>
-            </a:r>
-            <a:r>
-              <a:rPr/>
-              <a:t>file</a:t>
-            </a:r>
-            <a:r>
-              <a:rPr/>
-              <a:t> </a:t>
-            </a:r>
-            <a:r>
-              <a:rPr/>
-              <a:t>that</a:t>
+              <a:t>.Rmd</a:t>
+            </a:r>
+            <a:r>
+              <a:rPr/>
+              <a:t> </a:t>
+            </a:r>
+            <a:r>
+              <a:rPr/>
+              <a:t>files</a:t>
             </a:r>
             <a:r>
               <a:rPr/>
@@ -3742,31 +4905,15 @@
             </a:r>
             <a:r>
               <a:rPr/>
-              <a:t>generate</a:t>
-            </a:r>
-            <a:r>
-              <a:rPr/>
-              <a:t> </a:t>
-            </a:r>
-            <a:r>
-              <a:rPr/>
-              <a:t>high</a:t>
-            </a:r>
-            <a:r>
-              <a:rPr/>
-              <a:t> </a:t>
-            </a:r>
-            <a:r>
-              <a:rPr/>
-              <a:t>quality</a:t>
-            </a:r>
-            <a:r>
-              <a:rPr/>
-              <a:t> </a:t>
-            </a:r>
-            <a:r>
-              <a:rPr/>
-              <a:t>reports</a:t>
+              <a:t>be</a:t>
+            </a:r>
+            <a:r>
+              <a:rPr/>
+              <a:t> </a:t>
+            </a:r>
+            <a:r>
+              <a:rPr/>
+              <a:t>opened</a:t>
             </a:r>
             <a:r>
               <a:rPr/>
@@ -3782,55 +4929,7 @@
             </a:r>
             <a:r>
               <a:rPr/>
-              <a:t>execute</a:t>
-            </a:r>
-            <a:r>
-              <a:rPr/>
-              <a:t> </a:t>
-            </a:r>
-            <a:r>
-              <a:rPr/>
-              <a:t>code</a:t>
-            </a:r>
-            <a:r>
-              <a:rPr/>
-              <a:t> </a:t>
-            </a:r>
-            <a:r>
-              <a:rPr/>
-              <a:t>which</a:t>
-            </a:r>
-            <a:r>
-              <a:rPr/>
-              <a:t> </a:t>
-            </a:r>
-            <a:r>
-              <a:rPr/>
-              <a:t>allows</a:t>
-            </a:r>
-            <a:r>
-              <a:rPr/>
-              <a:t> </a:t>
-            </a:r>
-            <a:r>
-              <a:rPr/>
-              <a:t>reproducibility</a:t>
-            </a:r>
-            <a:r>
-              <a:rPr/>
-              <a:t> </a:t>
-            </a:r>
-            <a:r>
-              <a:rPr/>
-              <a:t>for</a:t>
-            </a:r>
-            <a:r>
-              <a:rPr/>
-              <a:t> </a:t>
-            </a:r>
-            <a:r>
-              <a:rPr/>
-              <a:t>output</a:t>
+              <a:t>edited</a:t>
             </a:r>
             <a:r>
               <a:rPr/>
@@ -3846,23 +4945,7 @@
             </a:r>
             <a:r>
               <a:rPr/>
-              <a:t>a</a:t>
-            </a:r>
-            <a:r>
-              <a:rPr/>
-              <a:t> </a:t>
-            </a:r>
-            <a:r>
-              <a:rPr/>
-              <a:t>dozen</a:t>
-            </a:r>
-            <a:r>
-              <a:rPr/>
-              <a:t> </a:t>
-            </a:r>
-            <a:r>
-              <a:rPr/>
-              <a:t>static</a:t>
+              <a:t>Rstudio,</a:t>
             </a:r>
             <a:r>
               <a:rPr/>
@@ -3878,39 +4961,95 @@
             </a:r>
             <a:r>
               <a:rPr/>
-              <a:t>dynamic</a:t>
-            </a:r>
-            <a:r>
-              <a:rPr/>
-              <a:t> </a:t>
-            </a:r>
-            <a:r>
-              <a:rPr/>
-              <a:t>formats</a:t>
-            </a:r>
-            <a:r>
-              <a:rPr/>
-              <a:t> </a:t>
-            </a:r>
-            <a:r>
-              <a:rPr/>
-              <a:t>(including</a:t>
-            </a:r>
-            <a:r>
-              <a:rPr/>
-              <a:t> </a:t>
-            </a:r>
-            <a:r>
-              <a:rPr/>
-              <a:t>this</a:t>
-            </a:r>
-            <a:r>
-              <a:rPr/>
-              <a:t> </a:t>
-            </a:r>
-            <a:r>
-              <a:rPr/>
-              <a:t>powerpoint).</a:t>
+              <a:t>turned</a:t>
+            </a:r>
+            <a:r>
+              <a:rPr/>
+              <a:t> </a:t>
+            </a:r>
+            <a:r>
+              <a:rPr/>
+              <a:t>into</a:t>
+            </a:r>
+            <a:r>
+              <a:rPr/>
+              <a:t> </a:t>
+            </a:r>
+            <a:r>
+              <a:rPr/>
+              <a:t>HTML,</a:t>
+            </a:r>
+            <a:r>
+              <a:rPr/>
+              <a:t> </a:t>
+            </a:r>
+            <a:r>
+              <a:rPr/>
+              <a:t>PDF,</a:t>
+            </a:r>
+            <a:r>
+              <a:rPr/>
+              <a:t> </a:t>
+            </a:r>
+            <a:r>
+              <a:rPr/>
+              <a:t>or</a:t>
+            </a:r>
+            <a:r>
+              <a:rPr/>
+              <a:t> </a:t>
+            </a:r>
+            <a:r>
+              <a:rPr/>
+              <a:t>DOCX</a:t>
+            </a:r>
+            <a:r>
+              <a:rPr/>
+              <a:t> </a:t>
+            </a:r>
+            <a:r>
+              <a:rPr/>
+              <a:t>files</a:t>
+            </a:r>
+            <a:r>
+              <a:rPr/>
+              <a:t> </a:t>
+            </a:r>
+            <a:r>
+              <a:rPr/>
+              <a:t>with</a:t>
+            </a:r>
+            <a:r>
+              <a:rPr/>
+              <a:t> </a:t>
+            </a:r>
+            <a:r>
+              <a:rPr/>
+              <a:t>the</a:t>
+            </a:r>
+            <a:r>
+              <a:rPr/>
+              <a:t> </a:t>
+            </a:r>
+            <a:r>
+              <a:rPr/>
+              <a:t>push</a:t>
+            </a:r>
+            <a:r>
+              <a:rPr/>
+              <a:t> </a:t>
+            </a:r>
+            <a:r>
+              <a:rPr/>
+              <a:t>of</a:t>
+            </a:r>
+            <a:r>
+              <a:rPr/>
+              <a:t> </a:t>
+            </a:r>
+            <a:r>
+              <a:rPr/>
+              <a:t>button</a:t>
             </a:r>
           </a:p>
         </p:txBody>
@@ -3939,15 +5078,20 @@
       </p:grpSpPr>
       <p:sp>
         <p:nvSpPr>
-          <p:cNvPr id="3" name="Content Placeholder 2"/>
-          <p:cNvSpPr>
-            <a:spLocks noGrp="1"/>
-          </p:cNvSpPr>
-          <p:nvPr>
-            <p:ph idx="1"/>
-          </p:nvPr>
-        </p:nvSpPr>
-        <p:spPr/>
+          <p:cNvPr id="2" name="Title 1"/>
+          <p:cNvSpPr>
+            <a:spLocks noGrp="1"/>
+          </p:cNvSpPr>
+          <p:nvPr>
+            <p:ph type="title"/>
+          </p:nvPr>
+        </p:nvSpPr>
+        <p:spPr>
+          <a:xfrm>
+            <a:off x="0" y="368238"/>
+            <a:ext cx="9144000" cy="363001"/>
+          </a:xfrm>
+        </p:spPr>
         <p:txBody>
           <a:bodyPr/>
           <a:lstStyle/>
@@ -3957,13 +5101,211 @@
             </a:pPr>
             <a:r>
               <a:rPr/>
-              <a:t> </a:t>
-            </a:r>
-            <a:r>
-              <a:rPr>
-                <a:hlinkClick r:id="rId2"/>
-              </a:rPr>
-              <a:t>https://rmarkdown.rstudio.com/lesson-1.html</a:t>
+              <a:t>Analyses</a:t>
+            </a:r>
+            <a:r>
+              <a:rPr/>
+              <a:t> </a:t>
+            </a:r>
+            <a:r>
+              <a:rPr/>
+              <a:t>using</a:t>
+            </a:r>
+            <a:r>
+              <a:rPr/>
+              <a:t> </a:t>
+            </a:r>
+            <a:r>
+              <a:rPr/>
+              <a:t>R</a:t>
+            </a:r>
+            <a:r>
+              <a:rPr/>
+              <a:t> </a:t>
+            </a:r>
+            <a:r>
+              <a:rPr/>
+              <a:t>code</a:t>
+            </a:r>
+          </a:p>
+        </p:txBody>
+      </p:sp>
+      <p:pic>
+        <p:nvPicPr>
+          <p:cNvPr descr="/Users/jennahamlin/Desktop/GiGte/images/integrateRCode.png" id="0" name="Picture 1"/>
+          <p:cNvPicPr>
+            <a:picLocks noGrp="1" noChangeAspect="1"/>
+          </p:cNvPicPr>
+          <p:nvPr/>
+        </p:nvPicPr>
+        <p:blipFill>
+          <a:blip r:embed="rId2"/>
+          <a:stretch>
+            <a:fillRect/>
+          </a:stretch>
+        </p:blipFill>
+        <p:spPr bwMode="auto">
+          <a:xfrm>
+            <a:off x="2184400" y="965200"/>
+            <a:ext cx="4775200" cy="3581400"/>
+          </a:xfrm>
+          <a:prstGeom prst="rect">
+            <a:avLst/>
+          </a:prstGeom>
+          <a:noFill/>
+          <a:ln w="9525">
+            <a:noFill/>
+            <a:headEnd/>
+            <a:tailEnd/>
+          </a:ln>
+        </p:spPr>
+      </p:pic>
+      <p:sp>
+        <p:nvSpPr>
+          <p:cNvPr id="1" name="TextBox 3"/>
+          <p:cNvSpPr txBox="1"/>
+          <p:nvPr/>
+        </p:nvSpPr>
+        <p:spPr>
+          <a:xfrm>
+            <a:off x="114300" y="4546600"/>
+            <a:ext cx="8902700" cy="508000"/>
+          </a:xfrm>
+          <a:prstGeom prst="rect">
+            <a:avLst/>
+          </a:prstGeom>
+          <a:noFill/>
+        </p:spPr>
+        <p:txBody>
+          <a:bodyPr/>
+          <a:lstStyle/>
+          <a:p>
+            <a:pPr lvl="0" marL="0" indent="0" algn="ctr">
+              <a:buNone/>
+            </a:pPr>
+            <a:r>
+              <a:rPr/>
+              <a:t>Integrate</a:t>
+            </a:r>
+            <a:r>
+              <a:rPr/>
+              <a:t> </a:t>
+            </a:r>
+            <a:r>
+              <a:rPr/>
+              <a:t>R</a:t>
+            </a:r>
+            <a:r>
+              <a:rPr/>
+              <a:t> </a:t>
+            </a:r>
+            <a:r>
+              <a:rPr/>
+              <a:t>code</a:t>
+            </a:r>
+            <a:r>
+              <a:rPr/>
+              <a:t> </a:t>
+            </a:r>
+            <a:r>
+              <a:rPr/>
+              <a:t>(R</a:t>
+            </a:r>
+            <a:r>
+              <a:rPr/>
+              <a:t> </a:t>
+            </a:r>
+            <a:r>
+              <a:rPr/>
+              <a:t>chunks)</a:t>
+            </a:r>
+            <a:r>
+              <a:rPr/>
+              <a:t> </a:t>
+            </a:r>
+            <a:r>
+              <a:rPr/>
+              <a:t>directly</a:t>
+            </a:r>
+            <a:r>
+              <a:rPr/>
+              <a:t> </a:t>
+            </a:r>
+            <a:r>
+              <a:rPr/>
+              <a:t>avoiding</a:t>
+            </a:r>
+            <a:r>
+              <a:rPr/>
+              <a:t> </a:t>
+            </a:r>
+            <a:r>
+              <a:rPr/>
+              <a:t>the</a:t>
+            </a:r>
+            <a:r>
+              <a:rPr/>
+              <a:t> </a:t>
+            </a:r>
+            <a:r>
+              <a:rPr/>
+              <a:t>need</a:t>
+            </a:r>
+            <a:r>
+              <a:rPr/>
+              <a:t> </a:t>
+            </a:r>
+            <a:r>
+              <a:rPr/>
+              <a:t>to</a:t>
+            </a:r>
+            <a:r>
+              <a:rPr/>
+              <a:t> </a:t>
+            </a:r>
+            <a:r>
+              <a:rPr/>
+              <a:t>awkwardly</a:t>
+            </a:r>
+            <a:r>
+              <a:rPr/>
+              <a:t> </a:t>
+            </a:r>
+            <a:r>
+              <a:rPr/>
+              <a:t>copy-paste</a:t>
+            </a:r>
+            <a:r>
+              <a:rPr/>
+              <a:t> </a:t>
+            </a:r>
+            <a:r>
+              <a:rPr/>
+              <a:t>analyses,</a:t>
+            </a:r>
+            <a:r>
+              <a:rPr/>
+              <a:t> </a:t>
+            </a:r>
+            <a:r>
+              <a:rPr/>
+              <a:t>tables,</a:t>
+            </a:r>
+            <a:r>
+              <a:rPr/>
+              <a:t> </a:t>
+            </a:r>
+            <a:r>
+              <a:rPr/>
+              <a:t>or</a:t>
+            </a:r>
+            <a:r>
+              <a:rPr/>
+              <a:t> </a:t>
+            </a:r>
+            <a:r>
+              <a:rPr/>
+              <a:t>figures</a:t>
             </a:r>
           </a:p>
         </p:txBody>
@@ -3992,20 +5334,15 @@
       </p:grpSpPr>
       <p:sp>
         <p:nvSpPr>
-          <p:cNvPr id="2" name="Title 1"/>
-          <p:cNvSpPr>
-            <a:spLocks noGrp="1"/>
-          </p:cNvSpPr>
-          <p:nvPr>
-            <p:ph type="title"/>
-          </p:nvPr>
-        </p:nvSpPr>
-        <p:spPr>
-          <a:xfrm>
-            <a:off x="457200" y="74042"/>
-            <a:ext cx="8229600" cy="363001"/>
-          </a:xfrm>
-        </p:spPr>
+          <p:cNvPr id="3" name="Content Placeholder 2"/>
+          <p:cNvSpPr>
+            <a:spLocks noGrp="1"/>
+          </p:cNvSpPr>
+          <p:nvPr>
+            <p:ph idx="1"/>
+          </p:nvPr>
+        </p:nvSpPr>
+        <p:spPr/>
         <p:txBody>
           <a:bodyPr/>
           <a:lstStyle/>
@@ -4015,243 +5352,7 @@
             </a:pPr>
             <a:r>
               <a:rPr/>
-              <a:t>.Rmd</a:t>
-            </a:r>
-            <a:r>
-              <a:rPr/>
-              <a:t> </a:t>
-            </a:r>
-            <a:r>
-              <a:rPr/>
-              <a:t>files</a:t>
-            </a:r>
-          </a:p>
-        </p:txBody>
-      </p:sp>
-      <p:pic>
-        <p:nvPicPr>
-          <p:cNvPr descr="/Users/jennahamlin/Desktop/GiGte/images/Rmd.output.png" id="0" name="Picture 1"/>
-          <p:cNvPicPr>
-            <a:picLocks noGrp="1" noChangeAspect="1"/>
-          </p:cNvPicPr>
-          <p:nvPr/>
-        </p:nvPicPr>
-        <p:blipFill>
-          <a:blip r:embed="rId2"/>
-          <a:stretch>
-            <a:fillRect/>
-          </a:stretch>
-        </p:blipFill>
-        <p:spPr bwMode="auto">
-          <a:xfrm>
-            <a:off x="1676400" y="203200"/>
-            <a:ext cx="5791200" cy="4343400"/>
-          </a:xfrm>
-          <a:prstGeom prst="rect">
-            <a:avLst/>
-          </a:prstGeom>
-          <a:noFill/>
-          <a:ln w="9525">
-            <a:noFill/>
-            <a:headEnd/>
-            <a:tailEnd/>
-          </a:ln>
-        </p:spPr>
-      </p:pic>
-      <p:sp>
-        <p:nvSpPr>
-          <p:cNvPr id="1" name="TextBox 3"/>
-          <p:cNvSpPr txBox="1"/>
-          <p:nvPr/>
-        </p:nvSpPr>
-        <p:spPr>
-          <a:xfrm>
-            <a:off x="114300" y="4546600"/>
-            <a:ext cx="8902700" cy="508000"/>
-          </a:xfrm>
-          <a:prstGeom prst="rect">
-            <a:avLst/>
-          </a:prstGeom>
-          <a:noFill/>
-        </p:spPr>
-        <p:txBody>
-          <a:bodyPr/>
-          <a:lstStyle/>
-          <a:p>
-            <a:pPr lvl="0" marL="0" indent="0" algn="ctr">
-              <a:buNone/>
-            </a:pPr>
-            <a:r>
-              <a:rPr/>
-              <a:t>.Rmd</a:t>
-            </a:r>
-            <a:r>
-              <a:rPr/>
-              <a:t> </a:t>
-            </a:r>
-            <a:r>
-              <a:rPr/>
-              <a:t>files</a:t>
-            </a:r>
-            <a:r>
-              <a:rPr/>
-              <a:t> </a:t>
-            </a:r>
-            <a:r>
-              <a:rPr/>
-              <a:t>can</a:t>
-            </a:r>
-            <a:r>
-              <a:rPr/>
-              <a:t> </a:t>
-            </a:r>
-            <a:r>
-              <a:rPr/>
-              <a:t>be</a:t>
-            </a:r>
-            <a:r>
-              <a:rPr/>
-              <a:t> </a:t>
-            </a:r>
-            <a:r>
-              <a:rPr/>
-              <a:t>opened</a:t>
-            </a:r>
-            <a:r>
-              <a:rPr/>
-              <a:t> </a:t>
-            </a:r>
-            <a:r>
-              <a:rPr/>
-              <a:t>and</a:t>
-            </a:r>
-            <a:r>
-              <a:rPr/>
-              <a:t> </a:t>
-            </a:r>
-            <a:r>
-              <a:rPr/>
-              <a:t>edited</a:t>
-            </a:r>
-            <a:r>
-              <a:rPr/>
-              <a:t> </a:t>
-            </a:r>
-            <a:r>
-              <a:rPr/>
-              <a:t>in</a:t>
-            </a:r>
-            <a:r>
-              <a:rPr/>
-              <a:t> </a:t>
-            </a:r>
-            <a:r>
-              <a:rPr/>
-              <a:t>Rstudio,</a:t>
-            </a:r>
-            <a:r>
-              <a:rPr/>
-              <a:t> </a:t>
-            </a:r>
-            <a:r>
-              <a:rPr/>
-              <a:t>and</a:t>
-            </a:r>
-            <a:r>
-              <a:rPr/>
-              <a:t> </a:t>
-            </a:r>
-            <a:r>
-              <a:rPr/>
-              <a:t>turned</a:t>
-            </a:r>
-            <a:r>
-              <a:rPr/>
-              <a:t> </a:t>
-            </a:r>
-            <a:r>
-              <a:rPr/>
-              <a:t>into</a:t>
-            </a:r>
-            <a:r>
-              <a:rPr/>
-              <a:t> </a:t>
-            </a:r>
-            <a:r>
-              <a:rPr/>
-              <a:t>HTML,</a:t>
-            </a:r>
-            <a:r>
-              <a:rPr/>
-              <a:t> </a:t>
-            </a:r>
-            <a:r>
-              <a:rPr/>
-              <a:t>PDF,</a:t>
-            </a:r>
-            <a:r>
-              <a:rPr/>
-              <a:t> </a:t>
-            </a:r>
-            <a:r>
-              <a:rPr/>
-              <a:t>or</a:t>
-            </a:r>
-            <a:r>
-              <a:rPr/>
-              <a:t> </a:t>
-            </a:r>
-            <a:r>
-              <a:rPr/>
-              <a:t>DOCX</a:t>
-            </a:r>
-            <a:r>
-              <a:rPr/>
-              <a:t> </a:t>
-            </a:r>
-            <a:r>
-              <a:rPr/>
-              <a:t>files</a:t>
-            </a:r>
-            <a:r>
-              <a:rPr/>
-              <a:t> </a:t>
-            </a:r>
-            <a:r>
-              <a:rPr/>
-              <a:t>with</a:t>
-            </a:r>
-            <a:r>
-              <a:rPr/>
-              <a:t> </a:t>
-            </a:r>
-            <a:r>
-              <a:rPr/>
-              <a:t>the</a:t>
-            </a:r>
-            <a:r>
-              <a:rPr/>
-              <a:t> </a:t>
-            </a:r>
-            <a:r>
-              <a:rPr/>
-              <a:t>push</a:t>
-            </a:r>
-            <a:r>
-              <a:rPr/>
-              <a:t> </a:t>
-            </a:r>
-            <a:r>
-              <a:rPr/>
-              <a:t>of</a:t>
-            </a:r>
-            <a:r>
-              <a:rPr/>
-              <a:t> </a:t>
-            </a:r>
-            <a:r>
-              <a:rPr/>
-              <a:t>button</a:t>
+              <a:t> # Analyses using R code 2</a:t>
             </a:r>
           </a:p>
         </p:txBody>
@@ -4278,63 +5379,9 @@
           <a:chExt cx="0" cy="0"/>
         </a:xfrm>
       </p:grpSpPr>
-      <p:sp>
-        <p:nvSpPr>
-          <p:cNvPr id="2" name="Title 1"/>
-          <p:cNvSpPr>
-            <a:spLocks noGrp="1"/>
-          </p:cNvSpPr>
-          <p:nvPr>
-            <p:ph type="title"/>
-          </p:nvPr>
-        </p:nvSpPr>
-        <p:spPr>
-          <a:xfrm>
-            <a:off x="457200" y="74042"/>
-            <a:ext cx="8229600" cy="363001"/>
-          </a:xfrm>
-        </p:spPr>
-        <p:txBody>
-          <a:bodyPr/>
-          <a:lstStyle/>
-          <a:p>
-            <a:pPr lvl="0" marL="0" indent="0">
-              <a:buNone/>
-            </a:pPr>
-            <a:r>
-              <a:rPr/>
-              <a:t>Analyses</a:t>
-            </a:r>
-            <a:r>
-              <a:rPr/>
-              <a:t> </a:t>
-            </a:r>
-            <a:r>
-              <a:rPr/>
-              <a:t>using</a:t>
-            </a:r>
-            <a:r>
-              <a:rPr/>
-              <a:t> </a:t>
-            </a:r>
-            <a:r>
-              <a:rPr/>
-              <a:t>R</a:t>
-            </a:r>
-            <a:r>
-              <a:rPr/>
-              <a:t> </a:t>
-            </a:r>
-            <a:r>
-              <a:rPr/>
-              <a:t>code</a:t>
-            </a:r>
-          </a:p>
-        </p:txBody>
-      </p:sp>
       <p:pic>
         <p:nvPicPr>
-          <p:cNvPr descr="/Users/jennahamlin/Desktop/GiGte/images/integrateRCode.png" id="0" name="Picture 1"/>
+          <p:cNvPr descr="/Users/jennahamlin/Desktop/GiGte/images/rCodeChunks.png" id="0" name="Picture 1"/>
           <p:cNvPicPr>
             <a:picLocks noGrp="1" noChangeAspect="1"/>
           </p:cNvPicPr>
@@ -4348,8 +5395,8 @@
         </p:blipFill>
         <p:spPr bwMode="auto">
           <a:xfrm>
-            <a:off x="1676400" y="203200"/>
-            <a:ext cx="5791200" cy="4343400"/>
+            <a:off x="2184400" y="965200"/>
+            <a:ext cx="4775200" cy="3581400"/>
           </a:xfrm>
           <a:prstGeom prst="rect">
             <a:avLst/>
@@ -4387,23 +5434,15 @@
             </a:pPr>
             <a:r>
               <a:rPr/>
-              <a:t>Integrate</a:t>
-            </a:r>
-            <a:r>
-              <a:rPr/>
-              <a:t> </a:t>
-            </a:r>
-            <a:r>
-              <a:rPr/>
-              <a:t>R</a:t>
-            </a:r>
-            <a:r>
-              <a:rPr/>
-              <a:t> </a:t>
-            </a:r>
-            <a:r>
-              <a:rPr/>
-              <a:t>code</a:t>
+              <a:t>embed</a:t>
+            </a:r>
+            <a:r>
+              <a:rPr/>
+              <a:t> </a:t>
+            </a:r>
+            <a:r>
+              <a:rPr/>
+              <a:t>figures</a:t>
             </a:r>
             <a:r>
               <a:rPr/>
@@ -4419,79 +5458,23 @@
             </a:r>
             <a:r>
               <a:rPr/>
-              <a:t>(avoiding</a:t>
-            </a:r>
-            <a:r>
-              <a:rPr/>
-              <a:t> </a:t>
-            </a:r>
-            <a:r>
-              <a:rPr/>
-              <a:t>the</a:t>
-            </a:r>
-            <a:r>
-              <a:rPr/>
-              <a:t> </a:t>
-            </a:r>
-            <a:r>
-              <a:rPr/>
-              <a:t>need</a:t>
-            </a:r>
-            <a:r>
-              <a:rPr/>
-              <a:t> </a:t>
-            </a:r>
-            <a:r>
-              <a:rPr/>
-              <a:t>to</a:t>
-            </a:r>
-            <a:r>
-              <a:rPr/>
-              <a:t> </a:t>
-            </a:r>
-            <a:r>
-              <a:rPr/>
-              <a:t>awkwardly</a:t>
-            </a:r>
-            <a:r>
-              <a:rPr/>
-              <a:t> </a:t>
-            </a:r>
-            <a:r>
-              <a:rPr/>
-              <a:t>copy-paste</a:t>
-            </a:r>
-            <a:r>
-              <a:rPr/>
-              <a:t> </a:t>
-            </a:r>
-            <a:r>
-              <a:rPr/>
-              <a:t>analyses,</a:t>
-            </a:r>
-            <a:r>
-              <a:rPr/>
-              <a:t> </a:t>
-            </a:r>
-            <a:r>
-              <a:rPr/>
-              <a:t>tables,</a:t>
-            </a:r>
-            <a:r>
-              <a:rPr/>
-              <a:t> </a:t>
-            </a:r>
-            <a:r>
-              <a:rPr/>
-              <a:t>or</a:t>
-            </a:r>
-            <a:r>
-              <a:rPr/>
-              <a:t> </a:t>
-            </a:r>
-            <a:r>
-              <a:rPr/>
-              <a:t>figures)</a:t>
+              <a:t>into</a:t>
+            </a:r>
+            <a:r>
+              <a:rPr/>
+              <a:t> </a:t>
+            </a:r>
+            <a:r>
+              <a:rPr/>
+              <a:t>Rmarkdown</a:t>
+            </a:r>
+            <a:r>
+              <a:rPr/>
+              <a:t> </a:t>
+            </a:r>
+            <a:r>
+              <a:rPr/>
+              <a:t>documents</a:t>
             </a:r>
           </a:p>
         </p:txBody>
@@ -4520,15 +5503,20 @@
       </p:grpSpPr>
       <p:sp>
         <p:nvSpPr>
-          <p:cNvPr id="3" name="Content Placeholder 2"/>
-          <p:cNvSpPr>
-            <a:spLocks noGrp="1"/>
-          </p:cNvSpPr>
-          <p:nvPr>
-            <p:ph sz="half" idx="1"/>
-          </p:nvPr>
-        </p:nvSpPr>
-        <p:spPr/>
+          <p:cNvPr id="2" name="Title 1"/>
+          <p:cNvSpPr>
+            <a:spLocks noGrp="1"/>
+          </p:cNvSpPr>
+          <p:nvPr>
+            <p:ph type="title"/>
+          </p:nvPr>
+        </p:nvSpPr>
+        <p:spPr>
+          <a:xfrm>
+            <a:off x="0" y="368238"/>
+            <a:ext cx="9144000" cy="363001"/>
+          </a:xfrm>
+        </p:spPr>
         <p:txBody>
           <a:bodyPr/>
           <a:lstStyle/>
@@ -4538,32 +5526,291 @@
             </a:pPr>
             <a:r>
               <a:rPr/>
-              <a:t>Data science is an exciting discipline that allows you to turn raw data into understanding, insight, and knowledge. The goal of “R for Data Science” is to help you learn the most important tools in R that will allow you to do data science.</a:t>
-            </a:r>
-          </a:p>
-        </p:txBody>
-      </p:sp>
-      <p:sp>
-        <p:nvSpPr>
-          <p:cNvPr id="4" name="Content Placeholder 3"/>
-          <p:cNvSpPr>
-            <a:spLocks noGrp="1"/>
-          </p:cNvSpPr>
-          <p:nvPr>
-            <p:ph sz="half" idx="2"/>
-          </p:nvPr>
-        </p:nvSpPr>
-        <p:spPr/>
-        <p:txBody>
-          <a:bodyPr/>
-          <a:lstStyle/>
-          <a:p>
-            <a:pPr lvl="0" marL="0" indent="0">
+              <a:t>Using</a:t>
+            </a:r>
+            <a:r>
+              <a:rPr/>
+              <a:t> </a:t>
+            </a:r>
+            <a:r>
+              <a:rPr/>
+              <a:t>a</a:t>
+            </a:r>
+            <a:r>
+              <a:rPr/>
+              <a:t> </a:t>
+            </a:r>
+            <a:r>
+              <a:rPr/>
+              <a:t>word</a:t>
+            </a:r>
+            <a:r>
+              <a:rPr/>
+              <a:t> </a:t>
+            </a:r>
+            <a:r>
+              <a:rPr/>
+              <a:t>document</a:t>
+            </a:r>
+            <a:r>
+              <a:rPr/>
+              <a:t> </a:t>
+            </a:r>
+            <a:r>
+              <a:rPr/>
+              <a:t>template</a:t>
+            </a:r>
+          </a:p>
+        </p:txBody>
+      </p:sp>
+      <p:pic>
+        <p:nvPicPr>
+          <p:cNvPr descr="/Users/jennahamlin/Desktop/GiGte/images/docxTemplate.png" id="0" name="Picture 1"/>
+          <p:cNvPicPr>
+            <a:picLocks noGrp="1" noChangeAspect="1"/>
+          </p:cNvPicPr>
+          <p:nvPr/>
+        </p:nvPicPr>
+        <p:blipFill>
+          <a:blip r:embed="rId2"/>
+          <a:stretch>
+            <a:fillRect/>
+          </a:stretch>
+        </p:blipFill>
+        <p:spPr bwMode="auto">
+          <a:xfrm>
+            <a:off x="114300" y="2032000"/>
+            <a:ext cx="8902700" cy="1435100"/>
+          </a:xfrm>
+          <a:prstGeom prst="rect">
+            <a:avLst/>
+          </a:prstGeom>
+          <a:noFill/>
+          <a:ln w="9525">
+            <a:noFill/>
+            <a:headEnd/>
+            <a:tailEnd/>
+          </a:ln>
+        </p:spPr>
+      </p:pic>
+      <p:sp>
+        <p:nvSpPr>
+          <p:cNvPr id="1" name="TextBox 3"/>
+          <p:cNvSpPr txBox="1"/>
+          <p:nvPr/>
+        </p:nvSpPr>
+        <p:spPr>
+          <a:xfrm>
+            <a:off x="114300" y="4546600"/>
+            <a:ext cx="8902700" cy="508000"/>
+          </a:xfrm>
+          <a:prstGeom prst="rect">
+            <a:avLst/>
+          </a:prstGeom>
+          <a:noFill/>
+        </p:spPr>
+        <p:txBody>
+          <a:bodyPr/>
+          <a:lstStyle/>
+          <a:p>
+            <a:pPr lvl="0" marL="0" indent="0" algn="ctr">
               <a:buNone/>
             </a:pPr>
             <a:r>
               <a:rPr/>
-              <a:t>#[]R(markdown.open.png)</a:t>
+              <a:t>Many</a:t>
+            </a:r>
+            <a:r>
+              <a:rPr/>
+              <a:t> </a:t>
+            </a:r>
+            <a:r>
+              <a:rPr/>
+              <a:t>journals</a:t>
+            </a:r>
+            <a:r>
+              <a:rPr/>
+              <a:t> </a:t>
+            </a:r>
+            <a:r>
+              <a:rPr/>
+              <a:t>and</a:t>
+            </a:r>
+            <a:r>
+              <a:rPr/>
+              <a:t> </a:t>
+            </a:r>
+            <a:r>
+              <a:rPr/>
+              <a:t>colleagues</a:t>
+            </a:r>
+            <a:r>
+              <a:rPr/>
+              <a:t> </a:t>
+            </a:r>
+            <a:r>
+              <a:rPr/>
+              <a:t>prefer</a:t>
+            </a:r>
+            <a:r>
+              <a:rPr/>
+              <a:t> </a:t>
+            </a:r>
+            <a:r>
+              <a:rPr/>
+              <a:t>to</a:t>
+            </a:r>
+            <a:r>
+              <a:rPr/>
+              <a:t> </a:t>
+            </a:r>
+            <a:r>
+              <a:rPr/>
+              <a:t>read</a:t>
+            </a:r>
+            <a:r>
+              <a:rPr/>
+              <a:t> </a:t>
+            </a:r>
+            <a:r>
+              <a:rPr/>
+              <a:t>and</a:t>
+            </a:r>
+            <a:r>
+              <a:rPr/>
+              <a:t> </a:t>
+            </a:r>
+            <a:r>
+              <a:rPr/>
+              <a:t>receive</a:t>
+            </a:r>
+            <a:r>
+              <a:rPr/>
+              <a:t> </a:t>
+            </a:r>
+            <a:r>
+              <a:rPr/>
+              <a:t>manuscripts</a:t>
+            </a:r>
+            <a:r>
+              <a:rPr/>
+              <a:t> </a:t>
+            </a:r>
+            <a:r>
+              <a:rPr/>
+              <a:t>as</a:t>
+            </a:r>
+            <a:r>
+              <a:rPr/>
+              <a:t> </a:t>
+            </a:r>
+            <a:r>
+              <a:rPr/>
+              <a:t>DOCX</a:t>
+            </a:r>
+            <a:r>
+              <a:rPr/>
+              <a:t> </a:t>
+            </a:r>
+            <a:r>
+              <a:rPr/>
+              <a:t>files.</a:t>
+            </a:r>
+            <a:r>
+              <a:rPr/>
+              <a:t> </a:t>
+            </a:r>
+            <a:r>
+              <a:rPr/>
+              <a:t>With</a:t>
+            </a:r>
+            <a:r>
+              <a:rPr/>
+              <a:t> </a:t>
+            </a:r>
+            <a:r>
+              <a:rPr/>
+              <a:t>a</a:t>
+            </a:r>
+            <a:r>
+              <a:rPr/>
+              <a:t> </a:t>
+            </a:r>
+            <a:r>
+              <a:rPr/>
+              <a:t>template</a:t>
+            </a:r>
+            <a:r>
+              <a:rPr/>
+              <a:t> </a:t>
+            </a:r>
+            <a:r>
+              <a:rPr/>
+              <a:t>the</a:t>
+            </a:r>
+            <a:r>
+              <a:rPr/>
+              <a:t> </a:t>
+            </a:r>
+            <a:r>
+              <a:rPr/>
+              <a:t>created</a:t>
+            </a:r>
+            <a:r>
+              <a:rPr/>
+              <a:t> </a:t>
+            </a:r>
+            <a:r>
+              <a:rPr/>
+              <a:t>DOCX</a:t>
+            </a:r>
+            <a:r>
+              <a:rPr/>
+              <a:t> </a:t>
+            </a:r>
+            <a:r>
+              <a:rPr/>
+              <a:t>is</a:t>
+            </a:r>
+            <a:r>
+              <a:rPr/>
+              <a:t> </a:t>
+            </a:r>
+            <a:r>
+              <a:rPr/>
+              <a:t>formatted</a:t>
+            </a:r>
+            <a:r>
+              <a:rPr/>
+              <a:t> </a:t>
+            </a:r>
+            <a:r>
+              <a:rPr/>
+              <a:t>as</a:t>
+            </a:r>
+            <a:r>
+              <a:rPr/>
+              <a:t> </a:t>
+            </a:r>
+            <a:r>
+              <a:rPr/>
+              <a:t>desired</a:t>
+            </a:r>
+            <a:r>
+              <a:rPr/>
+              <a:t> </a:t>
+            </a:r>
+            <a:r>
+              <a:rPr/>
+              <a:t>every</a:t>
+            </a:r>
+            <a:r>
+              <a:rPr/>
+              <a:t> </a:t>
+            </a:r>
+            <a:r>
+              <a:rPr/>
+              <a:t>time</a:t>
             </a:r>
           </a:p>
         </p:txBody>
@@ -4614,22 +5861,22 @@
         <a:srgbClr val="800080"/>
       </a:folHlink>
     </a:clrScheme>
-    <a:fontScheme name="Office">
+    <a:fontScheme name="Arial">
       <a:majorFont>
-        <a:latin typeface="Calibri"/>
+        <a:latin typeface="Arial" panose="020B0604020202020204"/>
         <a:ea typeface=""/>
         <a:cs typeface=""/>
         <a:font script="Jpan" typeface="ＭＳ Ｐゴシック"/>
-        <a:font script="Hang" typeface="맑은 고딕"/>
-        <a:font script="Hans" typeface="宋体"/>
-        <a:font script="Hant" typeface="新細明體"/>
-        <a:font script="Arab" typeface="Times New Roman"/>
-        <a:font script="Hebr" typeface="Times New Roman"/>
-        <a:font script="Thai" typeface="Angsana New"/>
+        <a:font script="Hang" typeface="굴림"/>
+        <a:font script="Hans" typeface="黑体"/>
+        <a:font script="Hant" typeface="微軟正黑體"/>
+        <a:font script="Arab" typeface="Arial"/>
+        <a:font script="Hebr" typeface="Arial"/>
+        <a:font script="Thai" typeface="Cordia New"/>
         <a:font script="Ethi" typeface="Nyala"/>
         <a:font script="Beng" typeface="Vrinda"/>
         <a:font script="Gujr" typeface="Shruti"/>
-        <a:font script="Khmr" typeface="MoolBoran"/>
+        <a:font script="Khmr" typeface="DaunPenh"/>
         <a:font script="Knda" typeface="Tunga"/>
         <a:font script="Guru" typeface="Raavi"/>
         <a:font script="Cans" typeface="Euphemia"/>
@@ -4646,18 +5893,18 @@
         <a:font script="Laoo" typeface="DokChampa"/>
         <a:font script="Sinh" typeface="Iskoola Pota"/>
         <a:font script="Mong" typeface="Mongolian Baiti"/>
-        <a:font script="Viet" typeface="Times New Roman"/>
+        <a:font script="Viet" typeface="Arial"/>
         <a:font script="Uigh" typeface="Microsoft Uighur"/>
         <a:font script="Geor" typeface="Sylfaen"/>
       </a:majorFont>
       <a:minorFont>
-        <a:latin typeface="Calibri"/>
+        <a:latin typeface="Arial" panose="020B0604020202020204"/>
         <a:ea typeface=""/>
         <a:cs typeface=""/>
         <a:font script="Jpan" typeface="ＭＳ Ｐゴシック"/>
-        <a:font script="Hang" typeface="맑은 고딕"/>
-        <a:font script="Hans" typeface="宋体"/>
-        <a:font script="Hant" typeface="新細明體"/>
+        <a:font script="Hang" typeface="굴림"/>
+        <a:font script="Hans" typeface="黑体"/>
+        <a:font script="Hant" typeface="微軟正黑體"/>
         <a:font script="Arab" typeface="Arial"/>
         <a:font script="Hebr" typeface="Arial"/>
         <a:font script="Thai" typeface="Cordia New"/>

</xml_diff>

<commit_message>
final images and last slide made
</commit_message>
<xml_diff>
--- a/GiGte.pptx
+++ b/GiGte.pptx
@@ -20,6 +20,7 @@
     <p:sldId id="268" r:id="rId14"/>
     <p:sldId id="269" r:id="rId15"/>
     <p:sldId id="270" r:id="rId16"/>
+    <p:sldId id="271" r:id="rId17"/>
   </p:sldIdLst>
   <p:sldSz cx="9144000" cy="5143500" type="screen16x9"/>
   <p:notesSz cx="6858000" cy="9144000"/>
@@ -3111,20 +3112,15 @@
       </p:grpSpPr>
       <p:sp>
         <p:nvSpPr>
-          <p:cNvPr id="2" name="Title 1"/>
-          <p:cNvSpPr>
-            <a:spLocks noGrp="1"/>
-          </p:cNvSpPr>
-          <p:nvPr>
-            <p:ph type="title"/>
-          </p:nvPr>
-        </p:nvSpPr>
-        <p:spPr>
-          <a:xfrm>
-            <a:off x="0" y="368238"/>
-            <a:ext cx="9144000" cy="363001"/>
-          </a:xfrm>
-        </p:spPr>
+          <p:cNvPr id="3" name="Content Placeholder 2"/>
+          <p:cNvSpPr>
+            <a:spLocks noGrp="1"/>
+          </p:cNvSpPr>
+          <p:nvPr>
+            <p:ph idx="1"/>
+          </p:nvPr>
+        </p:nvSpPr>
+        <p:spPr/>
         <p:txBody>
           <a:bodyPr/>
           <a:lstStyle/>
@@ -3134,147 +3130,7 @@
             </a:pPr>
             <a:r>
               <a:rPr/>
-              <a:t>Equations</a:t>
-            </a:r>
-            <a:r>
-              <a:rPr/>
-              <a:t> </a:t>
-            </a:r>
-            <a:r>
-              <a:rPr/>
-              <a:t>and</a:t>
-            </a:r>
-            <a:r>
-              <a:rPr/>
-              <a:t> </a:t>
-            </a:r>
-            <a:r>
-              <a:rPr/>
-              <a:t>other</a:t>
-            </a:r>
-            <a:r>
-              <a:rPr/>
-              <a:t> </a:t>
-            </a:r>
-            <a:r>
-              <a:rPr/>
-              <a:t>formatting</a:t>
-            </a:r>
-            <a:r>
-              <a:rPr/>
-              <a:t> </a:t>
-            </a:r>
-            <a:r>
-              <a:rPr/>
-              <a:t>with</a:t>
-            </a:r>
-            <a:r>
-              <a:rPr/>
-              <a:t> </a:t>
-            </a:r>
-            <a:r>
-              <a:rPr/>
-              <a:t>LaTeX</a:t>
-            </a:r>
-          </a:p>
-        </p:txBody>
-      </p:sp>
-      <p:pic>
-        <p:nvPicPr>
-          <p:cNvPr descr="/Users/jennahamlin/Desktop/GiGte/images/latexImage.png" id="0" name="Picture 1"/>
-          <p:cNvPicPr>
-            <a:picLocks noGrp="1" noChangeAspect="1"/>
-          </p:cNvPicPr>
-          <p:nvPr/>
-        </p:nvPicPr>
-        <p:blipFill>
-          <a:blip r:embed="rId2"/>
-          <a:stretch>
-            <a:fillRect/>
-          </a:stretch>
-        </p:blipFill>
-        <p:spPr bwMode="auto">
-          <a:xfrm>
-            <a:off x="2184400" y="965200"/>
-            <a:ext cx="4775200" cy="3581400"/>
-          </a:xfrm>
-          <a:prstGeom prst="rect">
-            <a:avLst/>
-          </a:prstGeom>
-          <a:noFill/>
-          <a:ln w="9525">
-            <a:noFill/>
-            <a:headEnd/>
-            <a:tailEnd/>
-          </a:ln>
-        </p:spPr>
-      </p:pic>
-      <p:sp>
-        <p:nvSpPr>
-          <p:cNvPr id="1" name="TextBox 3"/>
-          <p:cNvSpPr txBox="1"/>
-          <p:nvPr/>
-        </p:nvSpPr>
-        <p:spPr>
-          <a:xfrm>
-            <a:off x="114300" y="4546600"/>
-            <a:ext cx="8902700" cy="508000"/>
-          </a:xfrm>
-          <a:prstGeom prst="rect">
-            <a:avLst/>
-          </a:prstGeom>
-          <a:noFill/>
-        </p:spPr>
-        <p:txBody>
-          <a:bodyPr/>
-          <a:lstStyle/>
-          <a:p>
-            <a:pPr lvl="0" marL="0" indent="0" algn="ctr">
-              <a:buNone/>
-            </a:pPr>
-            <a:r>
-              <a:rPr/>
-              <a:t>LaTeX</a:t>
-            </a:r>
-            <a:r>
-              <a:rPr/>
-              <a:t> </a:t>
-            </a:r>
-            <a:r>
-              <a:rPr/>
-              <a:t>produces</a:t>
-            </a:r>
-            <a:r>
-              <a:rPr/>
-              <a:t> </a:t>
-            </a:r>
-            <a:r>
-              <a:rPr/>
-              <a:t>highly</a:t>
-            </a:r>
-            <a:r>
-              <a:rPr/>
-              <a:t> </a:t>
-            </a:r>
-            <a:r>
-              <a:rPr/>
-              <a:t>professional</a:t>
-            </a:r>
-            <a:r>
-              <a:rPr/>
-              <a:t> </a:t>
-            </a:r>
-            <a:r>
-              <a:rPr/>
-              <a:t>looking</a:t>
-            </a:r>
-            <a:r>
-              <a:rPr/>
-              <a:t> </a:t>
-            </a:r>
-            <a:r>
-              <a:rPr/>
-              <a:t>equations</a:t>
+              <a:t> # Analyses using R code 2</a:t>
             </a:r>
           </a:p>
         </p:txBody>
@@ -3285,2084 +3141,6 @@
 </file>
 
 <file path=ppt/slides/slide11.xml><?xml version="1.0" encoding="utf-8"?>
-<p:sld xmlns:a="http://schemas.openxmlformats.org/drawingml/2006/main" xmlns:r="http://schemas.openxmlformats.org/officeDocument/2006/relationships" xmlns:p="http://schemas.openxmlformats.org/presentationml/2006/main">
-  <p:cSld>
-    <p:spTree>
-      <p:nvGrpSpPr>
-        <p:cNvPr id="1" name=""/>
-        <p:cNvGrpSpPr/>
-        <p:nvPr/>
-      </p:nvGrpSpPr>
-      <p:grpSpPr>
-        <a:xfrm>
-          <a:off x="0" y="0"/>
-          <a:ext cx="0" cy="0"/>
-          <a:chOff x="0" y="0"/>
-          <a:chExt cx="0" cy="0"/>
-        </a:xfrm>
-      </p:grpSpPr>
-      <p:sp>
-        <p:nvSpPr>
-          <p:cNvPr id="2" name="Title 1"/>
-          <p:cNvSpPr>
-            <a:spLocks noGrp="1"/>
-          </p:cNvSpPr>
-          <p:nvPr>
-            <p:ph type="title"/>
-          </p:nvPr>
-        </p:nvSpPr>
-        <p:spPr>
-          <a:xfrm>
-            <a:off x="0" y="205979"/>
-            <a:ext cx="9144000" cy="857250"/>
-          </a:xfrm>
-        </p:spPr>
-        <p:txBody>
-          <a:bodyPr/>
-          <a:lstStyle/>
-          <a:p>
-            <a:pPr lvl="0" marL="0" indent="0">
-              <a:buNone/>
-            </a:pPr>
-            <a:r>
-              <a:rPr/>
-              <a:t>Integrating</a:t>
-            </a:r>
-            <a:r>
-              <a:rPr/>
-              <a:t> </a:t>
-            </a:r>
-            <a:r>
-              <a:rPr/>
-              <a:t>references</a:t>
-            </a:r>
-            <a:r>
-              <a:rPr/>
-              <a:t> </a:t>
-            </a:r>
-            <a:r>
-              <a:rPr/>
-              <a:t>with</a:t>
-            </a:r>
-            <a:r>
-              <a:rPr/>
-              <a:t> </a:t>
-            </a:r>
-            <a:r>
-              <a:rPr/>
-              <a:t>BibTeX</a:t>
-            </a:r>
-          </a:p>
-        </p:txBody>
-      </p:sp>
-      <p:sp>
-        <p:nvSpPr>
-          <p:cNvPr id="3" name="Content Placeholder 2"/>
-          <p:cNvSpPr>
-            <a:spLocks noGrp="1"/>
-          </p:cNvSpPr>
-          <p:nvPr>
-            <p:ph sz="half" idx="1"/>
-          </p:nvPr>
-        </p:nvSpPr>
-        <p:spPr/>
-        <p:txBody>
-          <a:bodyPr/>
-          <a:lstStyle/>
-          <a:p>
-            <a:pPr lvl="0" marL="0" indent="0">
-              <a:buNone/>
-            </a:pPr>
-            <a:r>
-              <a:rPr/>
-              <a:t>Each references has a unique ‘key’ used within Rmd files (e.g. [@author]) and willautomatically building the reference section</a:t>
-            </a:r>
-          </a:p>
-        </p:txBody>
-      </p:sp>
-      <p:pic>
-        <p:nvPicPr>
-          <p:cNvPr descr="/Users/jennahamlin/Desktop/GiGte/images/refsBib.png" id="0" name="Picture 1"/>
-          <p:cNvPicPr>
-            <a:picLocks noGrp="1" noChangeAspect="1"/>
-          </p:cNvPicPr>
-          <p:nvPr/>
-        </p:nvPicPr>
-        <p:blipFill>
-          <a:blip r:embed="rId2"/>
-          <a:stretch>
-            <a:fillRect/>
-          </a:stretch>
-        </p:blipFill>
-        <p:spPr bwMode="auto">
-          <a:xfrm>
-            <a:off x="4648200" y="2197100"/>
-            <a:ext cx="4038600" cy="1384300"/>
-          </a:xfrm>
-          <a:prstGeom prst="rect">
-            <a:avLst/>
-          </a:prstGeom>
-          <a:noFill/>
-          <a:ln w="9525">
-            <a:noFill/>
-            <a:headEnd/>
-            <a:tailEnd/>
-          </a:ln>
-        </p:spPr>
-      </p:pic>
-    </p:spTree>
-  </p:cSld>
-</p:sld>
-</file>
-
-<file path=ppt/slides/slide12.xml><?xml version="1.0" encoding="utf-8"?>
-<p:sld xmlns:a="http://schemas.openxmlformats.org/drawingml/2006/main" xmlns:r="http://schemas.openxmlformats.org/officeDocument/2006/relationships" xmlns:p="http://schemas.openxmlformats.org/presentationml/2006/main">
-  <p:cSld>
-    <p:spTree>
-      <p:nvGrpSpPr>
-        <p:cNvPr id="1" name=""/>
-        <p:cNvGrpSpPr/>
-        <p:nvPr/>
-      </p:nvGrpSpPr>
-      <p:grpSpPr>
-        <a:xfrm>
-          <a:off x="0" y="0"/>
-          <a:ext cx="0" cy="0"/>
-          <a:chOff x="0" y="0"/>
-          <a:chExt cx="0" cy="0"/>
-        </a:xfrm>
-      </p:grpSpPr>
-      <p:sp>
-        <p:nvSpPr>
-          <p:cNvPr id="2" name="Title 1"/>
-          <p:cNvSpPr>
-            <a:spLocks noGrp="1"/>
-          </p:cNvSpPr>
-          <p:nvPr>
-            <p:ph type="title"/>
-          </p:nvPr>
-        </p:nvSpPr>
-        <p:spPr>
-          <a:xfrm>
-            <a:off x="0" y="368238"/>
-            <a:ext cx="9144000" cy="363001"/>
-          </a:xfrm>
-        </p:spPr>
-        <p:txBody>
-          <a:bodyPr/>
-          <a:lstStyle/>
-          <a:p>
-            <a:pPr lvl="0" marL="0" indent="0">
-              <a:buNone/>
-            </a:pPr>
-            <a:r>
-              <a:rPr/>
-              <a:t>Formatting</a:t>
-            </a:r>
-            <a:r>
-              <a:rPr/>
-              <a:t> </a:t>
-            </a:r>
-            <a:r>
-              <a:rPr/>
-              <a:t>using</a:t>
-            </a:r>
-            <a:r>
-              <a:rPr/>
-              <a:t> </a:t>
-            </a:r>
-            <a:r>
-              <a:rPr/>
-              <a:t>CSL</a:t>
-            </a:r>
-            <a:r>
-              <a:rPr/>
-              <a:t> </a:t>
-            </a:r>
-            <a:r>
-              <a:rPr/>
-              <a:t>files</a:t>
-            </a:r>
-          </a:p>
-        </p:txBody>
-      </p:sp>
-      <p:pic>
-        <p:nvPicPr>
-          <p:cNvPr descr="/Users/jennahamlin/Desktop/GiGte/images/cslPage.png" id="0" name="Picture 1"/>
-          <p:cNvPicPr>
-            <a:picLocks noGrp="1" noChangeAspect="1"/>
-          </p:cNvPicPr>
-          <p:nvPr/>
-        </p:nvPicPr>
-        <p:blipFill>
-          <a:blip r:embed="rId2"/>
-          <a:stretch>
-            <a:fillRect/>
-          </a:stretch>
-        </p:blipFill>
-        <p:spPr bwMode="auto">
-          <a:xfrm>
-            <a:off x="114300" y="1663700"/>
-            <a:ext cx="8902700" cy="2197100"/>
-          </a:xfrm>
-          <a:prstGeom prst="rect">
-            <a:avLst/>
-          </a:prstGeom>
-          <a:noFill/>
-          <a:ln w="9525">
-            <a:noFill/>
-            <a:headEnd/>
-            <a:tailEnd/>
-          </a:ln>
-        </p:spPr>
-      </p:pic>
-      <p:sp>
-        <p:nvSpPr>
-          <p:cNvPr id="1" name="TextBox 3"/>
-          <p:cNvSpPr txBox="1"/>
-          <p:nvPr/>
-        </p:nvSpPr>
-        <p:spPr>
-          <a:xfrm>
-            <a:off x="114300" y="4546600"/>
-            <a:ext cx="8902700" cy="508000"/>
-          </a:xfrm>
-          <a:prstGeom prst="rect">
-            <a:avLst/>
-          </a:prstGeom>
-          <a:noFill/>
-        </p:spPr>
-        <p:txBody>
-          <a:bodyPr/>
-          <a:lstStyle/>
-          <a:p>
-            <a:pPr lvl="0" marL="0" indent="0" algn="ctr">
-              <a:buNone/>
-            </a:pPr>
-            <a:r>
-              <a:rPr/>
-              <a:t>CSL</a:t>
-            </a:r>
-            <a:r>
-              <a:rPr/>
-              <a:t> </a:t>
-            </a:r>
-            <a:r>
-              <a:rPr/>
-              <a:t>-</a:t>
-            </a:r>
-            <a:r>
-              <a:rPr/>
-              <a:t> </a:t>
-            </a:r>
-            <a:r>
-              <a:rPr/>
-              <a:t>Citation</a:t>
-            </a:r>
-            <a:r>
-              <a:rPr/>
-              <a:t> </a:t>
-            </a:r>
-            <a:r>
-              <a:rPr/>
-              <a:t>Style</a:t>
-            </a:r>
-            <a:r>
-              <a:rPr/>
-              <a:t> </a:t>
-            </a:r>
-            <a:r>
-              <a:rPr/>
-              <a:t>Language</a:t>
-            </a:r>
-            <a:r>
-              <a:rPr/>
-              <a:t> </a:t>
-            </a:r>
-            <a:r>
-              <a:rPr/>
-              <a:t>-</a:t>
-            </a:r>
-            <a:r>
-              <a:rPr/>
-              <a:t> </a:t>
-            </a:r>
-            <a:r>
-              <a:rPr/>
-              <a:t>essentially</a:t>
-            </a:r>
-            <a:r>
-              <a:rPr/>
-              <a:t> </a:t>
-            </a:r>
-            <a:r>
-              <a:rPr/>
-              <a:t>text</a:t>
-            </a:r>
-            <a:r>
-              <a:rPr/>
-              <a:t> </a:t>
-            </a:r>
-            <a:r>
-              <a:rPr/>
-              <a:t>files</a:t>
-            </a:r>
-            <a:r>
-              <a:rPr/>
-              <a:t> </a:t>
-            </a:r>
-            <a:r>
-              <a:rPr/>
-              <a:t>that</a:t>
-            </a:r>
-            <a:r>
-              <a:rPr/>
-              <a:t> </a:t>
-            </a:r>
-            <a:r>
-              <a:rPr/>
-              <a:t>tell</a:t>
-            </a:r>
-            <a:r>
-              <a:rPr/>
-              <a:t> </a:t>
-            </a:r>
-            <a:r>
-              <a:rPr/>
-              <a:t>the</a:t>
-            </a:r>
-            <a:r>
-              <a:rPr/>
-              <a:t> </a:t>
-            </a:r>
-            <a:r>
-              <a:rPr/>
-              <a:t>Rmarkdown</a:t>
-            </a:r>
-            <a:r>
-              <a:rPr/>
-              <a:t> </a:t>
-            </a:r>
-            <a:r>
-              <a:rPr/>
-              <a:t>file</a:t>
-            </a:r>
-            <a:r>
-              <a:rPr/>
-              <a:t> </a:t>
-            </a:r>
-            <a:r>
-              <a:rPr/>
-              <a:t>how</a:t>
-            </a:r>
-            <a:r>
-              <a:rPr/>
-              <a:t> </a:t>
-            </a:r>
-            <a:r>
-              <a:rPr/>
-              <a:t>to</a:t>
-            </a:r>
-            <a:r>
-              <a:rPr/>
-              <a:t> </a:t>
-            </a:r>
-            <a:r>
-              <a:rPr/>
-              <a:t>use</a:t>
-            </a:r>
-            <a:r>
-              <a:rPr/>
-              <a:t> </a:t>
-            </a:r>
-            <a:r>
-              <a:rPr/>
-              <a:t>the</a:t>
-            </a:r>
-            <a:r>
-              <a:rPr/>
-              <a:t> </a:t>
-            </a:r>
-            <a:r>
-              <a:rPr/>
-              <a:t>information</a:t>
-            </a:r>
-            <a:r>
-              <a:rPr/>
-              <a:t> </a:t>
-            </a:r>
-            <a:r>
-              <a:rPr/>
-              <a:t>in</a:t>
-            </a:r>
-            <a:r>
-              <a:rPr/>
-              <a:t> </a:t>
-            </a:r>
-            <a:r>
-              <a:rPr/>
-              <a:t>the</a:t>
-            </a:r>
-            <a:r>
-              <a:rPr/>
-              <a:t> </a:t>
-            </a:r>
-            <a:r>
-              <a:rPr/>
-              <a:t>BibTeX</a:t>
-            </a:r>
-            <a:r>
-              <a:rPr/>
-              <a:t> </a:t>
-            </a:r>
-            <a:r>
-              <a:rPr/>
-              <a:t>file</a:t>
-            </a:r>
-            <a:r>
-              <a:rPr/>
-              <a:t> </a:t>
-            </a:r>
-            <a:r>
-              <a:rPr/>
-              <a:t>to</a:t>
-            </a:r>
-            <a:r>
-              <a:rPr/>
-              <a:t> </a:t>
-            </a:r>
-            <a:r>
-              <a:rPr/>
-              <a:t>build</a:t>
-            </a:r>
-            <a:r>
-              <a:rPr/>
-              <a:t> </a:t>
-            </a:r>
-            <a:r>
-              <a:rPr/>
-              <a:t>the</a:t>
-            </a:r>
-            <a:r>
-              <a:rPr/>
-              <a:t> </a:t>
-            </a:r>
-            <a:r>
-              <a:rPr/>
-              <a:t>citations</a:t>
-            </a:r>
-            <a:r>
-              <a:rPr/>
-              <a:t> </a:t>
-            </a:r>
-            <a:r>
-              <a:rPr/>
-              <a:t>that</a:t>
-            </a:r>
-            <a:r>
-              <a:rPr/>
-              <a:t> </a:t>
-            </a:r>
-            <a:r>
-              <a:rPr/>
-              <a:t>are</a:t>
-            </a:r>
-            <a:r>
-              <a:rPr/>
-              <a:t> </a:t>
-            </a:r>
-            <a:r>
-              <a:rPr/>
-              <a:t>journal</a:t>
-            </a:r>
-            <a:r>
-              <a:rPr/>
-              <a:t> </a:t>
-            </a:r>
-            <a:r>
-              <a:rPr/>
-              <a:t>specific</a:t>
-            </a:r>
-          </a:p>
-        </p:txBody>
-      </p:sp>
-    </p:spTree>
-  </p:cSld>
-</p:sld>
-</file>
-
-<file path=ppt/slides/slide13.xml><?xml version="1.0" encoding="utf-8"?>
-<p:sld xmlns:a="http://schemas.openxmlformats.org/drawingml/2006/main" xmlns:r="http://schemas.openxmlformats.org/officeDocument/2006/relationships" xmlns:p="http://schemas.openxmlformats.org/presentationml/2006/main">
-  <p:cSld>
-    <p:spTree>
-      <p:nvGrpSpPr>
-        <p:cNvPr id="1" name=""/>
-        <p:cNvGrpSpPr/>
-        <p:nvPr/>
-      </p:nvGrpSpPr>
-      <p:grpSpPr>
-        <a:xfrm>
-          <a:off x="0" y="0"/>
-          <a:ext cx="0" cy="0"/>
-          <a:chOff x="0" y="0"/>
-          <a:chExt cx="0" cy="0"/>
-        </a:xfrm>
-      </p:grpSpPr>
-      <p:sp>
-        <p:nvSpPr>
-          <p:cNvPr id="2" name="Title 1"/>
-          <p:cNvSpPr>
-            <a:spLocks noGrp="1"/>
-          </p:cNvSpPr>
-          <p:nvPr>
-            <p:ph type="title"/>
-          </p:nvPr>
-        </p:nvSpPr>
-        <p:spPr>
-          <a:xfrm>
-            <a:off x="0" y="368238"/>
-            <a:ext cx="9144000" cy="363001"/>
-          </a:xfrm>
-        </p:spPr>
-        <p:txBody>
-          <a:bodyPr/>
-          <a:lstStyle/>
-          <a:p>
-            <a:pPr lvl="0" marL="0" indent="0">
-              <a:buNone/>
-            </a:pPr>
-            <a:r>
-              <a:rPr/>
-              <a:t>Incorporating</a:t>
-            </a:r>
-            <a:r>
-              <a:rPr/>
-              <a:t> </a:t>
-            </a:r>
-            <a:r>
-              <a:rPr/>
-              <a:t>version</a:t>
-            </a:r>
-            <a:r>
-              <a:rPr/>
-              <a:t> </a:t>
-            </a:r>
-            <a:r>
-              <a:rPr/>
-              <a:t>control</a:t>
-            </a:r>
-            <a:r>
-              <a:rPr/>
-              <a:t> </a:t>
-            </a:r>
-            <a:r>
-              <a:rPr/>
-              <a:t>with</a:t>
-            </a:r>
-            <a:r>
-              <a:rPr/>
-              <a:t> </a:t>
-            </a:r>
-            <a:r>
-              <a:rPr/>
-              <a:t>git/github</a:t>
-            </a:r>
-          </a:p>
-        </p:txBody>
-      </p:sp>
-    </p:spTree>
-  </p:cSld>
-</p:sld>
-</file>
-
-<file path=ppt/slides/slide14.xml><?xml version="1.0" encoding="utf-8"?>
-<p:sld xmlns:a="http://schemas.openxmlformats.org/drawingml/2006/main" xmlns:r="http://schemas.openxmlformats.org/officeDocument/2006/relationships" xmlns:p="http://schemas.openxmlformats.org/presentationml/2006/main">
-  <p:cSld>
-    <p:spTree>
-      <p:nvGrpSpPr>
-        <p:cNvPr id="1" name=""/>
-        <p:cNvGrpSpPr/>
-        <p:nvPr/>
-      </p:nvGrpSpPr>
-      <p:grpSpPr>
-        <a:xfrm>
-          <a:off x="0" y="0"/>
-          <a:ext cx="0" cy="0"/>
-          <a:chOff x="0" y="0"/>
-          <a:chExt cx="0" cy="0"/>
-        </a:xfrm>
-      </p:grpSpPr>
-      <p:sp>
-        <p:nvSpPr>
-          <p:cNvPr id="2" name="Title 1"/>
-          <p:cNvSpPr>
-            <a:spLocks noGrp="1"/>
-          </p:cNvSpPr>
-          <p:nvPr>
-            <p:ph type="title"/>
-          </p:nvPr>
-        </p:nvSpPr>
-        <p:spPr>
-          <a:xfrm>
-            <a:off x="0" y="368238"/>
-            <a:ext cx="9144000" cy="363001"/>
-          </a:xfrm>
-        </p:spPr>
-        <p:txBody>
-          <a:bodyPr/>
-          <a:lstStyle/>
-          <a:p>
-            <a:pPr lvl="0" marL="0" indent="0">
-              <a:buNone/>
-            </a:pPr>
-            <a:r>
-              <a:rPr/>
-              <a:t>Quick</a:t>
-            </a:r>
-            <a:r>
-              <a:rPr/>
-              <a:t> </a:t>
-            </a:r>
-            <a:r>
-              <a:rPr/>
-              <a:t>look</a:t>
-            </a:r>
-            <a:r>
-              <a:rPr/>
-              <a:t> </a:t>
-            </a:r>
-            <a:r>
-              <a:rPr/>
-              <a:t>at</a:t>
-            </a:r>
-            <a:r>
-              <a:rPr/>
-              <a:t> </a:t>
-            </a:r>
-            <a:r>
-              <a:rPr/>
-              <a:t>a</a:t>
-            </a:r>
-            <a:r>
-              <a:rPr/>
-              <a:t> </a:t>
-            </a:r>
-            <a:r>
-              <a:rPr/>
-              <a:t>manuscript</a:t>
-            </a:r>
-            <a:r>
-              <a:rPr/>
-              <a:t> </a:t>
-            </a:r>
-            <a:r>
-              <a:rPr/>
-              <a:t>-</a:t>
-            </a:r>
-            <a:r>
-              <a:rPr/>
-              <a:t> </a:t>
-            </a:r>
-            <a:r>
-              <a:rPr/>
-              <a:t>dummy</a:t>
-            </a:r>
-            <a:r>
-              <a:rPr/>
-              <a:t> </a:t>
-            </a:r>
-            <a:r>
-              <a:rPr/>
-              <a:t>Rmarkdown</a:t>
-            </a:r>
-            <a:r>
-              <a:rPr/>
-              <a:t> </a:t>
-            </a:r>
-            <a:r>
-              <a:rPr/>
-              <a:t>document</a:t>
-            </a:r>
-          </a:p>
-        </p:txBody>
-      </p:sp>
-    </p:spTree>
-  </p:cSld>
-</p:sld>
-</file>
-
-<file path=ppt/slides/slide15.xml><?xml version="1.0" encoding="utf-8"?>
-<p:sld xmlns:a="http://schemas.openxmlformats.org/drawingml/2006/main" xmlns:r="http://schemas.openxmlformats.org/officeDocument/2006/relationships" xmlns:p="http://schemas.openxmlformats.org/presentationml/2006/main">
-  <p:cSld>
-    <p:spTree>
-      <p:nvGrpSpPr>
-        <p:cNvPr id="1" name=""/>
-        <p:cNvGrpSpPr/>
-        <p:nvPr/>
-      </p:nvGrpSpPr>
-      <p:grpSpPr>
-        <a:xfrm>
-          <a:off x="0" y="0"/>
-          <a:ext cx="0" cy="0"/>
-          <a:chOff x="0" y="0"/>
-          <a:chExt cx="0" cy="0"/>
-        </a:xfrm>
-      </p:grpSpPr>
-      <p:sp>
-        <p:nvSpPr>
-          <p:cNvPr id="2" name="Title 1"/>
-          <p:cNvSpPr>
-            <a:spLocks noGrp="1"/>
-          </p:cNvSpPr>
-          <p:nvPr>
-            <p:ph type="title"/>
-          </p:nvPr>
-        </p:nvSpPr>
-        <p:spPr>
-          <a:xfrm>
-            <a:off x="0" y="368238"/>
-            <a:ext cx="9144000" cy="363001"/>
-          </a:xfrm>
-        </p:spPr>
-        <p:txBody>
-          <a:bodyPr/>
-          <a:lstStyle/>
-          <a:p>
-            <a:pPr lvl="0" marL="0" indent="0">
-              <a:buNone/>
-            </a:pPr>
-            <a:r>
-              <a:rPr/>
-              <a:t>Links</a:t>
-            </a:r>
-          </a:p>
-        </p:txBody>
-      </p:sp>
-      <p:sp>
-        <p:nvSpPr>
-          <p:cNvPr id="3" name="Content Placeholder 2"/>
-          <p:cNvSpPr>
-            <a:spLocks noGrp="1"/>
-          </p:cNvSpPr>
-          <p:nvPr>
-            <p:ph idx="1"/>
-          </p:nvPr>
-        </p:nvSpPr>
-        <p:spPr/>
-        <p:txBody>
-          <a:bodyPr/>
-          <a:lstStyle/>
-          <a:p>
-            <a:pPr lvl="1"/>
-            <a:r>
-              <a:rPr/>
-              <a:t>markdown </a:t>
-            </a:r>
-            <a:r>
-              <a:rPr>
-                <a:hlinkClick r:id="rId2"/>
-              </a:rPr>
-              <a:t>https://rstudio.com/wp-content/uploads/2015/03/rmarkdown-reference.pdf</a:t>
-            </a:r>
-            <a:r>
-              <a:rPr/>
-              <a:t>)</a:t>
-            </a:r>
-          </a:p>
-          <a:p>
-            <a:pPr lvl="1"/>
-            <a:r>
-              <a:rPr/>
-              <a:t>rmarkdown </a:t>
-            </a:r>
-            <a:r>
-              <a:rPr>
-                <a:hlinkClick r:id="rId3"/>
-              </a:rPr>
-              <a:t>https://rmarkdown.rstudio.com/lesson-1.html</a:t>
-            </a:r>
-          </a:p>
-          <a:p>
-            <a:pPr lvl="1"/>
-            <a:r>
-              <a:rPr/>
-              <a:t>rmarkdown cheat sheet </a:t>
-            </a:r>
-            <a:r>
-              <a:rPr>
-                <a:hlinkClick r:id="rId4"/>
-              </a:rPr>
-              <a:t>https://rstudio.com/wp-content/uploads/2015/02/rmarkdown-cheatsheet.pdf</a:t>
-            </a:r>
-          </a:p>
-          <a:p>
-            <a:pPr lvl="1"/>
-            <a:r>
-              <a:rPr/>
-              <a:t>rmarkdown book </a:t>
-            </a:r>
-            <a:r>
-              <a:rPr>
-                <a:hlinkClick r:id="rId5"/>
-              </a:rPr>
-              <a:t>https://bookdown.org/yihui/rmarkdown/powerpoint-presentation.html#ppt-templates</a:t>
-            </a:r>
-          </a:p>
-          <a:p>
-            <a:pPr lvl="1"/>
-            <a:r>
-              <a:rPr/>
-              <a:t>r chunks</a:t>
-            </a:r>
-          </a:p>
-          <a:p>
-            <a:pPr lvl="1"/>
-            <a:r>
-              <a:rPr/>
-              <a:t>template </a:t>
-            </a:r>
-            <a:r>
-              <a:rPr>
-                <a:hlinkClick r:id="rId6"/>
-              </a:rPr>
-              <a:t>https://support.office.com/en-us/article/create-a-template-86a1d089-5ae2-4d53-9042-1191bce57deb</a:t>
-            </a:r>
-          </a:p>
-          <a:p>
-            <a:pPr lvl="1"/>
-            <a:r>
-              <a:rPr/>
-              <a:t>equations </a:t>
-            </a:r>
-            <a:r>
-              <a:rPr>
-                <a:hlinkClick r:id="rId7"/>
-              </a:rPr>
-              <a:t>https://en.wikibooks.org/wiki/LaTeX/Mathematics</a:t>
-            </a:r>
-          </a:p>
-          <a:p>
-            <a:pPr lvl="1"/>
-            <a:r>
-              <a:rPr/>
-              <a:t>references</a:t>
-            </a:r>
-          </a:p>
-          <a:p>
-            <a:pPr lvl="1"/>
-            <a:r>
-              <a:rPr/>
-              <a:t>csl </a:t>
-            </a:r>
-            <a:r>
-              <a:rPr>
-                <a:hlinkClick r:id="rId8"/>
-              </a:rPr>
-              <a:t>https://github.com/citation-style-language/styles</a:t>
-            </a:r>
-          </a:p>
-          <a:p>
-            <a:pPr lvl="1"/>
-            <a:r>
-              <a:rPr/>
-              <a:t>version control with git/github</a:t>
-            </a:r>
-          </a:p>
-        </p:txBody>
-      </p:sp>
-    </p:spTree>
-  </p:cSld>
-</p:sld>
-</file>
-
-<file path=ppt/slides/slide2.xml><?xml version="1.0" encoding="utf-8"?>
-<p:sld xmlns:a="http://schemas.openxmlformats.org/drawingml/2006/main" xmlns:r="http://schemas.openxmlformats.org/officeDocument/2006/relationships" xmlns:p="http://schemas.openxmlformats.org/presentationml/2006/main">
-  <p:cSld>
-    <p:spTree>
-      <p:nvGrpSpPr>
-        <p:cNvPr id="1" name=""/>
-        <p:cNvGrpSpPr/>
-        <p:nvPr/>
-      </p:nvGrpSpPr>
-      <p:grpSpPr>
-        <a:xfrm>
-          <a:off x="0" y="0"/>
-          <a:ext cx="0" cy="0"/>
-          <a:chOff x="0" y="0"/>
-          <a:chExt cx="0" cy="0"/>
-        </a:xfrm>
-      </p:grpSpPr>
-      <p:sp>
-        <p:nvSpPr>
-          <p:cNvPr id="2" name="Title 1"/>
-          <p:cNvSpPr>
-            <a:spLocks noGrp="1"/>
-          </p:cNvSpPr>
-          <p:nvPr>
-            <p:ph type="title"/>
-          </p:nvPr>
-        </p:nvSpPr>
-        <p:spPr>
-          <a:xfrm>
-            <a:off x="0" y="368238"/>
-            <a:ext cx="9144000" cy="363001"/>
-          </a:xfrm>
-        </p:spPr>
-        <p:txBody>
-          <a:bodyPr/>
-          <a:lstStyle/>
-          <a:p>
-            <a:pPr lvl="0" marL="0" indent="0">
-              <a:buNone/>
-            </a:pPr>
-            <a:r>
-              <a:rPr/>
-              <a:t>Highlights</a:t>
-            </a:r>
-            <a:r>
-              <a:rPr/>
-              <a:t> </a:t>
-            </a:r>
-            <a:r>
-              <a:rPr/>
-              <a:t>on</a:t>
-            </a:r>
-            <a:r>
-              <a:rPr/>
-              <a:t> </a:t>
-            </a:r>
-            <a:r>
-              <a:rPr/>
-              <a:t>our</a:t>
-            </a:r>
-            <a:r>
-              <a:rPr/>
-              <a:t> </a:t>
-            </a:r>
-            <a:r>
-              <a:rPr/>
-              <a:t>tour</a:t>
-            </a:r>
-            <a:r>
-              <a:rPr/>
-              <a:t> </a:t>
-            </a:r>
-            <a:r>
-              <a:rPr/>
-              <a:t>of</a:t>
-            </a:r>
-            <a:r>
-              <a:rPr/>
-              <a:t> </a:t>
-            </a:r>
-            <a:r>
-              <a:rPr/>
-              <a:t>Rmarkdown</a:t>
-            </a:r>
-          </a:p>
-        </p:txBody>
-      </p:sp>
-      <p:sp>
-        <p:nvSpPr>
-          <p:cNvPr id="3" name="Content Placeholder 2"/>
-          <p:cNvSpPr>
-            <a:spLocks noGrp="1"/>
-          </p:cNvSpPr>
-          <p:nvPr>
-            <p:ph idx="1"/>
-          </p:nvPr>
-        </p:nvSpPr>
-        <p:spPr/>
-        <p:txBody>
-          <a:bodyPr/>
-          <a:lstStyle/>
-          <a:p>
-            <a:pPr lvl="1"/>
-            <a:r>
-              <a:rPr/>
-              <a:t>What is markdown</a:t>
-            </a:r>
-          </a:p>
-          <a:p>
-            <a:pPr lvl="1"/>
-            <a:r>
-              <a:rPr/>
-              <a:t>What is Rmarkdown</a:t>
-            </a:r>
-          </a:p>
-          <a:p>
-            <a:pPr lvl="1"/>
-            <a:r>
-              <a:rPr/>
-              <a:t>Analyses using R in Rmarkdown</a:t>
-            </a:r>
-          </a:p>
-          <a:p>
-            <a:pPr lvl="1"/>
-            <a:r>
-              <a:rPr/>
-              <a:t>Using a word document template</a:t>
-            </a:r>
-          </a:p>
-          <a:p>
-            <a:pPr lvl="1"/>
-            <a:r>
-              <a:rPr/>
-              <a:t>Equations and other formatting with LaTeX</a:t>
-            </a:r>
-          </a:p>
-          <a:p>
-            <a:pPr lvl="1"/>
-            <a:r>
-              <a:rPr/>
-              <a:t>Integrating references</a:t>
-            </a:r>
-          </a:p>
-          <a:p>
-            <a:pPr lvl="1"/>
-            <a:r>
-              <a:rPr/>
-              <a:t>Formatting using CSL files</a:t>
-            </a:r>
-          </a:p>
-          <a:p>
-            <a:pPr lvl="1"/>
-            <a:r>
-              <a:rPr/>
-              <a:t>Incorporating version control with git/github</a:t>
-            </a:r>
-          </a:p>
-        </p:txBody>
-      </p:sp>
-    </p:spTree>
-  </p:cSld>
-</p:sld>
-</file>
-
-<file path=ppt/slides/slide3.xml><?xml version="1.0" encoding="utf-8"?>
-<p:sld xmlns:a="http://schemas.openxmlformats.org/drawingml/2006/main" xmlns:r="http://schemas.openxmlformats.org/officeDocument/2006/relationships" xmlns:p="http://schemas.openxmlformats.org/presentationml/2006/main">
-  <p:cSld>
-    <p:spTree>
-      <p:nvGrpSpPr>
-        <p:cNvPr id="1" name=""/>
-        <p:cNvGrpSpPr/>
-        <p:nvPr/>
-      </p:nvGrpSpPr>
-      <p:grpSpPr>
-        <a:xfrm>
-          <a:off x="0" y="0"/>
-          <a:ext cx="0" cy="0"/>
-          <a:chOff x="0" y="0"/>
-          <a:chExt cx="0" cy="0"/>
-        </a:xfrm>
-      </p:grpSpPr>
-      <p:sp>
-        <p:nvSpPr>
-          <p:cNvPr id="2" name="Title 1"/>
-          <p:cNvSpPr>
-            <a:spLocks noGrp="1"/>
-          </p:cNvSpPr>
-          <p:nvPr>
-            <p:ph type="title"/>
-          </p:nvPr>
-        </p:nvSpPr>
-        <p:spPr>
-          <a:xfrm>
-            <a:off x="0" y="368238"/>
-            <a:ext cx="9144000" cy="363001"/>
-          </a:xfrm>
-        </p:spPr>
-        <p:txBody>
-          <a:bodyPr/>
-          <a:lstStyle/>
-          <a:p>
-            <a:pPr lvl="0" marL="0" indent="0">
-              <a:buNone/>
-            </a:pPr>
-            <a:r>
-              <a:rPr/>
-              <a:t>Markdown</a:t>
-            </a:r>
-          </a:p>
-        </p:txBody>
-      </p:sp>
-      <p:pic>
-        <p:nvPicPr>
-          <p:cNvPr descr="/Users/jennahamlin/Desktop/GiGte/images/markdownCheatSheet.png" id="0" name="Picture 1"/>
-          <p:cNvPicPr>
-            <a:picLocks noGrp="1" noChangeAspect="1"/>
-          </p:cNvPicPr>
-          <p:nvPr/>
-        </p:nvPicPr>
-        <p:blipFill>
-          <a:blip r:embed="rId2"/>
-          <a:stretch>
-            <a:fillRect/>
-          </a:stretch>
-        </p:blipFill>
-        <p:spPr bwMode="auto">
-          <a:xfrm>
-            <a:off x="1981200" y="965200"/>
-            <a:ext cx="5181600" cy="3581400"/>
-          </a:xfrm>
-          <a:prstGeom prst="rect">
-            <a:avLst/>
-          </a:prstGeom>
-          <a:noFill/>
-          <a:ln w="9525">
-            <a:noFill/>
-            <a:headEnd/>
-            <a:tailEnd/>
-          </a:ln>
-        </p:spPr>
-      </p:pic>
-      <p:sp>
-        <p:nvSpPr>
-          <p:cNvPr id="1" name="TextBox 3"/>
-          <p:cNvSpPr txBox="1"/>
-          <p:nvPr/>
-        </p:nvSpPr>
-        <p:spPr>
-          <a:xfrm>
-            <a:off x="114300" y="4546600"/>
-            <a:ext cx="8902700" cy="508000"/>
-          </a:xfrm>
-          <a:prstGeom prst="rect">
-            <a:avLst/>
-          </a:prstGeom>
-          <a:noFill/>
-        </p:spPr>
-        <p:txBody>
-          <a:bodyPr/>
-          <a:lstStyle/>
-          <a:p>
-            <a:pPr lvl="0" marL="0" indent="0" algn="ctr">
-              <a:buNone/>
-            </a:pPr>
-            <a:r>
-              <a:rPr/>
-              <a:t>Markdown</a:t>
-            </a:r>
-            <a:r>
-              <a:rPr/>
-              <a:t> </a:t>
-            </a:r>
-            <a:r>
-              <a:rPr/>
-              <a:t>is</a:t>
-            </a:r>
-            <a:r>
-              <a:rPr/>
-              <a:t> </a:t>
-            </a:r>
-            <a:r>
-              <a:rPr/>
-              <a:t>a</a:t>
-            </a:r>
-            <a:r>
-              <a:rPr/>
-              <a:t> </a:t>
-            </a:r>
-            <a:r>
-              <a:rPr/>
-              <a:t>lightweight</a:t>
-            </a:r>
-            <a:r>
-              <a:rPr/>
-              <a:t> </a:t>
-            </a:r>
-            <a:r>
-              <a:rPr/>
-              <a:t>markup</a:t>
-            </a:r>
-            <a:r>
-              <a:rPr/>
-              <a:t> </a:t>
-            </a:r>
-            <a:r>
-              <a:rPr/>
-              <a:t>language</a:t>
-            </a:r>
-            <a:r>
-              <a:rPr/>
-              <a:t> </a:t>
-            </a:r>
-            <a:r>
-              <a:rPr/>
-              <a:t>with</a:t>
-            </a:r>
-            <a:r>
-              <a:rPr/>
-              <a:t> </a:t>
-            </a:r>
-            <a:r>
-              <a:rPr/>
-              <a:t>plain-text-formatting</a:t>
-            </a:r>
-            <a:r>
-              <a:rPr/>
-              <a:t> </a:t>
-            </a:r>
-            <a:r>
-              <a:rPr/>
-              <a:t>syntax</a:t>
-            </a:r>
-          </a:p>
-        </p:txBody>
-      </p:sp>
-    </p:spTree>
-  </p:cSld>
-</p:sld>
-</file>
-
-<file path=ppt/slides/slide4.xml><?xml version="1.0" encoding="utf-8"?>
-<p:sld xmlns:a="http://schemas.openxmlformats.org/drawingml/2006/main" xmlns:r="http://schemas.openxmlformats.org/officeDocument/2006/relationships" xmlns:p="http://schemas.openxmlformats.org/presentationml/2006/main">
-  <p:cSld>
-    <p:spTree>
-      <p:nvGrpSpPr>
-        <p:cNvPr id="1" name=""/>
-        <p:cNvGrpSpPr/>
-        <p:nvPr/>
-      </p:nvGrpSpPr>
-      <p:grpSpPr>
-        <a:xfrm>
-          <a:off x="0" y="0"/>
-          <a:ext cx="0" cy="0"/>
-          <a:chOff x="0" y="0"/>
-          <a:chExt cx="0" cy="0"/>
-        </a:xfrm>
-      </p:grpSpPr>
-      <p:sp>
-        <p:nvSpPr>
-          <p:cNvPr id="2" name="Title 1"/>
-          <p:cNvSpPr>
-            <a:spLocks noGrp="1"/>
-          </p:cNvSpPr>
-          <p:nvPr>
-            <p:ph type="title"/>
-          </p:nvPr>
-        </p:nvSpPr>
-        <p:spPr>
-          <a:xfrm>
-            <a:off x="0" y="368238"/>
-            <a:ext cx="9144000" cy="363001"/>
-          </a:xfrm>
-        </p:spPr>
-        <p:txBody>
-          <a:bodyPr/>
-          <a:lstStyle/>
-          <a:p>
-            <a:pPr lvl="0" marL="0" indent="0">
-              <a:buNone/>
-            </a:pPr>
-            <a:r>
-              <a:rPr/>
-              <a:t>Rmarkdown</a:t>
-            </a:r>
-          </a:p>
-        </p:txBody>
-      </p:sp>
-      <p:pic>
-        <p:nvPicPr>
-          <p:cNvPr descr="/Users/jennahamlin/Desktop/GiGte/images/Rmarkdown.open.png" id="0" name="Picture 1"/>
-          <p:cNvPicPr>
-            <a:picLocks noGrp="1" noChangeAspect="1"/>
-          </p:cNvPicPr>
-          <p:nvPr/>
-        </p:nvPicPr>
-        <p:blipFill>
-          <a:blip r:embed="rId2"/>
-          <a:stretch>
-            <a:fillRect/>
-          </a:stretch>
-        </p:blipFill>
-        <p:spPr bwMode="auto">
-          <a:xfrm>
-            <a:off x="114300" y="1270000"/>
-            <a:ext cx="8902700" cy="2959100"/>
-          </a:xfrm>
-          <a:prstGeom prst="rect">
-            <a:avLst/>
-          </a:prstGeom>
-          <a:noFill/>
-          <a:ln w="9525">
-            <a:noFill/>
-            <a:headEnd/>
-            <a:tailEnd/>
-          </a:ln>
-        </p:spPr>
-      </p:pic>
-      <p:sp>
-        <p:nvSpPr>
-          <p:cNvPr id="1" name="TextBox 3"/>
-          <p:cNvSpPr txBox="1"/>
-          <p:nvPr/>
-        </p:nvSpPr>
-        <p:spPr>
-          <a:xfrm>
-            <a:off x="114300" y="4546600"/>
-            <a:ext cx="8902700" cy="508000"/>
-          </a:xfrm>
-          <a:prstGeom prst="rect">
-            <a:avLst/>
-          </a:prstGeom>
-          <a:noFill/>
-        </p:spPr>
-        <p:txBody>
-          <a:bodyPr/>
-          <a:lstStyle/>
-          <a:p>
-            <a:pPr lvl="0" marL="0" indent="0" algn="ctr">
-              <a:buNone/>
-            </a:pPr>
-            <a:r>
-              <a:rPr/>
-              <a:t>Text</a:t>
-            </a:r>
-            <a:r>
-              <a:rPr/>
-              <a:t> </a:t>
-            </a:r>
-            <a:r>
-              <a:rPr/>
-              <a:t>file</a:t>
-            </a:r>
-            <a:r>
-              <a:rPr/>
-              <a:t> </a:t>
-            </a:r>
-            <a:r>
-              <a:rPr/>
-              <a:t>that</a:t>
-            </a:r>
-            <a:r>
-              <a:rPr/>
-              <a:t> </a:t>
-            </a:r>
-            <a:r>
-              <a:rPr/>
-              <a:t>can</a:t>
-            </a:r>
-            <a:r>
-              <a:rPr/>
-              <a:t> </a:t>
-            </a:r>
-            <a:r>
-              <a:rPr/>
-              <a:t>execute</a:t>
-            </a:r>
-            <a:r>
-              <a:rPr/>
-              <a:t> </a:t>
-            </a:r>
-            <a:r>
-              <a:rPr/>
-              <a:t>code</a:t>
-            </a:r>
-            <a:r>
-              <a:rPr/>
-              <a:t> </a:t>
-            </a:r>
-            <a:r>
-              <a:rPr/>
-              <a:t>making</a:t>
-            </a:r>
-            <a:r>
-              <a:rPr/>
-              <a:t> </a:t>
-            </a:r>
-            <a:r>
-              <a:rPr/>
-              <a:t>reproducibile</a:t>
-            </a:r>
-            <a:r>
-              <a:rPr/>
-              <a:t> </a:t>
-            </a:r>
-            <a:r>
-              <a:rPr/>
-              <a:t>output</a:t>
-            </a:r>
-            <a:r>
-              <a:rPr/>
-              <a:t> </a:t>
-            </a:r>
-            <a:r>
-              <a:rPr/>
-              <a:t>in</a:t>
-            </a:r>
-            <a:r>
-              <a:rPr/>
-              <a:t> </a:t>
-            </a:r>
-            <a:r>
-              <a:rPr/>
-              <a:t>a</a:t>
-            </a:r>
-            <a:r>
-              <a:rPr/>
-              <a:t> </a:t>
-            </a:r>
-            <a:r>
-              <a:rPr/>
-              <a:t>dozen</a:t>
-            </a:r>
-            <a:r>
-              <a:rPr/>
-              <a:t> </a:t>
-            </a:r>
-            <a:r>
-              <a:rPr/>
-              <a:t>static</a:t>
-            </a:r>
-            <a:r>
-              <a:rPr/>
-              <a:t> </a:t>
-            </a:r>
-            <a:r>
-              <a:rPr/>
-              <a:t>and</a:t>
-            </a:r>
-            <a:r>
-              <a:rPr/>
-              <a:t> </a:t>
-            </a:r>
-            <a:r>
-              <a:rPr/>
-              <a:t>dynamic</a:t>
-            </a:r>
-            <a:r>
-              <a:rPr/>
-              <a:t> </a:t>
-            </a:r>
-            <a:r>
-              <a:rPr/>
-              <a:t>formats</a:t>
-            </a:r>
-            <a:r>
-              <a:rPr/>
-              <a:t> </a:t>
-            </a:r>
-            <a:r>
-              <a:rPr/>
-              <a:t>(including</a:t>
-            </a:r>
-            <a:r>
-              <a:rPr/>
-              <a:t> </a:t>
-            </a:r>
-            <a:r>
-              <a:rPr/>
-              <a:t>this</a:t>
-            </a:r>
-            <a:r>
-              <a:rPr/>
-              <a:t> </a:t>
-            </a:r>
-            <a:r>
-              <a:rPr/>
-              <a:t>powerpoint).</a:t>
-            </a:r>
-          </a:p>
-        </p:txBody>
-      </p:sp>
-    </p:spTree>
-  </p:cSld>
-</p:sld>
-</file>
-
-<file path=ppt/slides/slide5.xml><?xml version="1.0" encoding="utf-8"?>
-<p:sld xmlns:a="http://schemas.openxmlformats.org/drawingml/2006/main" xmlns:r="http://schemas.openxmlformats.org/officeDocument/2006/relationships" xmlns:p="http://schemas.openxmlformats.org/presentationml/2006/main">
-  <p:cSld>
-    <p:spTree>
-      <p:nvGrpSpPr>
-        <p:cNvPr id="1" name=""/>
-        <p:cNvGrpSpPr/>
-        <p:nvPr/>
-      </p:nvGrpSpPr>
-      <p:grpSpPr>
-        <a:xfrm>
-          <a:off x="0" y="0"/>
-          <a:ext cx="0" cy="0"/>
-          <a:chOff x="0" y="0"/>
-          <a:chExt cx="0" cy="0"/>
-        </a:xfrm>
-      </p:grpSpPr>
-      <p:sp>
-        <p:nvSpPr>
-          <p:cNvPr id="2" name="Title 1"/>
-          <p:cNvSpPr>
-            <a:spLocks noGrp="1"/>
-          </p:cNvSpPr>
-          <p:nvPr>
-            <p:ph type="title"/>
-          </p:nvPr>
-        </p:nvSpPr>
-        <p:spPr>
-          <a:xfrm>
-            <a:off x="0" y="368238"/>
-            <a:ext cx="9144000" cy="363001"/>
-          </a:xfrm>
-        </p:spPr>
-        <p:txBody>
-          <a:bodyPr/>
-          <a:lstStyle/>
-          <a:p>
-            <a:pPr lvl="0" marL="0" indent="0">
-              <a:buNone/>
-            </a:pPr>
-            <a:r>
-              <a:rPr/>
-              <a:t>.Rmd</a:t>
-            </a:r>
-            <a:r>
-              <a:rPr/>
-              <a:t> </a:t>
-            </a:r>
-            <a:r>
-              <a:rPr/>
-              <a:t>files</a:t>
-            </a:r>
-          </a:p>
-        </p:txBody>
-      </p:sp>
-      <p:pic>
-        <p:nvPicPr>
-          <p:cNvPr descr="/Users/jennahamlin/Desktop/GiGte/images/Rmd.output.png" id="0" name="Picture 1"/>
-          <p:cNvPicPr>
-            <a:picLocks noGrp="1" noChangeAspect="1"/>
-          </p:cNvPicPr>
-          <p:nvPr/>
-        </p:nvPicPr>
-        <p:blipFill>
-          <a:blip r:embed="rId2"/>
-          <a:stretch>
-            <a:fillRect/>
-          </a:stretch>
-        </p:blipFill>
-        <p:spPr bwMode="auto">
-          <a:xfrm>
-            <a:off x="2184400" y="965200"/>
-            <a:ext cx="4775200" cy="3581400"/>
-          </a:xfrm>
-          <a:prstGeom prst="rect">
-            <a:avLst/>
-          </a:prstGeom>
-          <a:noFill/>
-          <a:ln w="9525">
-            <a:noFill/>
-            <a:headEnd/>
-            <a:tailEnd/>
-          </a:ln>
-        </p:spPr>
-      </p:pic>
-      <p:sp>
-        <p:nvSpPr>
-          <p:cNvPr id="1" name="TextBox 3"/>
-          <p:cNvSpPr txBox="1"/>
-          <p:nvPr/>
-        </p:nvSpPr>
-        <p:spPr>
-          <a:xfrm>
-            <a:off x="114300" y="4546600"/>
-            <a:ext cx="8902700" cy="508000"/>
-          </a:xfrm>
-          <a:prstGeom prst="rect">
-            <a:avLst/>
-          </a:prstGeom>
-          <a:noFill/>
-        </p:spPr>
-        <p:txBody>
-          <a:bodyPr/>
-          <a:lstStyle/>
-          <a:p>
-            <a:pPr lvl="0" marL="0" indent="0" algn="ctr">
-              <a:buNone/>
-            </a:pPr>
-            <a:r>
-              <a:rPr/>
-              <a:t>.Rmd</a:t>
-            </a:r>
-            <a:r>
-              <a:rPr/>
-              <a:t> </a:t>
-            </a:r>
-            <a:r>
-              <a:rPr/>
-              <a:t>files</a:t>
-            </a:r>
-            <a:r>
-              <a:rPr/>
-              <a:t> </a:t>
-            </a:r>
-            <a:r>
-              <a:rPr/>
-              <a:t>can</a:t>
-            </a:r>
-            <a:r>
-              <a:rPr/>
-              <a:t> </a:t>
-            </a:r>
-            <a:r>
-              <a:rPr/>
-              <a:t>be</a:t>
-            </a:r>
-            <a:r>
-              <a:rPr/>
-              <a:t> </a:t>
-            </a:r>
-            <a:r>
-              <a:rPr/>
-              <a:t>opened</a:t>
-            </a:r>
-            <a:r>
-              <a:rPr/>
-              <a:t> </a:t>
-            </a:r>
-            <a:r>
-              <a:rPr/>
-              <a:t>and</a:t>
-            </a:r>
-            <a:r>
-              <a:rPr/>
-              <a:t> </a:t>
-            </a:r>
-            <a:r>
-              <a:rPr/>
-              <a:t>edited</a:t>
-            </a:r>
-            <a:r>
-              <a:rPr/>
-              <a:t> </a:t>
-            </a:r>
-            <a:r>
-              <a:rPr/>
-              <a:t>in</a:t>
-            </a:r>
-            <a:r>
-              <a:rPr/>
-              <a:t> </a:t>
-            </a:r>
-            <a:r>
-              <a:rPr/>
-              <a:t>Rstudio,</a:t>
-            </a:r>
-            <a:r>
-              <a:rPr/>
-              <a:t> </a:t>
-            </a:r>
-            <a:r>
-              <a:rPr/>
-              <a:t>and</a:t>
-            </a:r>
-            <a:r>
-              <a:rPr/>
-              <a:t> </a:t>
-            </a:r>
-            <a:r>
-              <a:rPr/>
-              <a:t>turned</a:t>
-            </a:r>
-            <a:r>
-              <a:rPr/>
-              <a:t> </a:t>
-            </a:r>
-            <a:r>
-              <a:rPr/>
-              <a:t>into</a:t>
-            </a:r>
-            <a:r>
-              <a:rPr/>
-              <a:t> </a:t>
-            </a:r>
-            <a:r>
-              <a:rPr/>
-              <a:t>HTML,</a:t>
-            </a:r>
-            <a:r>
-              <a:rPr/>
-              <a:t> </a:t>
-            </a:r>
-            <a:r>
-              <a:rPr/>
-              <a:t>PDF,</a:t>
-            </a:r>
-            <a:r>
-              <a:rPr/>
-              <a:t> </a:t>
-            </a:r>
-            <a:r>
-              <a:rPr/>
-              <a:t>or</a:t>
-            </a:r>
-            <a:r>
-              <a:rPr/>
-              <a:t> </a:t>
-            </a:r>
-            <a:r>
-              <a:rPr/>
-              <a:t>DOCX</a:t>
-            </a:r>
-            <a:r>
-              <a:rPr/>
-              <a:t> </a:t>
-            </a:r>
-            <a:r>
-              <a:rPr/>
-              <a:t>files</a:t>
-            </a:r>
-            <a:r>
-              <a:rPr/>
-              <a:t> </a:t>
-            </a:r>
-            <a:r>
-              <a:rPr/>
-              <a:t>with</a:t>
-            </a:r>
-            <a:r>
-              <a:rPr/>
-              <a:t> </a:t>
-            </a:r>
-            <a:r>
-              <a:rPr/>
-              <a:t>the</a:t>
-            </a:r>
-            <a:r>
-              <a:rPr/>
-              <a:t> </a:t>
-            </a:r>
-            <a:r>
-              <a:rPr/>
-              <a:t>push</a:t>
-            </a:r>
-            <a:r>
-              <a:rPr/>
-              <a:t> </a:t>
-            </a:r>
-            <a:r>
-              <a:rPr/>
-              <a:t>of</a:t>
-            </a:r>
-            <a:r>
-              <a:rPr/>
-              <a:t> </a:t>
-            </a:r>
-            <a:r>
-              <a:rPr/>
-              <a:t>button</a:t>
-            </a:r>
-          </a:p>
-        </p:txBody>
-      </p:sp>
-    </p:spTree>
-  </p:cSld>
-</p:sld>
-</file>
-
-<file path=ppt/slides/slide6.xml><?xml version="1.0" encoding="utf-8"?>
-<p:sld xmlns:a="http://schemas.openxmlformats.org/drawingml/2006/main" xmlns:r="http://schemas.openxmlformats.org/officeDocument/2006/relationships" xmlns:p="http://schemas.openxmlformats.org/presentationml/2006/main">
-  <p:cSld>
-    <p:spTree>
-      <p:nvGrpSpPr>
-        <p:cNvPr id="1" name=""/>
-        <p:cNvGrpSpPr/>
-        <p:nvPr/>
-      </p:nvGrpSpPr>
-      <p:grpSpPr>
-        <a:xfrm>
-          <a:off x="0" y="0"/>
-          <a:ext cx="0" cy="0"/>
-          <a:chOff x="0" y="0"/>
-          <a:chExt cx="0" cy="0"/>
-        </a:xfrm>
-      </p:grpSpPr>
-      <p:sp>
-        <p:nvSpPr>
-          <p:cNvPr id="2" name="Title 1"/>
-          <p:cNvSpPr>
-            <a:spLocks noGrp="1"/>
-          </p:cNvSpPr>
-          <p:nvPr>
-            <p:ph type="title"/>
-          </p:nvPr>
-        </p:nvSpPr>
-        <p:spPr>
-          <a:xfrm>
-            <a:off x="0" y="368238"/>
-            <a:ext cx="9144000" cy="363001"/>
-          </a:xfrm>
-        </p:spPr>
-        <p:txBody>
-          <a:bodyPr/>
-          <a:lstStyle/>
-          <a:p>
-            <a:pPr lvl="0" marL="0" indent="0">
-              <a:buNone/>
-            </a:pPr>
-            <a:r>
-              <a:rPr/>
-              <a:t>Analyses</a:t>
-            </a:r>
-            <a:r>
-              <a:rPr/>
-              <a:t> </a:t>
-            </a:r>
-            <a:r>
-              <a:rPr/>
-              <a:t>using</a:t>
-            </a:r>
-            <a:r>
-              <a:rPr/>
-              <a:t> </a:t>
-            </a:r>
-            <a:r>
-              <a:rPr/>
-              <a:t>R</a:t>
-            </a:r>
-            <a:r>
-              <a:rPr/>
-              <a:t> </a:t>
-            </a:r>
-            <a:r>
-              <a:rPr/>
-              <a:t>code</a:t>
-            </a:r>
-          </a:p>
-        </p:txBody>
-      </p:sp>
-      <p:pic>
-        <p:nvPicPr>
-          <p:cNvPr descr="/Users/jennahamlin/Desktop/GiGte/images/integrateRCode.png" id="0" name="Picture 1"/>
-          <p:cNvPicPr>
-            <a:picLocks noGrp="1" noChangeAspect="1"/>
-          </p:cNvPicPr>
-          <p:nvPr/>
-        </p:nvPicPr>
-        <p:blipFill>
-          <a:blip r:embed="rId2"/>
-          <a:stretch>
-            <a:fillRect/>
-          </a:stretch>
-        </p:blipFill>
-        <p:spPr bwMode="auto">
-          <a:xfrm>
-            <a:off x="2184400" y="965200"/>
-            <a:ext cx="4775200" cy="3581400"/>
-          </a:xfrm>
-          <a:prstGeom prst="rect">
-            <a:avLst/>
-          </a:prstGeom>
-          <a:noFill/>
-          <a:ln w="9525">
-            <a:noFill/>
-            <a:headEnd/>
-            <a:tailEnd/>
-          </a:ln>
-        </p:spPr>
-      </p:pic>
-      <p:sp>
-        <p:nvSpPr>
-          <p:cNvPr id="1" name="TextBox 3"/>
-          <p:cNvSpPr txBox="1"/>
-          <p:nvPr/>
-        </p:nvSpPr>
-        <p:spPr>
-          <a:xfrm>
-            <a:off x="114300" y="4546600"/>
-            <a:ext cx="8902700" cy="508000"/>
-          </a:xfrm>
-          <a:prstGeom prst="rect">
-            <a:avLst/>
-          </a:prstGeom>
-          <a:noFill/>
-        </p:spPr>
-        <p:txBody>
-          <a:bodyPr/>
-          <a:lstStyle/>
-          <a:p>
-            <a:pPr lvl="0" marL="0" indent="0" algn="ctr">
-              <a:buNone/>
-            </a:pPr>
-            <a:r>
-              <a:rPr/>
-              <a:t>Integrate</a:t>
-            </a:r>
-            <a:r>
-              <a:rPr/>
-              <a:t> </a:t>
-            </a:r>
-            <a:r>
-              <a:rPr/>
-              <a:t>R</a:t>
-            </a:r>
-            <a:r>
-              <a:rPr/>
-              <a:t> </a:t>
-            </a:r>
-            <a:r>
-              <a:rPr/>
-              <a:t>code</a:t>
-            </a:r>
-            <a:r>
-              <a:rPr/>
-              <a:t> </a:t>
-            </a:r>
-            <a:r>
-              <a:rPr/>
-              <a:t>(R</a:t>
-            </a:r>
-            <a:r>
-              <a:rPr/>
-              <a:t> </a:t>
-            </a:r>
-            <a:r>
-              <a:rPr/>
-              <a:t>chunks)</a:t>
-            </a:r>
-            <a:r>
-              <a:rPr/>
-              <a:t> </a:t>
-            </a:r>
-            <a:r>
-              <a:rPr/>
-              <a:t>directly</a:t>
-            </a:r>
-            <a:r>
-              <a:rPr/>
-              <a:t> </a:t>
-            </a:r>
-            <a:r>
-              <a:rPr/>
-              <a:t>avoiding</a:t>
-            </a:r>
-            <a:r>
-              <a:rPr/>
-              <a:t> </a:t>
-            </a:r>
-            <a:r>
-              <a:rPr/>
-              <a:t>the</a:t>
-            </a:r>
-            <a:r>
-              <a:rPr/>
-              <a:t> </a:t>
-            </a:r>
-            <a:r>
-              <a:rPr/>
-              <a:t>need</a:t>
-            </a:r>
-            <a:r>
-              <a:rPr/>
-              <a:t> </a:t>
-            </a:r>
-            <a:r>
-              <a:rPr/>
-              <a:t>to</a:t>
-            </a:r>
-            <a:r>
-              <a:rPr/>
-              <a:t> </a:t>
-            </a:r>
-            <a:r>
-              <a:rPr/>
-              <a:t>awkwardly</a:t>
-            </a:r>
-            <a:r>
-              <a:rPr/>
-              <a:t> </a:t>
-            </a:r>
-            <a:r>
-              <a:rPr/>
-              <a:t>copy-paste</a:t>
-            </a:r>
-            <a:r>
-              <a:rPr/>
-              <a:t> </a:t>
-            </a:r>
-            <a:r>
-              <a:rPr/>
-              <a:t>analyses,</a:t>
-            </a:r>
-            <a:r>
-              <a:rPr/>
-              <a:t> </a:t>
-            </a:r>
-            <a:r>
-              <a:rPr/>
-              <a:t>tables,</a:t>
-            </a:r>
-            <a:r>
-              <a:rPr/>
-              <a:t> </a:t>
-            </a:r>
-            <a:r>
-              <a:rPr/>
-              <a:t>or</a:t>
-            </a:r>
-            <a:r>
-              <a:rPr/>
-              <a:t> </a:t>
-            </a:r>
-            <a:r>
-              <a:rPr/>
-              <a:t>figures</a:t>
-            </a:r>
-          </a:p>
-        </p:txBody>
-      </p:sp>
-    </p:spTree>
-  </p:cSld>
-</p:sld>
-</file>
-
-<file path=ppt/slides/slide7.xml><?xml version="1.0" encoding="utf-8"?>
-<p:sld xmlns:a="http://schemas.openxmlformats.org/drawingml/2006/main" xmlns:r="http://schemas.openxmlformats.org/officeDocument/2006/relationships" xmlns:p="http://schemas.openxmlformats.org/presentationml/2006/main">
-  <p:cSld>
-    <p:spTree>
-      <p:nvGrpSpPr>
-        <p:cNvPr id="1" name=""/>
-        <p:cNvGrpSpPr/>
-        <p:nvPr/>
-      </p:nvGrpSpPr>
-      <p:grpSpPr>
-        <a:xfrm>
-          <a:off x="0" y="0"/>
-          <a:ext cx="0" cy="0"/>
-          <a:chOff x="0" y="0"/>
-          <a:chExt cx="0" cy="0"/>
-        </a:xfrm>
-      </p:grpSpPr>
-      <p:sp>
-        <p:nvSpPr>
-          <p:cNvPr id="3" name="Content Placeholder 2"/>
-          <p:cNvSpPr>
-            <a:spLocks noGrp="1"/>
-          </p:cNvSpPr>
-          <p:nvPr>
-            <p:ph idx="1"/>
-          </p:nvPr>
-        </p:nvSpPr>
-        <p:spPr/>
-        <p:txBody>
-          <a:bodyPr/>
-          <a:lstStyle/>
-          <a:p>
-            <a:pPr lvl="0" marL="0" indent="0">
-              <a:buNone/>
-            </a:pPr>
-            <a:r>
-              <a:rPr/>
-              <a:t> # Analyses using R code 2</a:t>
-            </a:r>
-          </a:p>
-        </p:txBody>
-      </p:sp>
-    </p:spTree>
-  </p:cSld>
-</p:sld>
-</file>
-
-<file path=ppt/slides/slide8.xml><?xml version="1.0" encoding="utf-8"?>
 <p:sld xmlns:a="http://schemas.openxmlformats.org/drawingml/2006/main" xmlns:r="http://schemas.openxmlformats.org/officeDocument/2006/relationships" xmlns:p="http://schemas.openxmlformats.org/presentationml/2006/main">
   <p:cSld>
     <p:spTree>
@@ -5484,7 +3262,2052 @@
 </p:sld>
 </file>
 
-<file path=ppt/slides/slide9.xml><?xml version="1.0" encoding="utf-8"?>
+<file path=ppt/slides/slide12.xml><?xml version="1.0" encoding="utf-8"?>
+<p:sld xmlns:a="http://schemas.openxmlformats.org/drawingml/2006/main" xmlns:r="http://schemas.openxmlformats.org/officeDocument/2006/relationships" xmlns:p="http://schemas.openxmlformats.org/presentationml/2006/main">
+  <p:cSld>
+    <p:spTree>
+      <p:nvGrpSpPr>
+        <p:cNvPr id="1" name=""/>
+        <p:cNvGrpSpPr/>
+        <p:nvPr/>
+      </p:nvGrpSpPr>
+      <p:grpSpPr>
+        <a:xfrm>
+          <a:off x="0" y="0"/>
+          <a:ext cx="0" cy="0"/>
+          <a:chOff x="0" y="0"/>
+          <a:chExt cx="0" cy="0"/>
+        </a:xfrm>
+      </p:grpSpPr>
+      <p:sp>
+        <p:nvSpPr>
+          <p:cNvPr id="2" name="Title 1"/>
+          <p:cNvSpPr>
+            <a:spLocks noGrp="1"/>
+          </p:cNvSpPr>
+          <p:nvPr>
+            <p:ph type="title"/>
+          </p:nvPr>
+        </p:nvSpPr>
+        <p:spPr>
+          <a:xfrm>
+            <a:off x="0" y="205979"/>
+            <a:ext cx="9144000" cy="857250"/>
+          </a:xfrm>
+        </p:spPr>
+        <p:txBody>
+          <a:bodyPr/>
+          <a:lstStyle/>
+          <a:p>
+            <a:pPr lvl="0" marL="0" indent="0">
+              <a:buNone/>
+            </a:pPr>
+            <a:r>
+              <a:rPr/>
+              <a:t>Integrating</a:t>
+            </a:r>
+            <a:r>
+              <a:rPr/>
+              <a:t> </a:t>
+            </a:r>
+            <a:r>
+              <a:rPr/>
+              <a:t>references</a:t>
+            </a:r>
+            <a:r>
+              <a:rPr/>
+              <a:t> </a:t>
+            </a:r>
+            <a:r>
+              <a:rPr/>
+              <a:t>with</a:t>
+            </a:r>
+            <a:r>
+              <a:rPr/>
+              <a:t> </a:t>
+            </a:r>
+            <a:r>
+              <a:rPr/>
+              <a:t>BibTeX</a:t>
+            </a:r>
+          </a:p>
+        </p:txBody>
+      </p:sp>
+      <p:sp>
+        <p:nvSpPr>
+          <p:cNvPr id="3" name="Content Placeholder 2"/>
+          <p:cNvSpPr>
+            <a:spLocks noGrp="1"/>
+          </p:cNvSpPr>
+          <p:nvPr>
+            <p:ph sz="half" idx="1"/>
+          </p:nvPr>
+        </p:nvSpPr>
+        <p:spPr/>
+        <p:txBody>
+          <a:bodyPr/>
+          <a:lstStyle/>
+          <a:p>
+            <a:pPr lvl="0" marL="0" indent="0">
+              <a:buNone/>
+            </a:pPr>
+            <a:r>
+              <a:rPr/>
+              <a:t>Each references has a unique ‘key’ used within Rmd files (e.g. [@author]) and willautomatically building the reference section</a:t>
+            </a:r>
+          </a:p>
+        </p:txBody>
+      </p:sp>
+      <p:pic>
+        <p:nvPicPr>
+          <p:cNvPr descr="/Users/jennahamlin/Desktop/GiGte/images/refsBib.png" id="0" name="Picture 1"/>
+          <p:cNvPicPr>
+            <a:picLocks noGrp="1" noChangeAspect="1"/>
+          </p:cNvPicPr>
+          <p:nvPr/>
+        </p:nvPicPr>
+        <p:blipFill>
+          <a:blip r:embed="rId2"/>
+          <a:stretch>
+            <a:fillRect/>
+          </a:stretch>
+        </p:blipFill>
+        <p:spPr bwMode="auto">
+          <a:xfrm>
+            <a:off x="4648200" y="2197100"/>
+            <a:ext cx="4038600" cy="1384300"/>
+          </a:xfrm>
+          <a:prstGeom prst="rect">
+            <a:avLst/>
+          </a:prstGeom>
+          <a:noFill/>
+          <a:ln w="9525">
+            <a:noFill/>
+            <a:headEnd/>
+            <a:tailEnd/>
+          </a:ln>
+        </p:spPr>
+      </p:pic>
+    </p:spTree>
+  </p:cSld>
+</p:sld>
+</file>
+
+<file path=ppt/slides/slide13.xml><?xml version="1.0" encoding="utf-8"?>
+<p:sld xmlns:a="http://schemas.openxmlformats.org/drawingml/2006/main" xmlns:r="http://schemas.openxmlformats.org/officeDocument/2006/relationships" xmlns:p="http://schemas.openxmlformats.org/presentationml/2006/main">
+  <p:cSld>
+    <p:spTree>
+      <p:nvGrpSpPr>
+        <p:cNvPr id="1" name=""/>
+        <p:cNvGrpSpPr/>
+        <p:nvPr/>
+      </p:nvGrpSpPr>
+      <p:grpSpPr>
+        <a:xfrm>
+          <a:off x="0" y="0"/>
+          <a:ext cx="0" cy="0"/>
+          <a:chOff x="0" y="0"/>
+          <a:chExt cx="0" cy="0"/>
+        </a:xfrm>
+      </p:grpSpPr>
+      <p:sp>
+        <p:nvSpPr>
+          <p:cNvPr id="2" name="Title 1"/>
+          <p:cNvSpPr>
+            <a:spLocks noGrp="1"/>
+          </p:cNvSpPr>
+          <p:nvPr>
+            <p:ph type="title"/>
+          </p:nvPr>
+        </p:nvSpPr>
+        <p:spPr>
+          <a:xfrm>
+            <a:off x="0" y="368238"/>
+            <a:ext cx="9144000" cy="363001"/>
+          </a:xfrm>
+        </p:spPr>
+        <p:txBody>
+          <a:bodyPr/>
+          <a:lstStyle/>
+          <a:p>
+            <a:pPr lvl="0" marL="0" indent="0">
+              <a:buNone/>
+            </a:pPr>
+            <a:r>
+              <a:rPr/>
+              <a:t>Formatting</a:t>
+            </a:r>
+            <a:r>
+              <a:rPr/>
+              <a:t> </a:t>
+            </a:r>
+            <a:r>
+              <a:rPr/>
+              <a:t>using</a:t>
+            </a:r>
+            <a:r>
+              <a:rPr/>
+              <a:t> </a:t>
+            </a:r>
+            <a:r>
+              <a:rPr/>
+              <a:t>CSL</a:t>
+            </a:r>
+            <a:r>
+              <a:rPr/>
+              <a:t> </a:t>
+            </a:r>
+            <a:r>
+              <a:rPr/>
+              <a:t>files</a:t>
+            </a:r>
+          </a:p>
+        </p:txBody>
+      </p:sp>
+      <p:pic>
+        <p:nvPicPr>
+          <p:cNvPr descr="/Users/jennahamlin/Desktop/GiGte/images/cslPage.png" id="0" name="Picture 1"/>
+          <p:cNvPicPr>
+            <a:picLocks noGrp="1" noChangeAspect="1"/>
+          </p:cNvPicPr>
+          <p:nvPr/>
+        </p:nvPicPr>
+        <p:blipFill>
+          <a:blip r:embed="rId2"/>
+          <a:stretch>
+            <a:fillRect/>
+          </a:stretch>
+        </p:blipFill>
+        <p:spPr bwMode="auto">
+          <a:xfrm>
+            <a:off x="114300" y="1663700"/>
+            <a:ext cx="8902700" cy="2197100"/>
+          </a:xfrm>
+          <a:prstGeom prst="rect">
+            <a:avLst/>
+          </a:prstGeom>
+          <a:noFill/>
+          <a:ln w="9525">
+            <a:noFill/>
+            <a:headEnd/>
+            <a:tailEnd/>
+          </a:ln>
+        </p:spPr>
+      </p:pic>
+      <p:sp>
+        <p:nvSpPr>
+          <p:cNvPr id="1" name="TextBox 3"/>
+          <p:cNvSpPr txBox="1"/>
+          <p:nvPr/>
+        </p:nvSpPr>
+        <p:spPr>
+          <a:xfrm>
+            <a:off x="114300" y="4546600"/>
+            <a:ext cx="8902700" cy="508000"/>
+          </a:xfrm>
+          <a:prstGeom prst="rect">
+            <a:avLst/>
+          </a:prstGeom>
+          <a:noFill/>
+        </p:spPr>
+        <p:txBody>
+          <a:bodyPr/>
+          <a:lstStyle/>
+          <a:p>
+            <a:pPr lvl="0" marL="0" indent="0" algn="ctr">
+              <a:buNone/>
+            </a:pPr>
+            <a:r>
+              <a:rPr/>
+              <a:t>CSL</a:t>
+            </a:r>
+            <a:r>
+              <a:rPr/>
+              <a:t> </a:t>
+            </a:r>
+            <a:r>
+              <a:rPr/>
+              <a:t>-</a:t>
+            </a:r>
+            <a:r>
+              <a:rPr/>
+              <a:t> </a:t>
+            </a:r>
+            <a:r>
+              <a:rPr/>
+              <a:t>Citation</a:t>
+            </a:r>
+            <a:r>
+              <a:rPr/>
+              <a:t> </a:t>
+            </a:r>
+            <a:r>
+              <a:rPr/>
+              <a:t>Style</a:t>
+            </a:r>
+            <a:r>
+              <a:rPr/>
+              <a:t> </a:t>
+            </a:r>
+            <a:r>
+              <a:rPr/>
+              <a:t>Language</a:t>
+            </a:r>
+            <a:r>
+              <a:rPr/>
+              <a:t> </a:t>
+            </a:r>
+            <a:r>
+              <a:rPr/>
+              <a:t>-</a:t>
+            </a:r>
+            <a:r>
+              <a:rPr/>
+              <a:t> </a:t>
+            </a:r>
+            <a:r>
+              <a:rPr/>
+              <a:t>essentially</a:t>
+            </a:r>
+            <a:r>
+              <a:rPr/>
+              <a:t> </a:t>
+            </a:r>
+            <a:r>
+              <a:rPr/>
+              <a:t>text</a:t>
+            </a:r>
+            <a:r>
+              <a:rPr/>
+              <a:t> </a:t>
+            </a:r>
+            <a:r>
+              <a:rPr/>
+              <a:t>files</a:t>
+            </a:r>
+            <a:r>
+              <a:rPr/>
+              <a:t> </a:t>
+            </a:r>
+            <a:r>
+              <a:rPr/>
+              <a:t>that</a:t>
+            </a:r>
+            <a:r>
+              <a:rPr/>
+              <a:t> </a:t>
+            </a:r>
+            <a:r>
+              <a:rPr/>
+              <a:t>tell</a:t>
+            </a:r>
+            <a:r>
+              <a:rPr/>
+              <a:t> </a:t>
+            </a:r>
+            <a:r>
+              <a:rPr/>
+              <a:t>the</a:t>
+            </a:r>
+            <a:r>
+              <a:rPr/>
+              <a:t> </a:t>
+            </a:r>
+            <a:r>
+              <a:rPr/>
+              <a:t>Rmarkdown</a:t>
+            </a:r>
+            <a:r>
+              <a:rPr/>
+              <a:t> </a:t>
+            </a:r>
+            <a:r>
+              <a:rPr/>
+              <a:t>file</a:t>
+            </a:r>
+            <a:r>
+              <a:rPr/>
+              <a:t> </a:t>
+            </a:r>
+            <a:r>
+              <a:rPr/>
+              <a:t>how</a:t>
+            </a:r>
+            <a:r>
+              <a:rPr/>
+              <a:t> </a:t>
+            </a:r>
+            <a:r>
+              <a:rPr/>
+              <a:t>to</a:t>
+            </a:r>
+            <a:r>
+              <a:rPr/>
+              <a:t> </a:t>
+            </a:r>
+            <a:r>
+              <a:rPr/>
+              <a:t>use</a:t>
+            </a:r>
+            <a:r>
+              <a:rPr/>
+              <a:t> </a:t>
+            </a:r>
+            <a:r>
+              <a:rPr/>
+              <a:t>the</a:t>
+            </a:r>
+            <a:r>
+              <a:rPr/>
+              <a:t> </a:t>
+            </a:r>
+            <a:r>
+              <a:rPr/>
+              <a:t>information</a:t>
+            </a:r>
+            <a:r>
+              <a:rPr/>
+              <a:t> </a:t>
+            </a:r>
+            <a:r>
+              <a:rPr/>
+              <a:t>in</a:t>
+            </a:r>
+            <a:r>
+              <a:rPr/>
+              <a:t> </a:t>
+            </a:r>
+            <a:r>
+              <a:rPr/>
+              <a:t>the</a:t>
+            </a:r>
+            <a:r>
+              <a:rPr/>
+              <a:t> </a:t>
+            </a:r>
+            <a:r>
+              <a:rPr/>
+              <a:t>BibTeX</a:t>
+            </a:r>
+            <a:r>
+              <a:rPr/>
+              <a:t> </a:t>
+            </a:r>
+            <a:r>
+              <a:rPr/>
+              <a:t>file</a:t>
+            </a:r>
+            <a:r>
+              <a:rPr/>
+              <a:t> </a:t>
+            </a:r>
+            <a:r>
+              <a:rPr/>
+              <a:t>to</a:t>
+            </a:r>
+            <a:r>
+              <a:rPr/>
+              <a:t> </a:t>
+            </a:r>
+            <a:r>
+              <a:rPr/>
+              <a:t>build</a:t>
+            </a:r>
+            <a:r>
+              <a:rPr/>
+              <a:t> </a:t>
+            </a:r>
+            <a:r>
+              <a:rPr/>
+              <a:t>the</a:t>
+            </a:r>
+            <a:r>
+              <a:rPr/>
+              <a:t> </a:t>
+            </a:r>
+            <a:r>
+              <a:rPr/>
+              <a:t>citations</a:t>
+            </a:r>
+            <a:r>
+              <a:rPr/>
+              <a:t> </a:t>
+            </a:r>
+            <a:r>
+              <a:rPr/>
+              <a:t>that</a:t>
+            </a:r>
+            <a:r>
+              <a:rPr/>
+              <a:t> </a:t>
+            </a:r>
+            <a:r>
+              <a:rPr/>
+              <a:t>are</a:t>
+            </a:r>
+            <a:r>
+              <a:rPr/>
+              <a:t> </a:t>
+            </a:r>
+            <a:r>
+              <a:rPr/>
+              <a:t>journal</a:t>
+            </a:r>
+            <a:r>
+              <a:rPr/>
+              <a:t> </a:t>
+            </a:r>
+            <a:r>
+              <a:rPr/>
+              <a:t>specific</a:t>
+            </a:r>
+          </a:p>
+        </p:txBody>
+      </p:sp>
+    </p:spTree>
+  </p:cSld>
+</p:sld>
+</file>
+
+<file path=ppt/slides/slide14.xml><?xml version="1.0" encoding="utf-8"?>
+<p:sld xmlns:a="http://schemas.openxmlformats.org/drawingml/2006/main" xmlns:r="http://schemas.openxmlformats.org/officeDocument/2006/relationships" xmlns:p="http://schemas.openxmlformats.org/presentationml/2006/main">
+  <p:cSld>
+    <p:spTree>
+      <p:nvGrpSpPr>
+        <p:cNvPr id="1" name=""/>
+        <p:cNvGrpSpPr/>
+        <p:nvPr/>
+      </p:nvGrpSpPr>
+      <p:grpSpPr>
+        <a:xfrm>
+          <a:off x="0" y="0"/>
+          <a:ext cx="0" cy="0"/>
+          <a:chOff x="0" y="0"/>
+          <a:chExt cx="0" cy="0"/>
+        </a:xfrm>
+      </p:grpSpPr>
+      <p:sp>
+        <p:nvSpPr>
+          <p:cNvPr id="2" name="Title 1"/>
+          <p:cNvSpPr>
+            <a:spLocks noGrp="1"/>
+          </p:cNvSpPr>
+          <p:nvPr>
+            <p:ph type="title"/>
+          </p:nvPr>
+        </p:nvSpPr>
+        <p:spPr>
+          <a:xfrm>
+            <a:off x="0" y="368238"/>
+            <a:ext cx="9144000" cy="363001"/>
+          </a:xfrm>
+        </p:spPr>
+        <p:txBody>
+          <a:bodyPr/>
+          <a:lstStyle/>
+          <a:p>
+            <a:pPr lvl="0" marL="0" indent="0">
+              <a:buNone/>
+            </a:pPr>
+            <a:r>
+              <a:rPr/>
+              <a:t>Incorporating</a:t>
+            </a:r>
+            <a:r>
+              <a:rPr/>
+              <a:t> </a:t>
+            </a:r>
+            <a:r>
+              <a:rPr/>
+              <a:t>version</a:t>
+            </a:r>
+            <a:r>
+              <a:rPr/>
+              <a:t> </a:t>
+            </a:r>
+            <a:r>
+              <a:rPr/>
+              <a:t>control</a:t>
+            </a:r>
+            <a:r>
+              <a:rPr/>
+              <a:t> </a:t>
+            </a:r>
+            <a:r>
+              <a:rPr/>
+              <a:t>with</a:t>
+            </a:r>
+            <a:r>
+              <a:rPr/>
+              <a:t> </a:t>
+            </a:r>
+            <a:r>
+              <a:rPr/>
+              <a:t>git/github</a:t>
+            </a:r>
+          </a:p>
+        </p:txBody>
+      </p:sp>
+    </p:spTree>
+  </p:cSld>
+</p:sld>
+</file>
+
+<file path=ppt/slides/slide15.xml><?xml version="1.0" encoding="utf-8"?>
+<p:sld xmlns:a="http://schemas.openxmlformats.org/drawingml/2006/main" xmlns:r="http://schemas.openxmlformats.org/officeDocument/2006/relationships" xmlns:p="http://schemas.openxmlformats.org/presentationml/2006/main">
+  <p:cSld>
+    <p:spTree>
+      <p:nvGrpSpPr>
+        <p:cNvPr id="1" name=""/>
+        <p:cNvGrpSpPr/>
+        <p:nvPr/>
+      </p:nvGrpSpPr>
+      <p:grpSpPr>
+        <a:xfrm>
+          <a:off x="0" y="0"/>
+          <a:ext cx="0" cy="0"/>
+          <a:chOff x="0" y="0"/>
+          <a:chExt cx="0" cy="0"/>
+        </a:xfrm>
+      </p:grpSpPr>
+      <p:sp>
+        <p:nvSpPr>
+          <p:cNvPr id="2" name="Title 1"/>
+          <p:cNvSpPr>
+            <a:spLocks noGrp="1"/>
+          </p:cNvSpPr>
+          <p:nvPr>
+            <p:ph type="title"/>
+          </p:nvPr>
+        </p:nvSpPr>
+        <p:spPr>
+          <a:xfrm>
+            <a:off x="0" y="368238"/>
+            <a:ext cx="9144000" cy="363001"/>
+          </a:xfrm>
+        </p:spPr>
+        <p:txBody>
+          <a:bodyPr/>
+          <a:lstStyle/>
+          <a:p>
+            <a:pPr lvl="0" marL="0" indent="0">
+              <a:buNone/>
+            </a:pPr>
+            <a:r>
+              <a:rPr/>
+              <a:t>Quick</a:t>
+            </a:r>
+            <a:r>
+              <a:rPr/>
+              <a:t> </a:t>
+            </a:r>
+            <a:r>
+              <a:rPr/>
+              <a:t>look</a:t>
+            </a:r>
+            <a:r>
+              <a:rPr/>
+              <a:t> </a:t>
+            </a:r>
+            <a:r>
+              <a:rPr/>
+              <a:t>at</a:t>
+            </a:r>
+            <a:r>
+              <a:rPr/>
+              <a:t> </a:t>
+            </a:r>
+            <a:r>
+              <a:rPr/>
+              <a:t>a</a:t>
+            </a:r>
+            <a:r>
+              <a:rPr/>
+              <a:t> </a:t>
+            </a:r>
+            <a:r>
+              <a:rPr/>
+              <a:t>manuscript</a:t>
+            </a:r>
+            <a:r>
+              <a:rPr/>
+              <a:t> </a:t>
+            </a:r>
+            <a:r>
+              <a:rPr/>
+              <a:t>-</a:t>
+            </a:r>
+            <a:r>
+              <a:rPr/>
+              <a:t> </a:t>
+            </a:r>
+            <a:r>
+              <a:rPr/>
+              <a:t>dummy</a:t>
+            </a:r>
+            <a:r>
+              <a:rPr/>
+              <a:t> </a:t>
+            </a:r>
+            <a:r>
+              <a:rPr/>
+              <a:t>Rmarkdown</a:t>
+            </a:r>
+            <a:r>
+              <a:rPr/>
+              <a:t> </a:t>
+            </a:r>
+            <a:r>
+              <a:rPr/>
+              <a:t>document</a:t>
+            </a:r>
+          </a:p>
+        </p:txBody>
+      </p:sp>
+    </p:spTree>
+  </p:cSld>
+</p:sld>
+</file>
+
+<file path=ppt/slides/slide16.xml><?xml version="1.0" encoding="utf-8"?>
+<p:sld xmlns:a="http://schemas.openxmlformats.org/drawingml/2006/main" xmlns:r="http://schemas.openxmlformats.org/officeDocument/2006/relationships" xmlns:p="http://schemas.openxmlformats.org/presentationml/2006/main">
+  <p:cSld>
+    <p:spTree>
+      <p:nvGrpSpPr>
+        <p:cNvPr id="1" name=""/>
+        <p:cNvGrpSpPr/>
+        <p:nvPr/>
+      </p:nvGrpSpPr>
+      <p:grpSpPr>
+        <a:xfrm>
+          <a:off x="0" y="0"/>
+          <a:ext cx="0" cy="0"/>
+          <a:chOff x="0" y="0"/>
+          <a:chExt cx="0" cy="0"/>
+        </a:xfrm>
+      </p:grpSpPr>
+      <p:sp>
+        <p:nvSpPr>
+          <p:cNvPr id="2" name="Title 1"/>
+          <p:cNvSpPr>
+            <a:spLocks noGrp="1"/>
+          </p:cNvSpPr>
+          <p:nvPr>
+            <p:ph type="title"/>
+          </p:nvPr>
+        </p:nvSpPr>
+        <p:spPr>
+          <a:xfrm>
+            <a:off x="0" y="368238"/>
+            <a:ext cx="9144000" cy="363001"/>
+          </a:xfrm>
+        </p:spPr>
+        <p:txBody>
+          <a:bodyPr/>
+          <a:lstStyle/>
+          <a:p>
+            <a:pPr lvl="0" marL="0" indent="0">
+              <a:buNone/>
+            </a:pPr>
+            <a:r>
+              <a:rPr/>
+              <a:t>Links</a:t>
+            </a:r>
+          </a:p>
+        </p:txBody>
+      </p:sp>
+      <p:sp>
+        <p:nvSpPr>
+          <p:cNvPr id="3" name="Content Placeholder 2"/>
+          <p:cNvSpPr>
+            <a:spLocks noGrp="1"/>
+          </p:cNvSpPr>
+          <p:nvPr>
+            <p:ph idx="1"/>
+          </p:nvPr>
+        </p:nvSpPr>
+        <p:spPr/>
+        <p:txBody>
+          <a:bodyPr/>
+          <a:lstStyle/>
+          <a:p>
+            <a:pPr lvl="1"/>
+            <a:r>
+              <a:rPr/>
+              <a:t>markdown </a:t>
+            </a:r>
+            <a:r>
+              <a:rPr>
+                <a:hlinkClick r:id="rId2"/>
+              </a:rPr>
+              <a:t>https://rstudio.com/wp-content/uploads/2015/03/rmarkdown-reference.pdf</a:t>
+            </a:r>
+            <a:r>
+              <a:rPr/>
+              <a:t>)</a:t>
+            </a:r>
+          </a:p>
+          <a:p>
+            <a:pPr lvl="1"/>
+            <a:r>
+              <a:rPr/>
+              <a:t>rmarkdown </a:t>
+            </a:r>
+            <a:r>
+              <a:rPr>
+                <a:hlinkClick r:id="rId3"/>
+              </a:rPr>
+              <a:t>https://rmarkdown.rstudio.com/lesson-1.html</a:t>
+            </a:r>
+          </a:p>
+          <a:p>
+            <a:pPr lvl="1"/>
+            <a:r>
+              <a:rPr/>
+              <a:t>rmarkdown cheat sheet </a:t>
+            </a:r>
+            <a:r>
+              <a:rPr>
+                <a:hlinkClick r:id="rId4"/>
+              </a:rPr>
+              <a:t>https://rstudio.com/wp-content/uploads/2015/02/rmarkdown-cheatsheet.pdf</a:t>
+            </a:r>
+          </a:p>
+          <a:p>
+            <a:pPr lvl="1"/>
+            <a:r>
+              <a:rPr/>
+              <a:t>rmarkdown book </a:t>
+            </a:r>
+            <a:r>
+              <a:rPr>
+                <a:hlinkClick r:id="rId5"/>
+              </a:rPr>
+              <a:t>https://bookdown.org/yihui/rmarkdown/powerpoint-presentation.html#ppt-templates</a:t>
+            </a:r>
+          </a:p>
+          <a:p>
+            <a:pPr lvl="1"/>
+            <a:r>
+              <a:rPr/>
+              <a:t>r chunks </a:t>
+            </a:r>
+            <a:r>
+              <a:rPr>
+                <a:hlinkClick r:id="rId6"/>
+              </a:rPr>
+              <a:t>https://garrettgman.github.io/rmarkdown/authoring_rcodechunks.html</a:t>
+            </a:r>
+          </a:p>
+          <a:p>
+            <a:pPr lvl="1"/>
+            <a:r>
+              <a:rPr/>
+              <a:t>template </a:t>
+            </a:r>
+            <a:r>
+              <a:rPr>
+                <a:hlinkClick r:id="rId7"/>
+              </a:rPr>
+              <a:t>https://support.office.com/en-us/article/create-a-template-86a1d089-5ae2-4d53-9042-1191bce57deb</a:t>
+            </a:r>
+          </a:p>
+          <a:p>
+            <a:pPr lvl="1"/>
+            <a:r>
+              <a:rPr/>
+              <a:t>equations </a:t>
+            </a:r>
+            <a:r>
+              <a:rPr>
+                <a:hlinkClick r:id="rId8"/>
+              </a:rPr>
+              <a:t>https://en.wikibooks.org/wiki/LaTeX/Mathematics</a:t>
+            </a:r>
+          </a:p>
+          <a:p>
+            <a:pPr lvl="1"/>
+            <a:r>
+              <a:rPr/>
+              <a:t>references</a:t>
+            </a:r>
+          </a:p>
+          <a:p>
+            <a:pPr lvl="1"/>
+            <a:r>
+              <a:rPr/>
+              <a:t>csl </a:t>
+            </a:r>
+            <a:r>
+              <a:rPr>
+                <a:hlinkClick r:id="rId9"/>
+              </a:rPr>
+              <a:t>https://github.com/citation-style-language/styles</a:t>
+            </a:r>
+          </a:p>
+          <a:p>
+            <a:pPr lvl="1"/>
+            <a:r>
+              <a:rPr/>
+              <a:t>version control with git/github</a:t>
+            </a:r>
+          </a:p>
+        </p:txBody>
+      </p:sp>
+    </p:spTree>
+  </p:cSld>
+</p:sld>
+</file>
+
+<file path=ppt/slides/slide2.xml><?xml version="1.0" encoding="utf-8"?>
+<p:sld xmlns:a="http://schemas.openxmlformats.org/drawingml/2006/main" xmlns:r="http://schemas.openxmlformats.org/officeDocument/2006/relationships" xmlns:p="http://schemas.openxmlformats.org/presentationml/2006/main">
+  <p:cSld>
+    <p:spTree>
+      <p:nvGrpSpPr>
+        <p:cNvPr id="1" name=""/>
+        <p:cNvGrpSpPr/>
+        <p:nvPr/>
+      </p:nvGrpSpPr>
+      <p:grpSpPr>
+        <a:xfrm>
+          <a:off x="0" y="0"/>
+          <a:ext cx="0" cy="0"/>
+          <a:chOff x="0" y="0"/>
+          <a:chExt cx="0" cy="0"/>
+        </a:xfrm>
+      </p:grpSpPr>
+      <p:sp>
+        <p:nvSpPr>
+          <p:cNvPr id="2" name="Title 1"/>
+          <p:cNvSpPr>
+            <a:spLocks noGrp="1"/>
+          </p:cNvSpPr>
+          <p:nvPr>
+            <p:ph type="title"/>
+          </p:nvPr>
+        </p:nvSpPr>
+        <p:spPr>
+          <a:xfrm>
+            <a:off x="0" y="368238"/>
+            <a:ext cx="9144000" cy="363001"/>
+          </a:xfrm>
+        </p:spPr>
+        <p:txBody>
+          <a:bodyPr/>
+          <a:lstStyle/>
+          <a:p>
+            <a:pPr lvl="0" marL="0" indent="0">
+              <a:buNone/>
+            </a:pPr>
+            <a:r>
+              <a:rPr/>
+              <a:t>Highlights</a:t>
+            </a:r>
+            <a:r>
+              <a:rPr/>
+              <a:t> </a:t>
+            </a:r>
+            <a:r>
+              <a:rPr/>
+              <a:t>on</a:t>
+            </a:r>
+            <a:r>
+              <a:rPr/>
+              <a:t> </a:t>
+            </a:r>
+            <a:r>
+              <a:rPr/>
+              <a:t>our</a:t>
+            </a:r>
+            <a:r>
+              <a:rPr/>
+              <a:t> </a:t>
+            </a:r>
+            <a:r>
+              <a:rPr/>
+              <a:t>tour</a:t>
+            </a:r>
+            <a:r>
+              <a:rPr/>
+              <a:t> </a:t>
+            </a:r>
+            <a:r>
+              <a:rPr/>
+              <a:t>of</a:t>
+            </a:r>
+            <a:r>
+              <a:rPr/>
+              <a:t> </a:t>
+            </a:r>
+            <a:r>
+              <a:rPr/>
+              <a:t>Rmarkdown</a:t>
+            </a:r>
+          </a:p>
+        </p:txBody>
+      </p:sp>
+      <p:sp>
+        <p:nvSpPr>
+          <p:cNvPr id="3" name="Content Placeholder 2"/>
+          <p:cNvSpPr>
+            <a:spLocks noGrp="1"/>
+          </p:cNvSpPr>
+          <p:nvPr>
+            <p:ph idx="1"/>
+          </p:nvPr>
+        </p:nvSpPr>
+        <p:spPr/>
+        <p:txBody>
+          <a:bodyPr/>
+          <a:lstStyle/>
+          <a:p>
+            <a:pPr lvl="1"/>
+            <a:r>
+              <a:rPr/>
+              <a:t>What is markdown</a:t>
+            </a:r>
+          </a:p>
+          <a:p>
+            <a:pPr lvl="1"/>
+            <a:r>
+              <a:rPr/>
+              <a:t>What is Rmarkdown</a:t>
+            </a:r>
+          </a:p>
+          <a:p>
+            <a:pPr lvl="1"/>
+            <a:r>
+              <a:rPr/>
+              <a:t>Using a word document template</a:t>
+            </a:r>
+          </a:p>
+          <a:p>
+            <a:pPr lvl="1"/>
+            <a:r>
+              <a:rPr/>
+              <a:t>Equations and other formatting with LaTeX</a:t>
+            </a:r>
+          </a:p>
+          <a:p>
+            <a:pPr lvl="1"/>
+            <a:r>
+              <a:rPr/>
+              <a:t>Analyses using R in Rmarkdown</a:t>
+            </a:r>
+          </a:p>
+          <a:p>
+            <a:pPr lvl="1"/>
+            <a:r>
+              <a:rPr/>
+              <a:t>Integrating references</a:t>
+            </a:r>
+          </a:p>
+          <a:p>
+            <a:pPr lvl="1"/>
+            <a:r>
+              <a:rPr/>
+              <a:t>Formatting using CSL files</a:t>
+            </a:r>
+          </a:p>
+          <a:p>
+            <a:pPr lvl="1"/>
+            <a:r>
+              <a:rPr/>
+              <a:t>Incorporating version control with git/github</a:t>
+            </a:r>
+          </a:p>
+        </p:txBody>
+      </p:sp>
+    </p:spTree>
+  </p:cSld>
+</p:sld>
+</file>
+
+<file path=ppt/slides/slide3.xml><?xml version="1.0" encoding="utf-8"?>
+<p:sld xmlns:a="http://schemas.openxmlformats.org/drawingml/2006/main" xmlns:r="http://schemas.openxmlformats.org/officeDocument/2006/relationships" xmlns:p="http://schemas.openxmlformats.org/presentationml/2006/main">
+  <p:cSld>
+    <p:spTree>
+      <p:nvGrpSpPr>
+        <p:cNvPr id="1" name=""/>
+        <p:cNvGrpSpPr/>
+        <p:nvPr/>
+      </p:nvGrpSpPr>
+      <p:grpSpPr>
+        <a:xfrm>
+          <a:off x="0" y="0"/>
+          <a:ext cx="0" cy="0"/>
+          <a:chOff x="0" y="0"/>
+          <a:chExt cx="0" cy="0"/>
+        </a:xfrm>
+      </p:grpSpPr>
+      <p:sp>
+        <p:nvSpPr>
+          <p:cNvPr id="2" name="Title 1"/>
+          <p:cNvSpPr>
+            <a:spLocks noGrp="1"/>
+          </p:cNvSpPr>
+          <p:nvPr>
+            <p:ph type="title"/>
+          </p:nvPr>
+        </p:nvSpPr>
+        <p:spPr>
+          <a:xfrm>
+            <a:off x="0" y="368238"/>
+            <a:ext cx="9144000" cy="363001"/>
+          </a:xfrm>
+        </p:spPr>
+        <p:txBody>
+          <a:bodyPr/>
+          <a:lstStyle/>
+          <a:p>
+            <a:pPr lvl="0" marL="0" indent="0">
+              <a:buNone/>
+            </a:pPr>
+            <a:r>
+              <a:rPr/>
+              <a:t>Markdown</a:t>
+            </a:r>
+          </a:p>
+        </p:txBody>
+      </p:sp>
+      <p:pic>
+        <p:nvPicPr>
+          <p:cNvPr descr="/Users/jennahamlin/Desktop/GiGte/images/markdownCheatSheet.png" id="0" name="Picture 1"/>
+          <p:cNvPicPr>
+            <a:picLocks noGrp="1" noChangeAspect="1"/>
+          </p:cNvPicPr>
+          <p:nvPr/>
+        </p:nvPicPr>
+        <p:blipFill>
+          <a:blip r:embed="rId2"/>
+          <a:stretch>
+            <a:fillRect/>
+          </a:stretch>
+        </p:blipFill>
+        <p:spPr bwMode="auto">
+          <a:xfrm>
+            <a:off x="1981200" y="965200"/>
+            <a:ext cx="5181600" cy="3581400"/>
+          </a:xfrm>
+          <a:prstGeom prst="rect">
+            <a:avLst/>
+          </a:prstGeom>
+          <a:noFill/>
+          <a:ln w="9525">
+            <a:noFill/>
+            <a:headEnd/>
+            <a:tailEnd/>
+          </a:ln>
+        </p:spPr>
+      </p:pic>
+      <p:sp>
+        <p:nvSpPr>
+          <p:cNvPr id="1" name="TextBox 3"/>
+          <p:cNvSpPr txBox="1"/>
+          <p:nvPr/>
+        </p:nvSpPr>
+        <p:spPr>
+          <a:xfrm>
+            <a:off x="114300" y="4546600"/>
+            <a:ext cx="8902700" cy="508000"/>
+          </a:xfrm>
+          <a:prstGeom prst="rect">
+            <a:avLst/>
+          </a:prstGeom>
+          <a:noFill/>
+        </p:spPr>
+        <p:txBody>
+          <a:bodyPr/>
+          <a:lstStyle/>
+          <a:p>
+            <a:pPr lvl="0" marL="0" indent="0" algn="ctr">
+              <a:buNone/>
+            </a:pPr>
+            <a:r>
+              <a:rPr/>
+              <a:t>Markdown</a:t>
+            </a:r>
+            <a:r>
+              <a:rPr/>
+              <a:t> </a:t>
+            </a:r>
+            <a:r>
+              <a:rPr/>
+              <a:t>is</a:t>
+            </a:r>
+            <a:r>
+              <a:rPr/>
+              <a:t> </a:t>
+            </a:r>
+            <a:r>
+              <a:rPr/>
+              <a:t>a</a:t>
+            </a:r>
+            <a:r>
+              <a:rPr/>
+              <a:t> </a:t>
+            </a:r>
+            <a:r>
+              <a:rPr/>
+              <a:t>lightweight</a:t>
+            </a:r>
+            <a:r>
+              <a:rPr/>
+              <a:t> </a:t>
+            </a:r>
+            <a:r>
+              <a:rPr/>
+              <a:t>markup</a:t>
+            </a:r>
+            <a:r>
+              <a:rPr/>
+              <a:t> </a:t>
+            </a:r>
+            <a:r>
+              <a:rPr/>
+              <a:t>language</a:t>
+            </a:r>
+            <a:r>
+              <a:rPr/>
+              <a:t> </a:t>
+            </a:r>
+            <a:r>
+              <a:rPr/>
+              <a:t>with</a:t>
+            </a:r>
+            <a:r>
+              <a:rPr/>
+              <a:t> </a:t>
+            </a:r>
+            <a:r>
+              <a:rPr/>
+              <a:t>plain-text-formatting</a:t>
+            </a:r>
+            <a:r>
+              <a:rPr/>
+              <a:t> </a:t>
+            </a:r>
+            <a:r>
+              <a:rPr/>
+              <a:t>syntax.</a:t>
+            </a:r>
+          </a:p>
+        </p:txBody>
+      </p:sp>
+    </p:spTree>
+  </p:cSld>
+</p:sld>
+</file>
+
+<file path=ppt/slides/slide4.xml><?xml version="1.0" encoding="utf-8"?>
+<p:sld xmlns:a="http://schemas.openxmlformats.org/drawingml/2006/main" xmlns:r="http://schemas.openxmlformats.org/officeDocument/2006/relationships" xmlns:p="http://schemas.openxmlformats.org/presentationml/2006/main">
+  <p:cSld>
+    <p:spTree>
+      <p:nvGrpSpPr>
+        <p:cNvPr id="1" name=""/>
+        <p:cNvGrpSpPr/>
+        <p:nvPr/>
+      </p:nvGrpSpPr>
+      <p:grpSpPr>
+        <a:xfrm>
+          <a:off x="0" y="0"/>
+          <a:ext cx="0" cy="0"/>
+          <a:chOff x="0" y="0"/>
+          <a:chExt cx="0" cy="0"/>
+        </a:xfrm>
+      </p:grpSpPr>
+      <p:sp>
+        <p:nvSpPr>
+          <p:cNvPr id="2" name="Title 1"/>
+          <p:cNvSpPr>
+            <a:spLocks noGrp="1"/>
+          </p:cNvSpPr>
+          <p:nvPr>
+            <p:ph type="title"/>
+          </p:nvPr>
+        </p:nvSpPr>
+        <p:spPr>
+          <a:xfrm>
+            <a:off x="0" y="368238"/>
+            <a:ext cx="9144000" cy="363001"/>
+          </a:xfrm>
+        </p:spPr>
+        <p:txBody>
+          <a:bodyPr/>
+          <a:lstStyle/>
+          <a:p>
+            <a:pPr lvl="0" marL="0" indent="0">
+              <a:buNone/>
+            </a:pPr>
+            <a:r>
+              <a:rPr/>
+              <a:t>Rmarkdown</a:t>
+            </a:r>
+          </a:p>
+        </p:txBody>
+      </p:sp>
+      <p:pic>
+        <p:nvPicPr>
+          <p:cNvPr descr="/Users/jennahamlin/Desktop/GiGte/images/Rmarkdown.open.png" id="0" name="Picture 1"/>
+          <p:cNvPicPr>
+            <a:picLocks noGrp="1" noChangeAspect="1"/>
+          </p:cNvPicPr>
+          <p:nvPr/>
+        </p:nvPicPr>
+        <p:blipFill>
+          <a:blip r:embed="rId2"/>
+          <a:stretch>
+            <a:fillRect/>
+          </a:stretch>
+        </p:blipFill>
+        <p:spPr bwMode="auto">
+          <a:xfrm>
+            <a:off x="114300" y="1270000"/>
+            <a:ext cx="8902700" cy="2959100"/>
+          </a:xfrm>
+          <a:prstGeom prst="rect">
+            <a:avLst/>
+          </a:prstGeom>
+          <a:noFill/>
+          <a:ln w="9525">
+            <a:noFill/>
+            <a:headEnd/>
+            <a:tailEnd/>
+          </a:ln>
+        </p:spPr>
+      </p:pic>
+      <p:sp>
+        <p:nvSpPr>
+          <p:cNvPr id="1" name="TextBox 3"/>
+          <p:cNvSpPr txBox="1"/>
+          <p:nvPr/>
+        </p:nvSpPr>
+        <p:spPr>
+          <a:xfrm>
+            <a:off x="114300" y="4546600"/>
+            <a:ext cx="8902700" cy="508000"/>
+          </a:xfrm>
+          <a:prstGeom prst="rect">
+            <a:avLst/>
+          </a:prstGeom>
+          <a:noFill/>
+        </p:spPr>
+        <p:txBody>
+          <a:bodyPr/>
+          <a:lstStyle/>
+          <a:p>
+            <a:pPr lvl="0" marL="0" indent="0" algn="ctr">
+              <a:buNone/>
+            </a:pPr>
+            <a:r>
+              <a:rPr/>
+              <a:t>Text</a:t>
+            </a:r>
+            <a:r>
+              <a:rPr/>
+              <a:t> </a:t>
+            </a:r>
+            <a:r>
+              <a:rPr/>
+              <a:t>file</a:t>
+            </a:r>
+            <a:r>
+              <a:rPr/>
+              <a:t> </a:t>
+            </a:r>
+            <a:r>
+              <a:rPr/>
+              <a:t>that</a:t>
+            </a:r>
+            <a:r>
+              <a:rPr/>
+              <a:t> </a:t>
+            </a:r>
+            <a:r>
+              <a:rPr/>
+              <a:t>can</a:t>
+            </a:r>
+            <a:r>
+              <a:rPr/>
+              <a:t> </a:t>
+            </a:r>
+            <a:r>
+              <a:rPr/>
+              <a:t>execute</a:t>
+            </a:r>
+            <a:r>
+              <a:rPr/>
+              <a:t> </a:t>
+            </a:r>
+            <a:r>
+              <a:rPr/>
+              <a:t>code</a:t>
+            </a:r>
+            <a:r>
+              <a:rPr/>
+              <a:t> </a:t>
+            </a:r>
+            <a:r>
+              <a:rPr/>
+              <a:t>making</a:t>
+            </a:r>
+            <a:r>
+              <a:rPr/>
+              <a:t> </a:t>
+            </a:r>
+            <a:r>
+              <a:rPr/>
+              <a:t>reproducibile</a:t>
+            </a:r>
+            <a:r>
+              <a:rPr/>
+              <a:t> </a:t>
+            </a:r>
+            <a:r>
+              <a:rPr/>
+              <a:t>output</a:t>
+            </a:r>
+            <a:r>
+              <a:rPr/>
+              <a:t> </a:t>
+            </a:r>
+            <a:r>
+              <a:rPr/>
+              <a:t>in</a:t>
+            </a:r>
+            <a:r>
+              <a:rPr/>
+              <a:t> </a:t>
+            </a:r>
+            <a:r>
+              <a:rPr/>
+              <a:t>a</a:t>
+            </a:r>
+            <a:r>
+              <a:rPr/>
+              <a:t> </a:t>
+            </a:r>
+            <a:r>
+              <a:rPr/>
+              <a:t>dozen</a:t>
+            </a:r>
+            <a:r>
+              <a:rPr/>
+              <a:t> </a:t>
+            </a:r>
+            <a:r>
+              <a:rPr/>
+              <a:t>static</a:t>
+            </a:r>
+            <a:r>
+              <a:rPr/>
+              <a:t> </a:t>
+            </a:r>
+            <a:r>
+              <a:rPr/>
+              <a:t>and</a:t>
+            </a:r>
+            <a:r>
+              <a:rPr/>
+              <a:t> </a:t>
+            </a:r>
+            <a:r>
+              <a:rPr/>
+              <a:t>dynamic</a:t>
+            </a:r>
+            <a:r>
+              <a:rPr/>
+              <a:t> </a:t>
+            </a:r>
+            <a:r>
+              <a:rPr/>
+              <a:t>formats</a:t>
+            </a:r>
+            <a:r>
+              <a:rPr/>
+              <a:t> </a:t>
+            </a:r>
+            <a:r>
+              <a:rPr/>
+              <a:t>(including</a:t>
+            </a:r>
+            <a:r>
+              <a:rPr/>
+              <a:t> </a:t>
+            </a:r>
+            <a:r>
+              <a:rPr/>
+              <a:t>this</a:t>
+            </a:r>
+            <a:r>
+              <a:rPr/>
+              <a:t> </a:t>
+            </a:r>
+            <a:r>
+              <a:rPr/>
+              <a:t>powerpoint).</a:t>
+            </a:r>
+          </a:p>
+        </p:txBody>
+      </p:sp>
+    </p:spTree>
+  </p:cSld>
+</p:sld>
+</file>
+
+<file path=ppt/slides/slide5.xml><?xml version="1.0" encoding="utf-8"?>
+<p:sld xmlns:a="http://schemas.openxmlformats.org/drawingml/2006/main" xmlns:r="http://schemas.openxmlformats.org/officeDocument/2006/relationships" xmlns:p="http://schemas.openxmlformats.org/presentationml/2006/main">
+  <p:cSld>
+    <p:spTree>
+      <p:nvGrpSpPr>
+        <p:cNvPr id="1" name=""/>
+        <p:cNvGrpSpPr/>
+        <p:nvPr/>
+      </p:nvGrpSpPr>
+      <p:grpSpPr>
+        <a:xfrm>
+          <a:off x="0" y="0"/>
+          <a:ext cx="0" cy="0"/>
+          <a:chOff x="0" y="0"/>
+          <a:chExt cx="0" cy="0"/>
+        </a:xfrm>
+      </p:grpSpPr>
+      <p:sp>
+        <p:nvSpPr>
+          <p:cNvPr id="2" name="Title 1"/>
+          <p:cNvSpPr>
+            <a:spLocks noGrp="1"/>
+          </p:cNvSpPr>
+          <p:nvPr>
+            <p:ph type="title"/>
+          </p:nvPr>
+        </p:nvSpPr>
+        <p:spPr>
+          <a:xfrm>
+            <a:off x="0" y="368238"/>
+            <a:ext cx="9144000" cy="363001"/>
+          </a:xfrm>
+        </p:spPr>
+        <p:txBody>
+          <a:bodyPr/>
+          <a:lstStyle/>
+          <a:p>
+            <a:pPr lvl="0" marL="0" indent="0">
+              <a:buNone/>
+            </a:pPr>
+            <a:r>
+              <a:rPr/>
+              <a:t>.Rmd</a:t>
+            </a:r>
+            <a:r>
+              <a:rPr/>
+              <a:t> </a:t>
+            </a:r>
+            <a:r>
+              <a:rPr/>
+              <a:t>files</a:t>
+            </a:r>
+          </a:p>
+        </p:txBody>
+      </p:sp>
+      <p:pic>
+        <p:nvPicPr>
+          <p:cNvPr descr="/Users/jennahamlin/Desktop/GiGte/images/Rmd.output.png" id="0" name="Picture 1"/>
+          <p:cNvPicPr>
+            <a:picLocks noGrp="1" noChangeAspect="1"/>
+          </p:cNvPicPr>
+          <p:nvPr/>
+        </p:nvPicPr>
+        <p:blipFill>
+          <a:blip r:embed="rId2"/>
+          <a:stretch>
+            <a:fillRect/>
+          </a:stretch>
+        </p:blipFill>
+        <p:spPr bwMode="auto">
+          <a:xfrm>
+            <a:off x="2184400" y="965200"/>
+            <a:ext cx="4775200" cy="3581400"/>
+          </a:xfrm>
+          <a:prstGeom prst="rect">
+            <a:avLst/>
+          </a:prstGeom>
+          <a:noFill/>
+          <a:ln w="9525">
+            <a:noFill/>
+            <a:headEnd/>
+            <a:tailEnd/>
+          </a:ln>
+        </p:spPr>
+      </p:pic>
+      <p:sp>
+        <p:nvSpPr>
+          <p:cNvPr id="1" name="TextBox 3"/>
+          <p:cNvSpPr txBox="1"/>
+          <p:nvPr/>
+        </p:nvSpPr>
+        <p:spPr>
+          <a:xfrm>
+            <a:off x="114300" y="4546600"/>
+            <a:ext cx="8902700" cy="508000"/>
+          </a:xfrm>
+          <a:prstGeom prst="rect">
+            <a:avLst/>
+          </a:prstGeom>
+          <a:noFill/>
+        </p:spPr>
+        <p:txBody>
+          <a:bodyPr/>
+          <a:lstStyle/>
+          <a:p>
+            <a:pPr lvl="0" marL="0" indent="0" algn="ctr">
+              <a:buNone/>
+            </a:pPr>
+            <a:r>
+              <a:rPr/>
+              <a:t>.Rmd</a:t>
+            </a:r>
+            <a:r>
+              <a:rPr/>
+              <a:t> </a:t>
+            </a:r>
+            <a:r>
+              <a:rPr/>
+              <a:t>files</a:t>
+            </a:r>
+            <a:r>
+              <a:rPr/>
+              <a:t> </a:t>
+            </a:r>
+            <a:r>
+              <a:rPr/>
+              <a:t>can</a:t>
+            </a:r>
+            <a:r>
+              <a:rPr/>
+              <a:t> </a:t>
+            </a:r>
+            <a:r>
+              <a:rPr/>
+              <a:t>be</a:t>
+            </a:r>
+            <a:r>
+              <a:rPr/>
+              <a:t> </a:t>
+            </a:r>
+            <a:r>
+              <a:rPr/>
+              <a:t>opened</a:t>
+            </a:r>
+            <a:r>
+              <a:rPr/>
+              <a:t> </a:t>
+            </a:r>
+            <a:r>
+              <a:rPr/>
+              <a:t>and</a:t>
+            </a:r>
+            <a:r>
+              <a:rPr/>
+              <a:t> </a:t>
+            </a:r>
+            <a:r>
+              <a:rPr/>
+              <a:t>edited</a:t>
+            </a:r>
+            <a:r>
+              <a:rPr/>
+              <a:t> </a:t>
+            </a:r>
+            <a:r>
+              <a:rPr/>
+              <a:t>in</a:t>
+            </a:r>
+            <a:r>
+              <a:rPr/>
+              <a:t> </a:t>
+            </a:r>
+            <a:r>
+              <a:rPr/>
+              <a:t>Rstudio,</a:t>
+            </a:r>
+            <a:r>
+              <a:rPr/>
+              <a:t> </a:t>
+            </a:r>
+            <a:r>
+              <a:rPr/>
+              <a:t>and</a:t>
+            </a:r>
+            <a:r>
+              <a:rPr/>
+              <a:t> </a:t>
+            </a:r>
+            <a:r>
+              <a:rPr/>
+              <a:t>turned</a:t>
+            </a:r>
+            <a:r>
+              <a:rPr/>
+              <a:t> </a:t>
+            </a:r>
+            <a:r>
+              <a:rPr/>
+              <a:t>into</a:t>
+            </a:r>
+            <a:r>
+              <a:rPr/>
+              <a:t> </a:t>
+            </a:r>
+            <a:r>
+              <a:rPr/>
+              <a:t>HTML,</a:t>
+            </a:r>
+            <a:r>
+              <a:rPr/>
+              <a:t> </a:t>
+            </a:r>
+            <a:r>
+              <a:rPr/>
+              <a:t>PDF,</a:t>
+            </a:r>
+            <a:r>
+              <a:rPr/>
+              <a:t> </a:t>
+            </a:r>
+            <a:r>
+              <a:rPr/>
+              <a:t>or</a:t>
+            </a:r>
+            <a:r>
+              <a:rPr/>
+              <a:t> </a:t>
+            </a:r>
+            <a:r>
+              <a:rPr/>
+              <a:t>DOCX</a:t>
+            </a:r>
+            <a:r>
+              <a:rPr/>
+              <a:t> </a:t>
+            </a:r>
+            <a:r>
+              <a:rPr/>
+              <a:t>files</a:t>
+            </a:r>
+            <a:r>
+              <a:rPr/>
+              <a:t> </a:t>
+            </a:r>
+            <a:r>
+              <a:rPr/>
+              <a:t>with</a:t>
+            </a:r>
+            <a:r>
+              <a:rPr/>
+              <a:t> </a:t>
+            </a:r>
+            <a:r>
+              <a:rPr/>
+              <a:t>the</a:t>
+            </a:r>
+            <a:r>
+              <a:rPr/>
+              <a:t> </a:t>
+            </a:r>
+            <a:r>
+              <a:rPr/>
+              <a:t>push</a:t>
+            </a:r>
+            <a:r>
+              <a:rPr/>
+              <a:t> </a:t>
+            </a:r>
+            <a:r>
+              <a:rPr/>
+              <a:t>of</a:t>
+            </a:r>
+            <a:r>
+              <a:rPr/>
+              <a:t> </a:t>
+            </a:r>
+            <a:r>
+              <a:rPr/>
+              <a:t>button.</a:t>
+            </a:r>
+          </a:p>
+        </p:txBody>
+      </p:sp>
+    </p:spTree>
+  </p:cSld>
+</p:sld>
+</file>
+
+<file path=ppt/slides/slide6.xml><?xml version="1.0" encoding="utf-8"?>
+<p:sld xmlns:a="http://schemas.openxmlformats.org/drawingml/2006/main" xmlns:r="http://schemas.openxmlformats.org/officeDocument/2006/relationships" xmlns:p="http://schemas.openxmlformats.org/presentationml/2006/main">
+  <p:cSld>
+    <p:spTree>
+      <p:nvGrpSpPr>
+        <p:cNvPr id="1" name=""/>
+        <p:cNvGrpSpPr/>
+        <p:nvPr/>
+      </p:nvGrpSpPr>
+      <p:grpSpPr>
+        <a:xfrm>
+          <a:off x="0" y="0"/>
+          <a:ext cx="0" cy="0"/>
+          <a:chOff x="0" y="0"/>
+          <a:chExt cx="0" cy="0"/>
+        </a:xfrm>
+      </p:grpSpPr>
+      <p:sp>
+        <p:nvSpPr>
+          <p:cNvPr id="2" name="Title 1"/>
+          <p:cNvSpPr>
+            <a:spLocks noGrp="1"/>
+          </p:cNvSpPr>
+          <p:nvPr>
+            <p:ph type="title"/>
+          </p:nvPr>
+        </p:nvSpPr>
+        <p:spPr>
+          <a:xfrm>
+            <a:off x="0" y="368238"/>
+            <a:ext cx="9144000" cy="363001"/>
+          </a:xfrm>
+        </p:spPr>
+        <p:txBody>
+          <a:bodyPr/>
+          <a:lstStyle/>
+          <a:p>
+            <a:pPr lvl="0" marL="0" indent="0">
+              <a:buNone/>
+            </a:pPr>
+            <a:r>
+              <a:rPr/>
+              <a:t>YAML</a:t>
+            </a:r>
+          </a:p>
+        </p:txBody>
+      </p:sp>
+      <p:pic>
+        <p:nvPicPr>
+          <p:cNvPr descr="/Users/jennahamlin/Desktop/GiGte/images/yamlImage.png" id="0" name="Picture 1"/>
+          <p:cNvPicPr>
+            <a:picLocks noGrp="1" noChangeAspect="1"/>
+          </p:cNvPicPr>
+          <p:nvPr/>
+        </p:nvPicPr>
+        <p:blipFill>
+          <a:blip r:embed="rId2"/>
+          <a:stretch>
+            <a:fillRect/>
+          </a:stretch>
+        </p:blipFill>
+        <p:spPr bwMode="auto">
+          <a:xfrm>
+            <a:off x="114300" y="1676400"/>
+            <a:ext cx="8902700" cy="2146300"/>
+          </a:xfrm>
+          <a:prstGeom prst="rect">
+            <a:avLst/>
+          </a:prstGeom>
+          <a:noFill/>
+          <a:ln w="9525">
+            <a:noFill/>
+            <a:headEnd/>
+            <a:tailEnd/>
+          </a:ln>
+        </p:spPr>
+      </p:pic>
+      <p:sp>
+        <p:nvSpPr>
+          <p:cNvPr id="1" name="TextBox 3"/>
+          <p:cNvSpPr txBox="1"/>
+          <p:nvPr/>
+        </p:nvSpPr>
+        <p:spPr>
+          <a:xfrm>
+            <a:off x="114300" y="4546600"/>
+            <a:ext cx="8902700" cy="508000"/>
+          </a:xfrm>
+          <a:prstGeom prst="rect">
+            <a:avLst/>
+          </a:prstGeom>
+          <a:noFill/>
+        </p:spPr>
+        <p:txBody>
+          <a:bodyPr/>
+          <a:lstStyle/>
+          <a:p>
+            <a:pPr lvl="0" marL="0" indent="0" algn="ctr">
+              <a:buNone/>
+            </a:pPr>
+            <a:r>
+              <a:rPr/>
+              <a:t>Yet</a:t>
+            </a:r>
+            <a:r>
+              <a:rPr/>
+              <a:t> </a:t>
+            </a:r>
+            <a:r>
+              <a:rPr/>
+              <a:t>Another</a:t>
+            </a:r>
+            <a:r>
+              <a:rPr/>
+              <a:t> </a:t>
+            </a:r>
+            <a:r>
+              <a:rPr/>
+              <a:t>Markup</a:t>
+            </a:r>
+            <a:r>
+              <a:rPr/>
+              <a:t> </a:t>
+            </a:r>
+            <a:r>
+              <a:rPr/>
+              <a:t>Language</a:t>
+            </a:r>
+            <a:r>
+              <a:rPr/>
+              <a:t> </a:t>
+            </a:r>
+            <a:r>
+              <a:rPr/>
+              <a:t>(YAML)</a:t>
+            </a:r>
+            <a:r>
+              <a:rPr/>
+              <a:t> </a:t>
+            </a:r>
+            <a:r>
+              <a:rPr/>
+              <a:t>-</a:t>
+            </a:r>
+            <a:r>
+              <a:rPr/>
+              <a:t> </a:t>
+            </a:r>
+            <a:r>
+              <a:rPr/>
+              <a:t>specify</a:t>
+            </a:r>
+            <a:r>
+              <a:rPr/>
+              <a:t> </a:t>
+            </a:r>
+            <a:r>
+              <a:rPr/>
+              <a:t>key</a:t>
+            </a:r>
+            <a:r>
+              <a:rPr/>
+              <a:t> </a:t>
+            </a:r>
+            <a:r>
+              <a:rPr/>
+              <a:t>information</a:t>
+            </a:r>
+            <a:r>
+              <a:rPr/>
+              <a:t> </a:t>
+            </a:r>
+            <a:r>
+              <a:rPr/>
+              <a:t>to</a:t>
+            </a:r>
+            <a:r>
+              <a:rPr/>
+              <a:t> </a:t>
+            </a:r>
+            <a:r>
+              <a:rPr/>
+              <a:t>be</a:t>
+            </a:r>
+            <a:r>
+              <a:rPr/>
+              <a:t> </a:t>
+            </a:r>
+            <a:r>
+              <a:rPr/>
+              <a:t>used</a:t>
+            </a:r>
+            <a:r>
+              <a:rPr/>
+              <a:t> </a:t>
+            </a:r>
+            <a:r>
+              <a:rPr/>
+              <a:t>when</a:t>
+            </a:r>
+            <a:r>
+              <a:rPr/>
+              <a:t> </a:t>
+            </a:r>
+            <a:r>
+              <a:rPr/>
+              <a:t>producing</a:t>
+            </a:r>
+            <a:r>
+              <a:rPr/>
+              <a:t> </a:t>
+            </a:r>
+            <a:r>
+              <a:rPr/>
+              <a:t>the</a:t>
+            </a:r>
+            <a:r>
+              <a:rPr/>
+              <a:t> </a:t>
+            </a:r>
+            <a:r>
+              <a:rPr/>
+              <a:t>final</a:t>
+            </a:r>
+            <a:r>
+              <a:rPr/>
+              <a:t> </a:t>
+            </a:r>
+            <a:r>
+              <a:rPr/>
+              <a:t>document</a:t>
+            </a:r>
+            <a:r>
+              <a:rPr/>
+              <a:t> </a:t>
+            </a:r>
+            <a:r>
+              <a:rPr/>
+              <a:t>(i.e. powerful</a:t>
+            </a:r>
+            <a:r>
+              <a:rPr/>
+              <a:t> </a:t>
+            </a:r>
+            <a:r>
+              <a:rPr/>
+              <a:t>for</a:t>
+            </a:r>
+            <a:r>
+              <a:rPr/>
+              <a:t> </a:t>
+            </a:r>
+            <a:r>
+              <a:rPr/>
+              <a:t>formatting)</a:t>
+            </a:r>
+          </a:p>
+        </p:txBody>
+      </p:sp>
+    </p:spTree>
+  </p:cSld>
+</p:sld>
+</file>
+
+<file path=ppt/slides/slide7.xml><?xml version="1.0" encoding="utf-8"?>
 <p:sld xmlns:a="http://schemas.openxmlformats.org/drawingml/2006/main" xmlns:r="http://schemas.openxmlformats.org/officeDocument/2006/relationships" xmlns:p="http://schemas.openxmlformats.org/presentationml/2006/main">
   <p:cSld>
     <p:spTree>
@@ -5810,7 +5633,455 @@
             </a:r>
             <a:r>
               <a:rPr/>
-              <a:t>time</a:t>
+              <a:t>time.</a:t>
+            </a:r>
+          </a:p>
+        </p:txBody>
+      </p:sp>
+    </p:spTree>
+  </p:cSld>
+</p:sld>
+</file>
+
+<file path=ppt/slides/slide8.xml><?xml version="1.0" encoding="utf-8"?>
+<p:sld xmlns:a="http://schemas.openxmlformats.org/drawingml/2006/main" xmlns:r="http://schemas.openxmlformats.org/officeDocument/2006/relationships" xmlns:p="http://schemas.openxmlformats.org/presentationml/2006/main">
+  <p:cSld>
+    <p:spTree>
+      <p:nvGrpSpPr>
+        <p:cNvPr id="1" name=""/>
+        <p:cNvGrpSpPr/>
+        <p:nvPr/>
+      </p:nvGrpSpPr>
+      <p:grpSpPr>
+        <a:xfrm>
+          <a:off x="0" y="0"/>
+          <a:ext cx="0" cy="0"/>
+          <a:chOff x="0" y="0"/>
+          <a:chExt cx="0" cy="0"/>
+        </a:xfrm>
+      </p:grpSpPr>
+      <p:sp>
+        <p:nvSpPr>
+          <p:cNvPr id="2" name="Title 1"/>
+          <p:cNvSpPr>
+            <a:spLocks noGrp="1"/>
+          </p:cNvSpPr>
+          <p:nvPr>
+            <p:ph type="title"/>
+          </p:nvPr>
+        </p:nvSpPr>
+        <p:spPr>
+          <a:xfrm>
+            <a:off x="0" y="368238"/>
+            <a:ext cx="9144000" cy="363001"/>
+          </a:xfrm>
+        </p:spPr>
+        <p:txBody>
+          <a:bodyPr/>
+          <a:lstStyle/>
+          <a:p>
+            <a:pPr lvl="0" marL="0" indent="0">
+              <a:buNone/>
+            </a:pPr>
+            <a:r>
+              <a:rPr/>
+              <a:t>Equations</a:t>
+            </a:r>
+            <a:r>
+              <a:rPr/>
+              <a:t> </a:t>
+            </a:r>
+            <a:r>
+              <a:rPr/>
+              <a:t>and</a:t>
+            </a:r>
+            <a:r>
+              <a:rPr/>
+              <a:t> </a:t>
+            </a:r>
+            <a:r>
+              <a:rPr/>
+              <a:t>other</a:t>
+            </a:r>
+            <a:r>
+              <a:rPr/>
+              <a:t> </a:t>
+            </a:r>
+            <a:r>
+              <a:rPr/>
+              <a:t>formatting</a:t>
+            </a:r>
+            <a:r>
+              <a:rPr/>
+              <a:t> </a:t>
+            </a:r>
+            <a:r>
+              <a:rPr/>
+              <a:t>with</a:t>
+            </a:r>
+            <a:r>
+              <a:rPr/>
+              <a:t> </a:t>
+            </a:r>
+            <a:r>
+              <a:rPr/>
+              <a:t>LaTeX</a:t>
+            </a:r>
+          </a:p>
+        </p:txBody>
+      </p:sp>
+      <p:pic>
+        <p:nvPicPr>
+          <p:cNvPr descr="/Users/jennahamlin/Desktop/GiGte/images/latexImage.png" id="0" name="Picture 1"/>
+          <p:cNvPicPr>
+            <a:picLocks noGrp="1" noChangeAspect="1"/>
+          </p:cNvPicPr>
+          <p:nvPr/>
+        </p:nvPicPr>
+        <p:blipFill>
+          <a:blip r:embed="rId2"/>
+          <a:stretch>
+            <a:fillRect/>
+          </a:stretch>
+        </p:blipFill>
+        <p:spPr bwMode="auto">
+          <a:xfrm>
+            <a:off x="2184400" y="965200"/>
+            <a:ext cx="4775200" cy="3581400"/>
+          </a:xfrm>
+          <a:prstGeom prst="rect">
+            <a:avLst/>
+          </a:prstGeom>
+          <a:noFill/>
+          <a:ln w="9525">
+            <a:noFill/>
+            <a:headEnd/>
+            <a:tailEnd/>
+          </a:ln>
+        </p:spPr>
+      </p:pic>
+      <p:sp>
+        <p:nvSpPr>
+          <p:cNvPr id="1" name="TextBox 3"/>
+          <p:cNvSpPr txBox="1"/>
+          <p:nvPr/>
+        </p:nvSpPr>
+        <p:spPr>
+          <a:xfrm>
+            <a:off x="114300" y="4546600"/>
+            <a:ext cx="8902700" cy="508000"/>
+          </a:xfrm>
+          <a:prstGeom prst="rect">
+            <a:avLst/>
+          </a:prstGeom>
+          <a:noFill/>
+        </p:spPr>
+        <p:txBody>
+          <a:bodyPr/>
+          <a:lstStyle/>
+          <a:p>
+            <a:pPr lvl="0" marL="0" indent="0" algn="ctr">
+              <a:buNone/>
+            </a:pPr>
+            <a:r>
+              <a:rPr/>
+              <a:t>LaTeX</a:t>
+            </a:r>
+            <a:r>
+              <a:rPr/>
+              <a:t> </a:t>
+            </a:r>
+            <a:r>
+              <a:rPr/>
+              <a:t>produces</a:t>
+            </a:r>
+            <a:r>
+              <a:rPr/>
+              <a:t> </a:t>
+            </a:r>
+            <a:r>
+              <a:rPr/>
+              <a:t>highly</a:t>
+            </a:r>
+            <a:r>
+              <a:rPr/>
+              <a:t> </a:t>
+            </a:r>
+            <a:r>
+              <a:rPr/>
+              <a:t>professional</a:t>
+            </a:r>
+            <a:r>
+              <a:rPr/>
+              <a:t> </a:t>
+            </a:r>
+            <a:r>
+              <a:rPr/>
+              <a:t>looking</a:t>
+            </a:r>
+            <a:r>
+              <a:rPr/>
+              <a:t> </a:t>
+            </a:r>
+            <a:r>
+              <a:rPr/>
+              <a:t>equations</a:t>
+            </a:r>
+          </a:p>
+        </p:txBody>
+      </p:sp>
+    </p:spTree>
+  </p:cSld>
+</p:sld>
+</file>
+
+<file path=ppt/slides/slide9.xml><?xml version="1.0" encoding="utf-8"?>
+<p:sld xmlns:a="http://schemas.openxmlformats.org/drawingml/2006/main" xmlns:r="http://schemas.openxmlformats.org/officeDocument/2006/relationships" xmlns:p="http://schemas.openxmlformats.org/presentationml/2006/main">
+  <p:cSld>
+    <p:spTree>
+      <p:nvGrpSpPr>
+        <p:cNvPr id="1" name=""/>
+        <p:cNvGrpSpPr/>
+        <p:nvPr/>
+      </p:nvGrpSpPr>
+      <p:grpSpPr>
+        <a:xfrm>
+          <a:off x="0" y="0"/>
+          <a:ext cx="0" cy="0"/>
+          <a:chOff x="0" y="0"/>
+          <a:chExt cx="0" cy="0"/>
+        </a:xfrm>
+      </p:grpSpPr>
+      <p:sp>
+        <p:nvSpPr>
+          <p:cNvPr id="2" name="Title 1"/>
+          <p:cNvSpPr>
+            <a:spLocks noGrp="1"/>
+          </p:cNvSpPr>
+          <p:nvPr>
+            <p:ph type="title"/>
+          </p:nvPr>
+        </p:nvSpPr>
+        <p:spPr>
+          <a:xfrm>
+            <a:off x="0" y="368238"/>
+            <a:ext cx="9144000" cy="363001"/>
+          </a:xfrm>
+        </p:spPr>
+        <p:txBody>
+          <a:bodyPr/>
+          <a:lstStyle/>
+          <a:p>
+            <a:pPr lvl="0" marL="0" indent="0">
+              <a:buNone/>
+            </a:pPr>
+            <a:r>
+              <a:rPr/>
+              <a:t>Analyses</a:t>
+            </a:r>
+            <a:r>
+              <a:rPr/>
+              <a:t> </a:t>
+            </a:r>
+            <a:r>
+              <a:rPr/>
+              <a:t>using</a:t>
+            </a:r>
+            <a:r>
+              <a:rPr/>
+              <a:t> </a:t>
+            </a:r>
+            <a:r>
+              <a:rPr/>
+              <a:t>R</a:t>
+            </a:r>
+            <a:r>
+              <a:rPr/>
+              <a:t> </a:t>
+            </a:r>
+            <a:r>
+              <a:rPr/>
+              <a:t>code</a:t>
+            </a:r>
+          </a:p>
+        </p:txBody>
+      </p:sp>
+      <p:pic>
+        <p:nvPicPr>
+          <p:cNvPr descr="/Users/jennahamlin/Desktop/GiGte/images/integrateRCode.png" id="0" name="Picture 1"/>
+          <p:cNvPicPr>
+            <a:picLocks noGrp="1" noChangeAspect="1"/>
+          </p:cNvPicPr>
+          <p:nvPr/>
+        </p:nvPicPr>
+        <p:blipFill>
+          <a:blip r:embed="rId2"/>
+          <a:stretch>
+            <a:fillRect/>
+          </a:stretch>
+        </p:blipFill>
+        <p:spPr bwMode="auto">
+          <a:xfrm>
+            <a:off x="2184400" y="965200"/>
+            <a:ext cx="4775200" cy="3581400"/>
+          </a:xfrm>
+          <a:prstGeom prst="rect">
+            <a:avLst/>
+          </a:prstGeom>
+          <a:noFill/>
+          <a:ln w="9525">
+            <a:noFill/>
+            <a:headEnd/>
+            <a:tailEnd/>
+          </a:ln>
+        </p:spPr>
+      </p:pic>
+      <p:sp>
+        <p:nvSpPr>
+          <p:cNvPr id="1" name="TextBox 3"/>
+          <p:cNvSpPr txBox="1"/>
+          <p:nvPr/>
+        </p:nvSpPr>
+        <p:spPr>
+          <a:xfrm>
+            <a:off x="114300" y="4546600"/>
+            <a:ext cx="8902700" cy="508000"/>
+          </a:xfrm>
+          <a:prstGeom prst="rect">
+            <a:avLst/>
+          </a:prstGeom>
+          <a:noFill/>
+        </p:spPr>
+        <p:txBody>
+          <a:bodyPr/>
+          <a:lstStyle/>
+          <a:p>
+            <a:pPr lvl="0" marL="0" indent="0" algn="ctr">
+              <a:buNone/>
+            </a:pPr>
+            <a:r>
+              <a:rPr/>
+              <a:t>Integrate</a:t>
+            </a:r>
+            <a:r>
+              <a:rPr/>
+              <a:t> </a:t>
+            </a:r>
+            <a:r>
+              <a:rPr/>
+              <a:t>R</a:t>
+            </a:r>
+            <a:r>
+              <a:rPr/>
+              <a:t> </a:t>
+            </a:r>
+            <a:r>
+              <a:rPr/>
+              <a:t>code</a:t>
+            </a:r>
+            <a:r>
+              <a:rPr/>
+              <a:t> </a:t>
+            </a:r>
+            <a:r>
+              <a:rPr/>
+              <a:t>(R</a:t>
+            </a:r>
+            <a:r>
+              <a:rPr/>
+              <a:t> </a:t>
+            </a:r>
+            <a:r>
+              <a:rPr/>
+              <a:t>chunks)</a:t>
+            </a:r>
+            <a:r>
+              <a:rPr/>
+              <a:t> </a:t>
+            </a:r>
+            <a:r>
+              <a:rPr/>
+              <a:t>directly</a:t>
+            </a:r>
+            <a:r>
+              <a:rPr/>
+              <a:t> </a:t>
+            </a:r>
+            <a:r>
+              <a:rPr/>
+              <a:t>avoiding</a:t>
+            </a:r>
+            <a:r>
+              <a:rPr/>
+              <a:t> </a:t>
+            </a:r>
+            <a:r>
+              <a:rPr/>
+              <a:t>the</a:t>
+            </a:r>
+            <a:r>
+              <a:rPr/>
+              <a:t> </a:t>
+            </a:r>
+            <a:r>
+              <a:rPr/>
+              <a:t>need</a:t>
+            </a:r>
+            <a:r>
+              <a:rPr/>
+              <a:t> </a:t>
+            </a:r>
+            <a:r>
+              <a:rPr/>
+              <a:t>to</a:t>
+            </a:r>
+            <a:r>
+              <a:rPr/>
+              <a:t> </a:t>
+            </a:r>
+            <a:r>
+              <a:rPr/>
+              <a:t>awkwardly</a:t>
+            </a:r>
+            <a:r>
+              <a:rPr/>
+              <a:t> </a:t>
+            </a:r>
+            <a:r>
+              <a:rPr/>
+              <a:t>copy-paste</a:t>
+            </a:r>
+            <a:r>
+              <a:rPr/>
+              <a:t> </a:t>
+            </a:r>
+            <a:r>
+              <a:rPr/>
+              <a:t>analyses,</a:t>
+            </a:r>
+            <a:r>
+              <a:rPr/>
+              <a:t> </a:t>
+            </a:r>
+            <a:r>
+              <a:rPr/>
+              <a:t>tables,</a:t>
+            </a:r>
+            <a:r>
+              <a:rPr/>
+              <a:t> </a:t>
+            </a:r>
+            <a:r>
+              <a:rPr/>
+              <a:t>or</a:t>
+            </a:r>
+            <a:r>
+              <a:rPr/>
+              <a:t> </a:t>
+            </a:r>
+            <a:r>
+              <a:rPr/>
+              <a:t>figures</a:t>
             </a:r>
           </a:p>
         </p:txBody>

</xml_diff>

<commit_message>
completed slides but should add in some notes; I can do that on Friday
</commit_message>
<xml_diff>
--- a/GiGte.pptx
+++ b/GiGte.pptx
@@ -20,6 +20,10 @@
     <p:sldId id="268" r:id="rId14"/>
     <p:sldId id="269" r:id="rId15"/>
     <p:sldId id="270" r:id="rId16"/>
+    <p:sldId id="271" r:id="rId17"/>
+    <p:sldId id="272" r:id="rId18"/>
+    <p:sldId id="273" r:id="rId19"/>
+    <p:sldId id="274" r:id="rId20"/>
   </p:sldIdLst>
   <p:sldSz cx="9144000" cy="5143500" type="screen16x9"/>
   <p:notesSz cx="6858000" cy="9144000"/>
@@ -3084,6 +3088,65 @@
               <a:rPr/>
               <a:t>Hamlin</a:t>
             </a:r>
+            <a:r>
+              <a:rPr/>
+              <a:t> </a:t>
+            </a:r>
+            <a:r>
+              <a:rPr/>
+              <a:t>-</a:t>
+            </a:r>
+            <a:r>
+              <a:rPr/>
+              <a:t> </a:t>
+            </a:r>
+            <a:r>
+              <a:rPr>
+                <a:hlinkClick r:id="rId2"/>
+              </a:rPr>
+              <a:t>ptx4@cdc.gov</a:t>
+            </a:r>
+          </a:p>
+        </p:txBody>
+      </p:sp>
+      <p:sp>
+        <p:nvSpPr>
+          <p:cNvPr id="4" name="Date Placeholder 3"/>
+          <p:cNvSpPr>
+            <a:spLocks noGrp="1"/>
+          </p:cNvSpPr>
+          <p:nvPr>
+            <p:ph type="dt" sz="half" idx="10"/>
+          </p:nvPr>
+        </p:nvSpPr>
+        <p:spPr/>
+        <p:txBody>
+          <a:bodyPr/>
+          <a:lstStyle/>
+          <a:p>
+            <a:pPr lvl="0" marL="0" indent="0">
+              <a:buNone/>
+            </a:pPr>
+            <a:r>
+              <a:rPr/>
+              <a:t>April</a:t>
+            </a:r>
+            <a:r>
+              <a:rPr/>
+              <a:t> </a:t>
+            </a:r>
+            <a:r>
+              <a:rPr/>
+              <a:t>6,</a:t>
+            </a:r>
+            <a:r>
+              <a:rPr/>
+              <a:t> </a:t>
+            </a:r>
+            <a:r>
+              <a:rPr/>
+              <a:t>2020</a:t>
+            </a:r>
           </a:p>
         </p:txBody>
       </p:sp>
@@ -3226,7 +3289,7 @@
             </a:pPr>
             <a:r>
               <a:rPr/>
-              <a:t>embed</a:t>
+              <a:t>Embed</a:t>
             </a:r>
             <a:r>
               <a:rPr/>
@@ -3267,6 +3330,46 @@
             <a:r>
               <a:rPr/>
               <a:t>documents</a:t>
+            </a:r>
+            <a:r>
+              <a:rPr/>
+              <a:t> </a:t>
+            </a:r>
+            <a:r>
+              <a:rPr/>
+              <a:t>and</a:t>
+            </a:r>
+            <a:r>
+              <a:rPr/>
+              <a:t> </a:t>
+            </a:r>
+            <a:r>
+              <a:rPr/>
+              <a:t>update</a:t>
+            </a:r>
+            <a:r>
+              <a:rPr/>
+              <a:t> </a:t>
+            </a:r>
+            <a:r>
+              <a:rPr/>
+              <a:t>code</a:t>
+            </a:r>
+            <a:r>
+              <a:rPr/>
+              <a:t> </a:t>
+            </a:r>
+            <a:r>
+              <a:rPr/>
+              <a:t>as</a:t>
+            </a:r>
+            <a:r>
+              <a:rPr/>
+              <a:t> </a:t>
+            </a:r>
+            <a:r>
+              <a:rPr/>
+              <a:t>necesary.</a:t>
             </a:r>
           </a:p>
         </p:txBody>
@@ -3367,7 +3470,7 @@
             </a:pPr>
             <a:r>
               <a:rPr/>
-              <a:t>Each references has a unique ‘key’ used within Rmd files (e.g. [@author]) and willautomatically building the reference section</a:t>
+              <a:t>Each reference has a unique ‘key’ used within Rmd files (e.g. [@author]) that will automatically build the reference section.</a:t>
             </a:r>
           </a:p>
         </p:txBody>
@@ -3773,7 +3876,7 @@
             </a:r>
             <a:r>
               <a:rPr/>
-              <a:t>specific</a:t>
+              <a:t>specific.</a:t>
             </a:r>
           </a:p>
         </p:txBody>
@@ -3917,7 +4020,7 @@
             </a:pPr>
             <a:r>
               <a:rPr/>
-              <a:t>manage,</a:t>
+              <a:t>Manage,</a:t>
             </a:r>
             <a:r>
               <a:rPr/>
@@ -3965,15 +4068,55 @@
             </a:r>
             <a:r>
               <a:rPr/>
-              <a:t>collaborate,</a:t>
-            </a:r>
-            <a:r>
-              <a:rPr/>
-              <a:t> </a:t>
-            </a:r>
-            <a:r>
-              <a:rPr/>
-              <a:t>etc..</a:t>
+              <a:t>collaborate</a:t>
+            </a:r>
+            <a:r>
+              <a:rPr/>
+              <a:t> </a:t>
+            </a:r>
+            <a:r>
+              <a:rPr/>
+              <a:t>all</a:t>
+            </a:r>
+            <a:r>
+              <a:rPr/>
+              <a:t> </a:t>
+            </a:r>
+            <a:r>
+              <a:rPr/>
+              <a:t>while</a:t>
+            </a:r>
+            <a:r>
+              <a:rPr/>
+              <a:t> </a:t>
+            </a:r>
+            <a:r>
+              <a:rPr/>
+              <a:t>using</a:t>
+            </a:r>
+            <a:r>
+              <a:rPr/>
+              <a:t> </a:t>
+            </a:r>
+            <a:r>
+              <a:rPr/>
+              <a:t>R</a:t>
+            </a:r>
+            <a:r>
+              <a:rPr/>
+              <a:t> </a:t>
+            </a:r>
+            <a:r>
+              <a:rPr/>
+              <a:t>and</a:t>
+            </a:r>
+            <a:r>
+              <a:rPr/>
+              <a:t> </a:t>
+            </a:r>
+            <a:r>
+              <a:rPr/>
+              <a:t>Rmarkdown.</a:t>
             </a:r>
           </a:p>
         </p:txBody>
@@ -4025,15 +4168,15 @@
             </a:pPr>
             <a:r>
               <a:rPr/>
-              <a:t>Quick</a:t>
-            </a:r>
-            <a:r>
-              <a:rPr/>
-              <a:t> </a:t>
-            </a:r>
-            <a:r>
-              <a:rPr/>
-              <a:t>look</a:t>
+              <a:t>Access</a:t>
+            </a:r>
+            <a:r>
+              <a:rPr/>
+              <a:t> </a:t>
+            </a:r>
+            <a:r>
+              <a:rPr/>
+              <a:t>Rmarkdown</a:t>
             </a:r>
             <a:r>
               <a:rPr/>
@@ -4049,47 +4192,44 @@
             </a:r>
             <a:r>
               <a:rPr/>
-              <a:t>a</a:t>
-            </a:r>
-            <a:r>
-              <a:rPr/>
-              <a:t> </a:t>
-            </a:r>
-            <a:r>
-              <a:rPr/>
-              <a:t>manuscript</a:t>
-            </a:r>
-            <a:r>
-              <a:rPr/>
-              <a:t> </a:t>
-            </a:r>
-            <a:r>
-              <a:rPr/>
-              <a:t>-</a:t>
-            </a:r>
-            <a:r>
-              <a:rPr/>
-              <a:t> </a:t>
-            </a:r>
-            <a:r>
-              <a:rPr/>
-              <a:t>dummy</a:t>
-            </a:r>
-            <a:r>
-              <a:rPr/>
-              <a:t> </a:t>
-            </a:r>
-            <a:r>
-              <a:rPr/>
-              <a:t>Rmarkdown</a:t>
-            </a:r>
-            <a:r>
-              <a:rPr/>
-              <a:t> </a:t>
-            </a:r>
-            <a:r>
-              <a:rPr/>
-              <a:t>document</a:t>
+              <a:t>CDC</a:t>
+            </a:r>
+          </a:p>
+        </p:txBody>
+      </p:sp>
+      <p:sp>
+        <p:nvSpPr>
+          <p:cNvPr id="3" name="Content Placeholder 2"/>
+          <p:cNvSpPr>
+            <a:spLocks noGrp="1"/>
+          </p:cNvSpPr>
+          <p:nvPr>
+            <p:ph idx="1"/>
+          </p:nvPr>
+        </p:nvSpPr>
+        <p:spPr/>
+        <p:txBody>
+          <a:bodyPr/>
+          <a:lstStyle/>
+          <a:p>
+            <a:pPr lvl="1"/>
+            <a:r>
+              <a:rPr/>
+              <a:t>log onto monolith3.biotech.cdc.gov - I have checked this one</a:t>
+            </a:r>
+          </a:p>
+          <a:p>
+            <a:pPr lvl="1"/>
+            <a:r>
+              <a:rPr/>
+              <a:t>module load R/3.6.1</a:t>
+            </a:r>
+          </a:p>
+          <a:p>
+            <a:pPr lvl="1"/>
+            <a:r>
+              <a:rPr/>
+              <a:t>rstudio</a:t>
             </a:r>
           </a:p>
         </p:txBody>
@@ -4141,6 +4281,115 @@
             </a:pPr>
             <a:r>
               <a:rPr/>
+              <a:t>Quick</a:t>
+            </a:r>
+            <a:r>
+              <a:rPr/>
+              <a:t> </a:t>
+            </a:r>
+            <a:r>
+              <a:rPr/>
+              <a:t>look</a:t>
+            </a:r>
+            <a:r>
+              <a:rPr/>
+              <a:t> </a:t>
+            </a:r>
+            <a:r>
+              <a:rPr/>
+              <a:t>at</a:t>
+            </a:r>
+            <a:r>
+              <a:rPr/>
+              <a:t> </a:t>
+            </a:r>
+            <a:r>
+              <a:rPr/>
+              <a:t>a</a:t>
+            </a:r>
+            <a:r>
+              <a:rPr/>
+              <a:t> </a:t>
+            </a:r>
+            <a:r>
+              <a:rPr/>
+              <a:t>manuscript</a:t>
+            </a:r>
+          </a:p>
+        </p:txBody>
+      </p:sp>
+      <p:sp>
+        <p:nvSpPr>
+          <p:cNvPr id="3" name="Content Placeholder 2"/>
+          <p:cNvSpPr>
+            <a:spLocks noGrp="1"/>
+          </p:cNvSpPr>
+          <p:nvPr>
+            <p:ph idx="1"/>
+          </p:nvPr>
+        </p:nvSpPr>
+        <p:spPr/>
+        <p:txBody>
+          <a:bodyPr/>
+          <a:lstStyle/>
+          <a:p>
+            <a:pPr lvl="0" marL="0" indent="0">
+              <a:buNone/>
+            </a:pPr>
+            <a:r>
+              <a:rPr/>
+              <a:t>Using the dummy Rmarkdown document</a:t>
+            </a:r>
+          </a:p>
+        </p:txBody>
+      </p:sp>
+    </p:spTree>
+  </p:cSld>
+</p:sld>
+</file>
+
+<file path=ppt/slides/slide16.xml><?xml version="1.0" encoding="utf-8"?>
+<p:sld xmlns:a="http://schemas.openxmlformats.org/drawingml/2006/main" xmlns:r="http://schemas.openxmlformats.org/officeDocument/2006/relationships" xmlns:p="http://schemas.openxmlformats.org/presentationml/2006/main">
+  <p:cSld>
+    <p:spTree>
+      <p:nvGrpSpPr>
+        <p:cNvPr id="1" name=""/>
+        <p:cNvGrpSpPr/>
+        <p:nvPr/>
+      </p:nvGrpSpPr>
+      <p:grpSpPr>
+        <a:xfrm>
+          <a:off x="0" y="0"/>
+          <a:ext cx="0" cy="0"/>
+          <a:chOff x="0" y="0"/>
+          <a:chExt cx="0" cy="0"/>
+        </a:xfrm>
+      </p:grpSpPr>
+      <p:sp>
+        <p:nvSpPr>
+          <p:cNvPr id="2" name="Title 1"/>
+          <p:cNvSpPr>
+            <a:spLocks noGrp="1"/>
+          </p:cNvSpPr>
+          <p:nvPr>
+            <p:ph type="title"/>
+          </p:nvPr>
+        </p:nvSpPr>
+        <p:spPr>
+          <a:xfrm>
+            <a:off x="0" y="368238"/>
+            <a:ext cx="9144000" cy="363001"/>
+          </a:xfrm>
+        </p:spPr>
+        <p:txBody>
+          <a:bodyPr/>
+          <a:lstStyle/>
+          <a:p>
+            <a:pPr lvl="0" marL="0" indent="0">
+              <a:buNone/>
+            </a:pPr>
+            <a:r>
+              <a:rPr/>
               <a:t>Links</a:t>
             </a:r>
           </a:p>
@@ -4203,6 +4452,90 @@
               <a:t>https://rstudio.com/wp-content/uploads/2015/02/rmarkdown-cheatsheet.pdf</a:t>
             </a:r>
           </a:p>
+        </p:txBody>
+      </p:sp>
+    </p:spTree>
+  </p:cSld>
+</p:sld>
+</file>
+
+<file path=ppt/slides/slide17.xml><?xml version="1.0" encoding="utf-8"?>
+<p:sld xmlns:a="http://schemas.openxmlformats.org/drawingml/2006/main" xmlns:r="http://schemas.openxmlformats.org/officeDocument/2006/relationships" xmlns:p="http://schemas.openxmlformats.org/presentationml/2006/main">
+  <p:cSld>
+    <p:spTree>
+      <p:nvGrpSpPr>
+        <p:cNvPr id="1" name=""/>
+        <p:cNvGrpSpPr/>
+        <p:nvPr/>
+      </p:nvGrpSpPr>
+      <p:grpSpPr>
+        <a:xfrm>
+          <a:off x="0" y="0"/>
+          <a:ext cx="0" cy="0"/>
+          <a:chOff x="0" y="0"/>
+          <a:chExt cx="0" cy="0"/>
+        </a:xfrm>
+      </p:grpSpPr>
+      <p:sp>
+        <p:nvSpPr>
+          <p:cNvPr id="2" name="Title 1"/>
+          <p:cNvSpPr>
+            <a:spLocks noGrp="1"/>
+          </p:cNvSpPr>
+          <p:nvPr>
+            <p:ph type="title"/>
+          </p:nvPr>
+        </p:nvSpPr>
+        <p:spPr>
+          <a:xfrm>
+            <a:off x="0" y="368238"/>
+            <a:ext cx="9144000" cy="363001"/>
+          </a:xfrm>
+        </p:spPr>
+        <p:txBody>
+          <a:bodyPr/>
+          <a:lstStyle/>
+          <a:p>
+            <a:pPr lvl="0" marL="0" indent="0">
+              <a:buNone/>
+            </a:pPr>
+            <a:r>
+              <a:rPr/>
+              <a:t>Links</a:t>
+            </a:r>
+            <a:r>
+              <a:rPr/>
+              <a:t> </a:t>
+            </a:r>
+            <a:r>
+              <a:rPr/>
+              <a:t>page</a:t>
+            </a:r>
+            <a:r>
+              <a:rPr/>
+              <a:t> </a:t>
+            </a:r>
+            <a:r>
+              <a:rPr/>
+              <a:t>2</a:t>
+            </a:r>
+          </a:p>
+        </p:txBody>
+      </p:sp>
+      <p:sp>
+        <p:nvSpPr>
+          <p:cNvPr id="3" name="Content Placeholder 2"/>
+          <p:cNvSpPr>
+            <a:spLocks noGrp="1"/>
+          </p:cNvSpPr>
+          <p:nvPr>
+            <p:ph idx="1"/>
+          </p:nvPr>
+        </p:nvSpPr>
+        <p:spPr/>
+        <p:txBody>
+          <a:bodyPr/>
+          <a:lstStyle/>
           <a:p>
             <a:pPr lvl="1"/>
             <a:r>
@@ -4211,7 +4544,7 @@
             </a:r>
             <a:r>
               <a:rPr>
-                <a:hlinkClick r:id="rId5"/>
+                <a:hlinkClick r:id="rId2"/>
               </a:rPr>
               <a:t>https://bookdown.org/yihui/rmarkdown/powerpoint-presentation.html#ppt-templates</a:t>
             </a:r>
@@ -4224,7 +4557,7 @@
             </a:r>
             <a:r>
               <a:rPr>
-                <a:hlinkClick r:id="rId6"/>
+                <a:hlinkClick r:id="rId3"/>
               </a:rPr>
               <a:t>https://garrettgman.github.io/rmarkdown/authoring_rcodechunks.html</a:t>
             </a:r>
@@ -4233,11 +4566,231 @@
             <a:pPr lvl="1"/>
             <a:r>
               <a:rPr/>
+              <a:t>version control with git/github </a:t>
+            </a:r>
+            <a:r>
+              <a:rPr>
+                <a:hlinkClick r:id="rId4"/>
+              </a:rPr>
+              <a:t>https://happygitwithr.com/</a:t>
+            </a:r>
+          </a:p>
+        </p:txBody>
+      </p:sp>
+    </p:spTree>
+  </p:cSld>
+</p:sld>
+</file>
+
+<file path=ppt/slides/slide18.xml><?xml version="1.0" encoding="utf-8"?>
+<p:sld xmlns:a="http://schemas.openxmlformats.org/drawingml/2006/main" xmlns:r="http://schemas.openxmlformats.org/officeDocument/2006/relationships" xmlns:p="http://schemas.openxmlformats.org/presentationml/2006/main">
+  <p:cSld>
+    <p:spTree>
+      <p:nvGrpSpPr>
+        <p:cNvPr id="1" name=""/>
+        <p:cNvGrpSpPr/>
+        <p:nvPr/>
+      </p:nvGrpSpPr>
+      <p:grpSpPr>
+        <a:xfrm>
+          <a:off x="0" y="0"/>
+          <a:ext cx="0" cy="0"/>
+          <a:chOff x="0" y="0"/>
+          <a:chExt cx="0" cy="0"/>
+        </a:xfrm>
+      </p:grpSpPr>
+      <p:sp>
+        <p:nvSpPr>
+          <p:cNvPr id="2" name="Title 1"/>
+          <p:cNvSpPr>
+            <a:spLocks noGrp="1"/>
+          </p:cNvSpPr>
+          <p:nvPr>
+            <p:ph type="title"/>
+          </p:nvPr>
+        </p:nvSpPr>
+        <p:spPr>
+          <a:xfrm>
+            <a:off x="0" y="368238"/>
+            <a:ext cx="9144000" cy="363001"/>
+          </a:xfrm>
+        </p:spPr>
+        <p:txBody>
+          <a:bodyPr/>
+          <a:lstStyle/>
+          <a:p>
+            <a:pPr lvl="0" marL="0" indent="0">
+              <a:buNone/>
+            </a:pPr>
+            <a:r>
+              <a:rPr/>
+              <a:t>Links</a:t>
+            </a:r>
+            <a:r>
+              <a:rPr/>
+              <a:t> </a:t>
+            </a:r>
+            <a:r>
+              <a:rPr/>
+              <a:t>page</a:t>
+            </a:r>
+            <a:r>
+              <a:rPr/>
+              <a:t> </a:t>
+            </a:r>
+            <a:r>
+              <a:rPr/>
+              <a:t>3</a:t>
+            </a:r>
+          </a:p>
+        </p:txBody>
+      </p:sp>
+      <p:sp>
+        <p:nvSpPr>
+          <p:cNvPr id="3" name="Content Placeholder 2"/>
+          <p:cNvSpPr>
+            <a:spLocks noGrp="1"/>
+          </p:cNvSpPr>
+          <p:nvPr>
+            <p:ph idx="1"/>
+          </p:nvPr>
+        </p:nvSpPr>
+        <p:spPr/>
+        <p:txBody>
+          <a:bodyPr/>
+          <a:lstStyle/>
+          <a:p>
+            <a:pPr lvl="1"/>
+            <a:r>
+              <a:rPr/>
+              <a:t>equations </a:t>
+            </a:r>
+            <a:r>
+              <a:rPr>
+                <a:hlinkClick r:id="rId2"/>
+              </a:rPr>
+              <a:t>https://en.wikibooks.org/wiki/LaTeX/Mathematics</a:t>
+            </a:r>
+          </a:p>
+          <a:p>
+            <a:pPr lvl="1"/>
+            <a:r>
+              <a:rPr/>
+              <a:t>references </a:t>
+            </a:r>
+            <a:r>
+              <a:rPr>
+                <a:hlinkClick r:id="rId3"/>
+              </a:rPr>
+              <a:t>https://rmarkdown.rstudio.com/authoring_bibliographies_and_citations.html</a:t>
+            </a:r>
+          </a:p>
+          <a:p>
+            <a:pPr lvl="1"/>
+            <a:r>
+              <a:rPr/>
+              <a:t>csl </a:t>
+            </a:r>
+            <a:r>
+              <a:rPr>
+                <a:hlinkClick r:id="rId4"/>
+              </a:rPr>
+              <a:t>https://github.com/citation-style-language/styles</a:t>
+            </a:r>
+          </a:p>
+        </p:txBody>
+      </p:sp>
+    </p:spTree>
+  </p:cSld>
+</p:sld>
+</file>
+
+<file path=ppt/slides/slide19.xml><?xml version="1.0" encoding="utf-8"?>
+<p:sld xmlns:a="http://schemas.openxmlformats.org/drawingml/2006/main" xmlns:r="http://schemas.openxmlformats.org/officeDocument/2006/relationships" xmlns:p="http://schemas.openxmlformats.org/presentationml/2006/main">
+  <p:cSld>
+    <p:spTree>
+      <p:nvGrpSpPr>
+        <p:cNvPr id="1" name=""/>
+        <p:cNvGrpSpPr/>
+        <p:nvPr/>
+      </p:nvGrpSpPr>
+      <p:grpSpPr>
+        <a:xfrm>
+          <a:off x="0" y="0"/>
+          <a:ext cx="0" cy="0"/>
+          <a:chOff x="0" y="0"/>
+          <a:chExt cx="0" cy="0"/>
+        </a:xfrm>
+      </p:grpSpPr>
+      <p:sp>
+        <p:nvSpPr>
+          <p:cNvPr id="2" name="Title 1"/>
+          <p:cNvSpPr>
+            <a:spLocks noGrp="1"/>
+          </p:cNvSpPr>
+          <p:nvPr>
+            <p:ph type="title"/>
+          </p:nvPr>
+        </p:nvSpPr>
+        <p:spPr>
+          <a:xfrm>
+            <a:off x="0" y="368238"/>
+            <a:ext cx="9144000" cy="363001"/>
+          </a:xfrm>
+        </p:spPr>
+        <p:txBody>
+          <a:bodyPr/>
+          <a:lstStyle/>
+          <a:p>
+            <a:pPr lvl="0" marL="0" indent="0">
+              <a:buNone/>
+            </a:pPr>
+            <a:r>
+              <a:rPr/>
+              <a:t>Links</a:t>
+            </a:r>
+            <a:r>
+              <a:rPr/>
+              <a:t> </a:t>
+            </a:r>
+            <a:r>
+              <a:rPr/>
+              <a:t>page</a:t>
+            </a:r>
+            <a:r>
+              <a:rPr/>
+              <a:t> </a:t>
+            </a:r>
+            <a:r>
+              <a:rPr/>
+              <a:t>4</a:t>
+            </a:r>
+          </a:p>
+        </p:txBody>
+      </p:sp>
+      <p:sp>
+        <p:nvSpPr>
+          <p:cNvPr id="3" name="Content Placeholder 2"/>
+          <p:cNvSpPr>
+            <a:spLocks noGrp="1"/>
+          </p:cNvSpPr>
+          <p:nvPr>
+            <p:ph idx="1"/>
+          </p:nvPr>
+        </p:nvSpPr>
+        <p:spPr/>
+        <p:txBody>
+          <a:bodyPr/>
+          <a:lstStyle/>
+          <a:p>
+            <a:pPr lvl="1"/>
+            <a:r>
+              <a:rPr/>
               <a:t>template </a:t>
             </a:r>
             <a:r>
               <a:rPr>
-                <a:hlinkClick r:id="rId7"/>
+                <a:hlinkClick r:id="rId2"/>
               </a:rPr>
               <a:t>https://support.office.com/en-us/article/create-a-template-86a1d089-5ae2-4d53-9042-1191bce57deb</a:t>
             </a:r>
@@ -4246,59 +4799,11 @@
             <a:pPr lvl="1"/>
             <a:r>
               <a:rPr/>
-              <a:t>equations </a:t>
+              <a:t>helpful site </a:t>
             </a:r>
             <a:r>
               <a:rPr>
-                <a:hlinkClick r:id="rId8"/>
-              </a:rPr>
-              <a:t>https://en.wikibooks.org/wiki/LaTeX/Mathematics</a:t>
-            </a:r>
-          </a:p>
-          <a:p>
-            <a:pPr lvl="1"/>
-            <a:r>
-              <a:rPr/>
-              <a:t>references </a:t>
-            </a:r>
-            <a:r>
-              <a:rPr>
-                <a:hlinkClick r:id="rId9"/>
-              </a:rPr>
-              <a:t>https://rmarkdown.rstudio.com/authoring_bibliographies_and_citations.html</a:t>
-            </a:r>
-          </a:p>
-          <a:p>
-            <a:pPr lvl="1"/>
-            <a:r>
-              <a:rPr/>
-              <a:t>csl </a:t>
-            </a:r>
-            <a:r>
-              <a:rPr>
-                <a:hlinkClick r:id="rId10"/>
-              </a:rPr>
-              <a:t>https://github.com/citation-style-language/styles</a:t>
-            </a:r>
-          </a:p>
-          <a:p>
-            <a:pPr lvl="1"/>
-            <a:r>
-              <a:rPr/>
-              <a:t>version control with git/github </a:t>
-            </a:r>
-            <a:r>
-              <a:rPr>
-                <a:hlinkClick r:id="rId11"/>
-              </a:rPr>
-              <a:t>https://happygitwithr.com/</a:t>
-            </a:r>
-          </a:p>
-          <a:p>
-            <a:pPr lvl="1"/>
-            <a:r>
-              <a:rPr>
-                <a:hlinkClick r:id="rId12"/>
+                <a:hlinkClick r:id="rId3"/>
               </a:rPr>
               <a:t>https://stirlingcodingclub.github.io/Manuscripts_in_Rmarkdown/Rmarkdown_notes.html</a:t>
             </a:r>
@@ -5432,7 +5937,15 @@
             </a:r>
             <a:r>
               <a:rPr/>
-              <a:t>(i.e. powerful</a:t>
+              <a:t>-</a:t>
+            </a:r>
+            <a:r>
+              <a:rPr/>
+              <a:t> </a:t>
+            </a:r>
+            <a:r>
+              <a:rPr/>
+              <a:t>powerful</a:t>
             </a:r>
             <a:r>
               <a:rPr/>
@@ -5448,7 +5961,7 @@
             </a:r>
             <a:r>
               <a:rPr/>
-              <a:t>formatting)</a:t>
+              <a:t>formatting.</a:t>
             </a:r>
           </a:p>
         </p:txBody>
@@ -5712,7 +6225,7 @@
             </a:r>
             <a:r>
               <a:rPr/>
-              <a:t>template</a:t>
+              <a:t>template,</a:t>
             </a:r>
             <a:r>
               <a:rPr/>
@@ -5978,6 +6491,94 @@
               <a:rPr/>
               <a:t>equations</a:t>
             </a:r>
+            <a:r>
+              <a:rPr/>
+              <a:t> </a:t>
+            </a:r>
+            <a:r>
+              <a:rPr/>
+              <a:t>and</a:t>
+            </a:r>
+            <a:r>
+              <a:rPr/>
+              <a:t> </a:t>
+            </a:r>
+            <a:r>
+              <a:rPr/>
+              <a:t>can</a:t>
+            </a:r>
+            <a:r>
+              <a:rPr/>
+              <a:t> </a:t>
+            </a:r>
+            <a:r>
+              <a:rPr/>
+              <a:t>be</a:t>
+            </a:r>
+            <a:r>
+              <a:rPr/>
+              <a:t> </a:t>
+            </a:r>
+            <a:r>
+              <a:rPr/>
+              <a:t>used</a:t>
+            </a:r>
+            <a:r>
+              <a:rPr/>
+              <a:t> </a:t>
+            </a:r>
+            <a:r>
+              <a:rPr/>
+              <a:t>for</a:t>
+            </a:r>
+            <a:r>
+              <a:rPr/>
+              <a:t> </a:t>
+            </a:r>
+            <a:r>
+              <a:rPr/>
+              <a:t>additional</a:t>
+            </a:r>
+            <a:r>
+              <a:rPr/>
+              <a:t> </a:t>
+            </a:r>
+            <a:r>
+              <a:rPr/>
+              <a:t>formatting</a:t>
+            </a:r>
+            <a:r>
+              <a:rPr/>
+              <a:t> </a:t>
+            </a:r>
+            <a:r>
+              <a:rPr/>
+              <a:t>requirements</a:t>
+            </a:r>
+            <a:r>
+              <a:rPr/>
+              <a:t> </a:t>
+            </a:r>
+            <a:r>
+              <a:rPr/>
+              <a:t>placed</a:t>
+            </a:r>
+            <a:r>
+              <a:rPr/>
+              <a:t> </a:t>
+            </a:r>
+            <a:r>
+              <a:rPr/>
+              <a:t>in</a:t>
+            </a:r>
+            <a:r>
+              <a:rPr/>
+              <a:t> </a:t>
+            </a:r>
+            <a:r>
+              <a:rPr/>
+              <a:t>YAML.</a:t>
+            </a:r>
           </a:p>
         </p:txBody>
       </p:sp>
@@ -6232,7 +6833,7 @@
             </a:r>
             <a:r>
               <a:rPr/>
-              <a:t>figures</a:t>
+              <a:t>figures.</a:t>
             </a:r>
           </a:p>
         </p:txBody>

</xml_diff>